<commit_message>
Add problem background and methods to poster
</commit_message>
<xml_diff>
--- a/poster.pptx
+++ b/poster.pptx
@@ -1526,7 +1526,7 @@
         <p:spPr bwMode="auto">
           <a:xfrm>
             <a:off x="11819004" y="2711225"/>
-            <a:ext cx="11995592" cy="707886"/>
+            <a:ext cx="12244057" cy="707886"/>
           </a:xfrm>
           <a:prstGeom prst="rect">
             <a:avLst/>
@@ -1552,25 +1552,31 @@
               <a:rPr lang="en-US" sz="4000" dirty="0" smtClean="0">
                 <a:latin typeface="Calibri" charset="0"/>
               </a:rPr>
-              <a:t>Cathy Chen (cc27), Lindy Zeng</a:t>
-            </a:r>
-            <a:r>
-              <a:rPr lang="en-US" sz="4000" dirty="0">
-                <a:latin typeface="Calibri" charset="0"/>
-              </a:rPr>
-              <a:t> </a:t>
+              <a:t>Cathy Chen (cc27), </a:t>
             </a:r>
             <a:r>
               <a:rPr lang="en-US" sz="4000" dirty="0" smtClean="0">
                 <a:latin typeface="Calibri" charset="0"/>
               </a:rPr>
-              <a:t>(lindy), Zachary Liu (</a:t>
+              <a:t>Zachary Liu (</a:t>
             </a:r>
             <a:r>
               <a:rPr lang="en-US" sz="4000" dirty="0" err="1" smtClean="0">
                 <a:latin typeface="Calibri" charset="0"/>
               </a:rPr>
               <a:t>zsliu</a:t>
+            </a:r>
+            <a:r>
+              <a:rPr lang="en-US" sz="4000" dirty="0" smtClean="0">
+                <a:latin typeface="Calibri" charset="0"/>
+              </a:rPr>
+              <a:t>), </a:t>
+            </a:r>
+            <a:r>
+              <a:rPr lang="en-US" sz="4000" dirty="0">
+                <a:latin typeface="Calibri" charset="0"/>
+              </a:rPr>
+              <a:t>Lindy Zeng (lindy</a:t>
             </a:r>
             <a:r>
               <a:rPr lang="en-US" sz="4000" dirty="0" smtClean="0">
@@ -1697,6 +1703,19 @@
                 <a:buChar char="§"/>
                 <a:defRPr/>
               </a:pPr>
+              <a:endParaRPr lang="en-US" sz="3200" dirty="0" smtClean="0">
+                <a:solidFill>
+                  <a:schemeClr val="tx1"/>
+                </a:solidFill>
+                <a:latin typeface="Calibri" charset="0"/>
+              </a:endParaRPr>
+            </a:p>
+            <a:p>
+              <a:pPr marL="742950" indent="-742950">
+                <a:buFont typeface="Wingdings" charset="2"/>
+                <a:buChar char="§"/>
+                <a:defRPr/>
+              </a:pPr>
               <a:r>
                 <a:rPr lang="en-US" sz="3200" dirty="0" smtClean="0">
                   <a:solidFill>
@@ -1713,7 +1732,7 @@
                   </a:solidFill>
                   <a:latin typeface="Calibri" charset="0"/>
                 </a:rPr>
-                <a:t> Implement/use a variety of face recognition algorithms and implement a variety of image manipulations. Analyze the impact of each manipulation on the accuracy of each algorithm.</a:t>
+                <a:t> Implement/use a variety of face recognition algorithms and implement image manipulations. Analyze the impact of each manipulation on the accuracy of the algorithms.</a:t>
               </a:r>
               <a:endParaRPr lang="en-US" sz="3200" dirty="0" smtClean="0">
                 <a:solidFill>
@@ -1819,8 +1838,8 @@
         </p:nvGrpSpPr>
         <p:grpSpPr bwMode="auto">
           <a:xfrm>
-            <a:off x="685799" y="18725070"/>
-            <a:ext cx="11177000" cy="5067885"/>
+            <a:off x="685799" y="14854425"/>
+            <a:ext cx="11177000" cy="8938532"/>
             <a:chOff x="990599" y="3962400"/>
             <a:chExt cx="9645905" cy="3919887"/>
           </a:xfrm>
@@ -1833,8 +1852,8 @@
           </p:nvSpPr>
           <p:spPr>
             <a:xfrm>
-              <a:off x="990599" y="4648436"/>
-              <a:ext cx="9608109" cy="3233851"/>
+              <a:off x="990599" y="4343670"/>
+              <a:ext cx="9608109" cy="3538617"/>
             </a:xfrm>
             <a:prstGeom prst="rect">
               <a:avLst/>
@@ -1868,20 +1887,29 @@
             <a:bodyPr anchor="ctr"/>
             <a:lstStyle/>
             <a:p>
-              <a:pPr marL="742950" indent="-742950">
+              <a:pPr marL="1200150" marR="0" lvl="1" indent="-742950" defTabSz="914400" eaLnBrk="1" fontAlgn="auto" latinLnBrk="0" hangingPunct="1">
+                <a:lnSpc>
+                  <a:spcPct val="100000"/>
+                </a:lnSpc>
+                <a:spcBef>
+                  <a:spcPts val="0"/>
+                </a:spcBef>
+                <a:spcAft>
+                  <a:spcPts val="0"/>
+                </a:spcAft>
+                <a:buClrTx/>
+                <a:buSzTx/>
                 <a:buFont typeface="Wingdings" charset="2"/>
-                <a:buChar char="§"/>
+                <a:buNone/>
+                <a:tabLst/>
                 <a:defRPr/>
               </a:pPr>
-              <a:r>
-                <a:rPr lang="en-US" sz="3200" b="0" dirty="0">
-                  <a:solidFill>
-                    <a:schemeClr val="tx1"/>
-                  </a:solidFill>
-                  <a:latin typeface="Calibri" charset="0"/>
-                </a:rPr>
-                <a:t>Humans can often recognize faces even if it is distorted or occluded</a:t>
-              </a:r>
+              <a:endParaRPr lang="en-US" sz="3200" b="0" dirty="0" smtClean="0">
+                <a:solidFill>
+                  <a:schemeClr val="tx1"/>
+                </a:solidFill>
+                <a:latin typeface="Calibri" charset="0"/>
+              </a:endParaRPr>
             </a:p>
           </p:txBody>
         </p:sp>
@@ -1894,7 +1922,7 @@
           <p:spPr>
             <a:xfrm>
               <a:off x="990599" y="3962400"/>
-              <a:ext cx="9645905" cy="686036"/>
+              <a:ext cx="9645905" cy="458535"/>
             </a:xfrm>
             <a:prstGeom prst="rect">
               <a:avLst/>
@@ -2736,7 +2764,7 @@
         <p:spPr bwMode="auto">
           <a:xfrm>
             <a:off x="685801" y="10580517"/>
-            <a:ext cx="11176997" cy="7613288"/>
+            <a:ext cx="11176997" cy="3724360"/>
           </a:xfrm>
           <a:prstGeom prst="rect">
             <a:avLst/>
@@ -3161,7 +3189,7 @@
         <p:spPr>
           <a:xfrm>
             <a:off x="756255" y="10756095"/>
-            <a:ext cx="11062749" cy="1077218"/>
+            <a:ext cx="11062749" cy="3046988"/>
           </a:xfrm>
           <a:prstGeom prst="rect">
             <a:avLst/>
@@ -3180,11 +3208,40 @@
               <a:defRPr/>
             </a:pPr>
             <a:r>
-              <a:rPr lang="en-US" sz="3200" b="0" dirty="0">
+              <a:rPr lang="en-US" sz="3200" b="0" dirty="0" smtClean="0">
                 <a:latin typeface="Calibri" charset="0"/>
               </a:rPr>
-              <a:t>Humans can often recognize faces even if it is distorted or occluded</a:t>
+              <a:t>Traditional statistical methods and deep learning used in face recognition problems</a:t>
             </a:r>
+          </a:p>
+          <a:p>
+            <a:pPr marL="742950" indent="-742950">
+              <a:buFont typeface="Wingdings" charset="2"/>
+              <a:buChar char="§"/>
+              <a:defRPr/>
+            </a:pPr>
+            <a:r>
+              <a:rPr lang="en-US" sz="3200" b="0" dirty="0" smtClean="0">
+                <a:latin typeface="Calibri" charset="0"/>
+              </a:rPr>
+              <a:t>Image manipulations from linear algebras, mimicking lens distortion, neural networks</a:t>
+            </a:r>
+          </a:p>
+          <a:p>
+            <a:pPr marL="742950" indent="-742950">
+              <a:buFont typeface="Wingdings" charset="2"/>
+              <a:buChar char="§"/>
+              <a:defRPr/>
+            </a:pPr>
+            <a:r>
+              <a:rPr lang="en-US" sz="3200" b="0" dirty="0" smtClean="0">
+                <a:latin typeface="Calibri" charset="0"/>
+              </a:rPr>
+              <a:t>Psychology indicates that image manipulation may equalize face recognition ability in human beings</a:t>
+            </a:r>
+            <a:endParaRPr lang="en-US" sz="3200" b="0" dirty="0">
+              <a:latin typeface="Calibri" charset="0"/>
+            </a:endParaRPr>
           </a:p>
         </p:txBody>
       </p:sp>
@@ -3406,7 +3463,7 @@
         </p:nvSpPr>
         <p:spPr bwMode="auto">
           <a:xfrm>
-            <a:off x="680360" y="9693565"/>
+            <a:off x="680360" y="9723133"/>
             <a:ext cx="11203047" cy="886952"/>
           </a:xfrm>
           <a:prstGeom prst="rect">
@@ -3621,6 +3678,249 @@
               <a:latin typeface="Calibri" charset="0"/>
               <a:ea typeface="Calibri" charset="0"/>
               <a:cs typeface="Calibri" charset="0"/>
+            </a:endParaRPr>
+          </a:p>
+        </p:txBody>
+      </p:sp>
+      <p:sp>
+        <p:nvSpPr>
+          <p:cNvPr id="11" name="TextBox 10"/>
+          <p:cNvSpPr txBox="1"/>
+          <p:nvPr/>
+        </p:nvSpPr>
+        <p:spPr>
+          <a:xfrm>
+            <a:off x="756256" y="16107221"/>
+            <a:ext cx="11125504" cy="8463855"/>
+          </a:xfrm>
+          <a:prstGeom prst="rect">
+            <a:avLst/>
+          </a:prstGeom>
+          <a:noFill/>
+        </p:spPr>
+        <p:txBody>
+          <a:bodyPr wrap="square" rtlCol="0">
+            <a:spAutoFit/>
+          </a:bodyPr>
+          <a:lstStyle/>
+          <a:p>
+            <a:pPr>
+              <a:defRPr/>
+            </a:pPr>
+            <a:r>
+              <a:rPr lang="en-US" sz="3200" dirty="0" smtClean="0">
+                <a:latin typeface="Calibri" charset="0"/>
+              </a:rPr>
+              <a:t>Face </a:t>
+            </a:r>
+            <a:r>
+              <a:rPr lang="en-US" sz="3200" dirty="0">
+                <a:latin typeface="Calibri" charset="0"/>
+              </a:rPr>
+              <a:t>recognition algorithms</a:t>
+            </a:r>
+          </a:p>
+          <a:p>
+            <a:pPr marL="457200" indent="-457200">
+              <a:buFont typeface="Arial" charset="0"/>
+              <a:buChar char="•"/>
+              <a:defRPr/>
+            </a:pPr>
+            <a:r>
+              <a:rPr lang="en-US" sz="3200" b="0" dirty="0">
+                <a:latin typeface="Calibri" charset="0"/>
+              </a:rPr>
+              <a:t>PCA</a:t>
+            </a:r>
+          </a:p>
+          <a:p>
+            <a:pPr marL="457200" indent="-457200">
+              <a:buFont typeface="Arial" charset="0"/>
+              <a:buChar char="•"/>
+              <a:defRPr/>
+            </a:pPr>
+            <a:r>
+              <a:rPr lang="en-US" sz="3200" b="0" dirty="0">
+                <a:latin typeface="Calibri" charset="0"/>
+              </a:rPr>
+              <a:t>Sparse Representation</a:t>
+            </a:r>
+          </a:p>
+          <a:p>
+            <a:pPr marL="914400" lvl="1" indent="-457200">
+              <a:buFont typeface="Arial" charset="0"/>
+              <a:buChar char="•"/>
+              <a:defRPr/>
+            </a:pPr>
+            <a:r>
+              <a:rPr lang="en-US" sz="3200" b="0" dirty="0">
+                <a:latin typeface="Calibri" charset="0"/>
+              </a:rPr>
+              <a:t>With Dimension Reduction</a:t>
+            </a:r>
+          </a:p>
+          <a:p>
+            <a:pPr marL="914400" lvl="1" indent="-457200">
+              <a:buFont typeface="Arial" charset="0"/>
+              <a:buChar char="•"/>
+              <a:defRPr/>
+            </a:pPr>
+            <a:r>
+              <a:rPr lang="en-US" sz="3200" b="0" dirty="0">
+                <a:latin typeface="Calibri" charset="0"/>
+              </a:rPr>
+              <a:t>With Combined L1 Loss</a:t>
+            </a:r>
+          </a:p>
+          <a:p>
+            <a:pPr marL="457200" indent="-457200">
+              <a:buFont typeface="Arial" charset="0"/>
+              <a:buChar char="•"/>
+              <a:defRPr/>
+            </a:pPr>
+            <a:r>
+              <a:rPr lang="en-US" sz="3200" b="0" dirty="0" smtClean="0">
+                <a:latin typeface="Calibri" charset="0"/>
+              </a:rPr>
+              <a:t>VGG</a:t>
+            </a:r>
+          </a:p>
+          <a:p>
+            <a:pPr>
+              <a:defRPr/>
+            </a:pPr>
+            <a:endParaRPr lang="en-US" sz="3200" b="0" dirty="0" smtClean="0">
+              <a:latin typeface="Calibri" charset="0"/>
+            </a:endParaRPr>
+          </a:p>
+          <a:p>
+            <a:pPr>
+              <a:defRPr/>
+            </a:pPr>
+            <a:r>
+              <a:rPr lang="en-US" sz="3200" dirty="0" smtClean="0">
+                <a:latin typeface="Calibri" charset="0"/>
+              </a:rPr>
+              <a:t>Image </a:t>
+            </a:r>
+            <a:r>
+              <a:rPr lang="en-US" sz="3200" dirty="0">
+                <a:latin typeface="Calibri" charset="0"/>
+              </a:rPr>
+              <a:t>Manipulations</a:t>
+            </a:r>
+          </a:p>
+          <a:p>
+            <a:pPr marL="742950" indent="-742950">
+              <a:buFont typeface="Wingdings" charset="2"/>
+              <a:buChar char="§"/>
+              <a:defRPr/>
+            </a:pPr>
+            <a:r>
+              <a:rPr lang="en-US" sz="3200" b="0" dirty="0">
+                <a:latin typeface="Calibri" charset="0"/>
+              </a:rPr>
+              <a:t>Occlusion</a:t>
+            </a:r>
+          </a:p>
+          <a:p>
+            <a:pPr marL="742950" indent="-742950">
+              <a:buFont typeface="Wingdings" charset="2"/>
+              <a:buChar char="§"/>
+              <a:defRPr/>
+            </a:pPr>
+            <a:r>
+              <a:rPr lang="en-US" sz="3200" b="0" dirty="0">
+                <a:latin typeface="Calibri" charset="0"/>
+              </a:rPr>
+              <a:t>Radial Distortion</a:t>
+            </a:r>
+          </a:p>
+          <a:p>
+            <a:pPr marL="742950" indent="-742950">
+              <a:buFont typeface="Wingdings" charset="2"/>
+              <a:buChar char="§"/>
+              <a:defRPr/>
+            </a:pPr>
+            <a:r>
+              <a:rPr lang="en-US" sz="3200" b="0" dirty="0">
+                <a:latin typeface="Calibri" charset="0"/>
+              </a:rPr>
+              <a:t>Blur</a:t>
+            </a:r>
+          </a:p>
+          <a:p>
+            <a:pPr marL="742950" indent="-742950">
+              <a:buFont typeface="Wingdings" charset="2"/>
+              <a:buChar char="§"/>
+              <a:defRPr/>
+            </a:pPr>
+            <a:r>
+              <a:rPr lang="en-US" sz="3200" b="0" dirty="0">
+                <a:latin typeface="Calibri" charset="0"/>
+              </a:rPr>
+              <a:t>Deep Feature </a:t>
+            </a:r>
+            <a:r>
+              <a:rPr lang="en-US" sz="3200" b="0" dirty="0" smtClean="0">
+                <a:latin typeface="Calibri" charset="0"/>
+              </a:rPr>
+              <a:t>Interpretation</a:t>
+            </a:r>
+          </a:p>
+          <a:p>
+            <a:pPr marL="742950" indent="-742950">
+              <a:buFont typeface="Wingdings" charset="2"/>
+              <a:buChar char="§"/>
+              <a:defRPr/>
+            </a:pPr>
+            <a:endParaRPr lang="en-US" sz="3200" b="0" dirty="0">
+              <a:latin typeface="Calibri" charset="0"/>
+            </a:endParaRPr>
+          </a:p>
+          <a:p>
+            <a:pPr>
+              <a:defRPr/>
+            </a:pPr>
+            <a:r>
+              <a:rPr lang="en-US" sz="3200" dirty="0" smtClean="0">
+                <a:latin typeface="Calibri" charset="0"/>
+              </a:rPr>
+              <a:t>Dataset</a:t>
+            </a:r>
+          </a:p>
+          <a:p>
+            <a:pPr>
+              <a:defRPr/>
+            </a:pPr>
+            <a:r>
+              <a:rPr lang="en-US" sz="3200" b="0" dirty="0" smtClean="0">
+                <a:latin typeface="Calibri" charset="0"/>
+              </a:rPr>
+              <a:t>Labeled Faces in the Wild (LFW)</a:t>
+            </a:r>
+            <a:endParaRPr lang="en-US" sz="3200" b="0" dirty="0">
+              <a:latin typeface="Calibri" charset="0"/>
+            </a:endParaRPr>
+          </a:p>
+          <a:p>
+            <a:pPr marL="1200150" lvl="1" indent="-742950">
+              <a:buFont typeface="Wingdings" charset="2"/>
+              <a:buChar char="§"/>
+              <a:defRPr/>
+            </a:pPr>
+            <a:endParaRPr lang="en-US" sz="3200" b="0" dirty="0">
+              <a:latin typeface="Calibri" charset="0"/>
+            </a:endParaRPr>
+          </a:p>
+          <a:p>
+            <a:pPr marL="1200150" lvl="1" indent="-742950">
+              <a:buFont typeface="Wingdings" charset="2"/>
+              <a:buChar char="§"/>
+              <a:defRPr/>
+            </a:pPr>
+            <a:endParaRPr lang="en-US" sz="3200" b="0" dirty="0">
+              <a:latin typeface="Calibri" charset="0"/>
             </a:endParaRPr>
           </a:p>
         </p:txBody>

</xml_diff>

<commit_message>
Add notes to poster.
</commit_message>
<xml_diff>
--- a/poster.pptx
+++ b/poster.pptx
@@ -176,6 +176,10 @@
 </p:presentation>
 </file>
 
+<file path=ppt/revisionInfo.xml><?xml version="1.0" encoding="utf-8"?>
+<p1510:revInfo xmlns:a="http://schemas.openxmlformats.org/drawingml/2006/main" xmlns:r="http://schemas.openxmlformats.org/officeDocument/2006/relationships" xmlns:p1510="http://schemas.microsoft.com/office/powerpoint/2015/10/main"/>
+</file>
+
 <file path=ppt/handoutMasters/handoutMaster1.xml><?xml version="1.0" encoding="utf-8"?>
 <p:handoutMaster xmlns:a="http://schemas.openxmlformats.org/drawingml/2006/main" xmlns:r="http://schemas.openxmlformats.org/officeDocument/2006/relationships" xmlns:p="http://schemas.openxmlformats.org/presentationml/2006/main">
   <p:cSld>
@@ -601,35 +605,35 @@
           <a:p>
             <a:pPr lvl="0"/>
             <a:r>
-              <a:rPr lang="en-US" noProof="0" smtClean="0"/>
+              <a:rPr lang="en-US" noProof="0"/>
               <a:t>Click to edit Master text styles</a:t>
             </a:r>
           </a:p>
           <a:p>
             <a:pPr lvl="1"/>
             <a:r>
-              <a:rPr lang="en-US" noProof="0" smtClean="0"/>
+              <a:rPr lang="en-US" noProof="0"/>
               <a:t>Second level</a:t>
             </a:r>
           </a:p>
           <a:p>
             <a:pPr lvl="2"/>
             <a:r>
-              <a:rPr lang="en-US" noProof="0" smtClean="0"/>
+              <a:rPr lang="en-US" noProof="0"/>
               <a:t>Third level</a:t>
             </a:r>
           </a:p>
           <a:p>
             <a:pPr lvl="3"/>
             <a:r>
-              <a:rPr lang="en-US" noProof="0" smtClean="0"/>
+              <a:rPr lang="en-US" noProof="0"/>
               <a:t>Fourth level</a:t>
             </a:r>
           </a:p>
           <a:p>
             <a:pPr lvl="4"/>
             <a:r>
-              <a:rPr lang="en-US" noProof="0" smtClean="0"/>
+              <a:rPr lang="en-US" noProof="0"/>
               <a:t>Fifth level</a:t>
             </a:r>
           </a:p>
@@ -1484,7 +1488,7 @@
           <a:p>
             <a:pPr algn="ctr"/>
             <a:r>
-              <a:rPr lang="en-US" sz="6500" i="1" dirty="0" smtClean="0">
+              <a:rPr lang="en-US" sz="6500" i="1" dirty="0">
                 <a:solidFill>
                   <a:srgbClr val="9F3322"/>
                 </a:solidFill>
@@ -1497,17 +1501,6 @@
               </a:rPr>
               <a:t>Robustness of Face Recognition to Image Manipulations</a:t>
             </a:r>
-            <a:endParaRPr lang="en-US" sz="6500" i="1" dirty="0">
-              <a:solidFill>
-                <a:srgbClr val="9F3322"/>
-              </a:solidFill>
-              <a:effectLst>
-                <a:outerShdw blurRad="38100" dist="38100" dir="2700000" algn="tl">
-                  <a:srgbClr val="DDDDDD"/>
-                </a:outerShdw>
-              </a:effectLst>
-              <a:latin typeface="Calibri" charset="0"/>
-            </a:endParaRPr>
           </a:p>
         </p:txBody>
       </p:sp>
@@ -1549,34 +1542,22 @@
           <a:lstStyle/>
           <a:p>
             <a:r>
-              <a:rPr lang="en-US" sz="4000" dirty="0" smtClean="0">
+              <a:rPr lang="en-US" sz="4000" dirty="0">
                 <a:latin typeface="Calibri" charset="0"/>
               </a:rPr>
               <a:t>Cathy Chen (cc27), Zachary Liu (</a:t>
             </a:r>
             <a:r>
-              <a:rPr lang="en-US" sz="4000" dirty="0" err="1" smtClean="0">
+              <a:rPr lang="en-US" sz="4000" dirty="0" err="1">
                 <a:latin typeface="Calibri" charset="0"/>
               </a:rPr>
               <a:t>zsliu</a:t>
             </a:r>
             <a:r>
-              <a:rPr lang="en-US" sz="4000" dirty="0" smtClean="0">
-                <a:latin typeface="Calibri" charset="0"/>
-              </a:rPr>
-              <a:t>), </a:t>
-            </a:r>
-            <a:r>
               <a:rPr lang="en-US" sz="4000" dirty="0">
                 <a:latin typeface="Calibri" charset="0"/>
               </a:rPr>
-              <a:t>Lindy Zeng (lindy</a:t>
-            </a:r>
-            <a:r>
-              <a:rPr lang="en-US" sz="4000" dirty="0" smtClean="0">
-                <a:latin typeface="Calibri" charset="0"/>
-              </a:rPr>
-              <a:t>)</a:t>
+              <a:t>), Lindy Zeng (lindy)</a:t>
             </a:r>
             <a:endParaRPr lang="en-US" sz="4000" i="1" dirty="0">
               <a:latin typeface="Calibri" charset="0"/>
@@ -1652,7 +1633,7 @@
                 <a:buChar char="§"/>
                 <a:defRPr/>
               </a:pPr>
-              <a:endParaRPr lang="en-US" sz="3200" dirty="0" smtClean="0">
+              <a:endParaRPr lang="en-US" sz="3200" dirty="0">
                 <a:solidFill>
                   <a:schemeClr val="tx1"/>
                 </a:solidFill>
@@ -1666,7 +1647,7 @@
                 <a:defRPr/>
               </a:pPr>
               <a:r>
-                <a:rPr lang="en-US" sz="3200" b="0" dirty="0" smtClean="0">
+                <a:rPr lang="en-US" sz="3200" b="0" dirty="0">
                   <a:solidFill>
                     <a:schemeClr val="tx1"/>
                   </a:solidFill>
@@ -1682,7 +1663,7 @@
                 <a:defRPr/>
               </a:pPr>
               <a:r>
-                <a:rPr lang="en-US" sz="3200" b="0" dirty="0" smtClean="0">
+                <a:rPr lang="en-US" sz="3200" b="0" dirty="0">
                   <a:solidFill>
                     <a:schemeClr val="tx1"/>
                   </a:solidFill>
@@ -1697,7 +1678,7 @@
                 <a:buChar char="§"/>
                 <a:defRPr/>
               </a:pPr>
-              <a:endParaRPr lang="en-US" sz="3200" dirty="0" smtClean="0">
+              <a:endParaRPr lang="en-US" sz="3200" dirty="0">
                 <a:solidFill>
                   <a:schemeClr val="tx1"/>
                 </a:solidFill>
@@ -1711,7 +1692,7 @@
                 <a:defRPr/>
               </a:pPr>
               <a:r>
-                <a:rPr lang="en-US" sz="3200" dirty="0" smtClean="0">
+                <a:rPr lang="en-US" sz="3200" dirty="0">
                   <a:solidFill>
                     <a:schemeClr val="tx1"/>
                   </a:solidFill>
@@ -1720,7 +1701,7 @@
                 <a:t>Goal:</a:t>
               </a:r>
               <a:r>
-                <a:rPr lang="en-US" sz="3200" b="0" dirty="0" smtClean="0">
+                <a:rPr lang="en-US" sz="3200" b="0" dirty="0">
                   <a:solidFill>
                     <a:schemeClr val="tx1"/>
                   </a:solidFill>
@@ -1728,7 +1709,7 @@
                 </a:rPr>
                 <a:t> Implement/use a variety of face recognition algorithms and implement image manipulations. Analyze the impact of each manipulation on the accuracy of the algorithms.</a:t>
               </a:r>
-              <a:endParaRPr lang="en-US" sz="3200" dirty="0" smtClean="0">
+              <a:endParaRPr lang="en-US" sz="3200" dirty="0">
                 <a:solidFill>
                   <a:schemeClr val="tx1"/>
                 </a:solidFill>
@@ -1741,7 +1722,7 @@
                 <a:buChar char="§"/>
                 <a:defRPr/>
               </a:pPr>
-              <a:endParaRPr lang="en-US" sz="2800" dirty="0" smtClean="0">
+              <a:endParaRPr lang="en-US" sz="2800" dirty="0">
                 <a:solidFill>
                   <a:schemeClr val="tx1"/>
                 </a:solidFill>
@@ -1796,7 +1777,7 @@
             <a:lstStyle/>
             <a:p>
               <a:r>
-                <a:rPr lang="en-US" sz="4000" dirty="0" smtClean="0">
+                <a:rPr lang="en-US" sz="4000" dirty="0">
                   <a:solidFill>
                     <a:schemeClr val="bg1"/>
                   </a:solidFill>
@@ -1898,7 +1879,7 @@
                 <a:tabLst/>
                 <a:defRPr/>
               </a:pPr>
-              <a:endParaRPr lang="en-US" sz="3200" b="0" dirty="0" smtClean="0">
+              <a:endParaRPr lang="en-US" sz="3200" b="0" dirty="0">
                 <a:solidFill>
                   <a:schemeClr val="tx1"/>
                 </a:solidFill>
@@ -1953,7 +1934,7 @@
             <a:lstStyle/>
             <a:p>
               <a:r>
-                <a:rPr lang="en-US" sz="4000" dirty="0" smtClean="0">
+                <a:rPr lang="en-US" sz="4000" dirty="0">
                   <a:solidFill>
                     <a:srgbClr val="FFFFFF"/>
                   </a:solidFill>
@@ -2039,7 +2020,7 @@
               <a:pPr lvl="1">
                 <a:defRPr/>
               </a:pPr>
-              <a:endParaRPr lang="en-US" sz="2800" dirty="0" smtClean="0">
+              <a:endParaRPr lang="en-US" sz="2800" dirty="0">
                 <a:solidFill>
                   <a:schemeClr val="tx1"/>
                 </a:solidFill>
@@ -2102,18 +2083,7 @@
                   <a:ea typeface="ＭＳ Ｐゴシック" charset="-128"/>
                   <a:cs typeface="ＭＳ Ｐゴシック" charset="-128"/>
                 </a:rPr>
-                <a:t> </a:t>
-              </a:r>
-              <a:r>
-                <a:rPr lang="en-US" sz="4000" dirty="0" smtClean="0">
-                  <a:solidFill>
-                    <a:srgbClr val="FFFFFF"/>
-                  </a:solidFill>
-                  <a:latin typeface="Calibri" charset="0"/>
-                  <a:ea typeface="ＭＳ Ｐゴシック" charset="-128"/>
-                  <a:cs typeface="ＭＳ Ｐゴシック" charset="-128"/>
-                </a:rPr>
-                <a:t>Results</a:t>
+                <a:t> Results</a:t>
               </a:r>
               <a:endParaRPr lang="en-US" sz="4400" dirty="0">
                 <a:solidFill>
@@ -2198,7 +2168,7 @@
                 <a:defRPr/>
               </a:pPr>
               <a:r>
-                <a:rPr lang="en-US" sz="3200" b="0" dirty="0" smtClean="0">
+                <a:rPr lang="en-US" sz="3200" b="0" dirty="0">
                   <a:solidFill>
                     <a:schemeClr val="tx1"/>
                   </a:solidFill>
@@ -2214,17 +2184,7 @@
                   <a:latin typeface="Calibri" charset="0"/>
                   <a:sym typeface="Wingdings"/>
                 </a:rPr>
-                <a:t> </a:t>
-              </a:r>
-              <a:r>
-                <a:rPr lang="en-US" sz="3200" b="0" dirty="0" smtClean="0">
-                  <a:solidFill>
-                    <a:schemeClr val="tx1"/>
-                  </a:solidFill>
-                  <a:latin typeface="Calibri" charset="0"/>
-                  <a:sym typeface="Wingdings"/>
-                </a:rPr>
-                <a:t>(PCA, Sparse Representation)</a:t>
+                <a:t> (PCA, Sparse Representation)</a:t>
               </a:r>
             </a:p>
             <a:p>
@@ -2234,7 +2194,7 @@
                 <a:defRPr/>
               </a:pPr>
               <a:r>
-                <a:rPr lang="en-US" sz="3200" b="0" dirty="0" smtClean="0">
+                <a:rPr lang="en-US" sz="3200" b="0" dirty="0">
                   <a:solidFill>
                     <a:schemeClr val="tx1"/>
                   </a:solidFill>
@@ -2251,7 +2211,7 @@
                 <a:defRPr/>
               </a:pPr>
               <a:r>
-                <a:rPr lang="en-US" sz="3200" b="0" dirty="0" smtClean="0">
+                <a:rPr lang="en-US" sz="3200" b="0" dirty="0">
                   <a:solidFill>
                     <a:schemeClr val="tx1"/>
                   </a:solidFill>
@@ -2330,18 +2290,7 @@
                   <a:ea typeface="ＭＳ Ｐゴシック" charset="-128"/>
                   <a:cs typeface="ＭＳ Ｐゴシック" charset="-128"/>
                 </a:rPr>
-                <a:t> </a:t>
-              </a:r>
-              <a:r>
-                <a:rPr lang="en-US" sz="4000" dirty="0" smtClean="0">
-                  <a:solidFill>
-                    <a:srgbClr val="FFFFFF"/>
-                  </a:solidFill>
-                  <a:latin typeface="Calibri" charset="0"/>
-                  <a:ea typeface="ＭＳ Ｐゴシック" charset="-128"/>
-                  <a:cs typeface="ＭＳ Ｐゴシック" charset="-128"/>
-                </a:rPr>
-                <a:t>Results and Discussion</a:t>
+                <a:t> Results and Discussion</a:t>
               </a:r>
               <a:endParaRPr lang="en-US" sz="4400" dirty="0">
                 <a:solidFill>
@@ -2435,7 +2384,7 @@
           <p:spPr>
             <a:xfrm>
               <a:off x="770149" y="19331351"/>
-              <a:ext cx="10525404" cy="433022"/>
+              <a:ext cx="10525404" cy="3714879"/>
             </a:xfrm>
             <a:prstGeom prst="rect">
               <a:avLst/>
@@ -2447,17 +2396,100 @@
             </a:bodyPr>
             <a:lstStyle/>
             <a:p>
-              <a:pPr marL="742950" indent="-742950">
-                <a:buFont typeface="Wingdings" charset="2"/>
-                <a:buChar char="§"/>
+              <a:pPr>
                 <a:defRPr/>
               </a:pPr>
               <a:r>
-                <a:rPr lang="en-US" sz="3200" b="0" dirty="0" smtClean="0">
+                <a:rPr lang="en-US" sz="3200" dirty="0">
                   <a:latin typeface="Calibri" charset="0"/>
                 </a:rPr>
-                <a:t>Graphs </a:t>
+                <a:t>Baseline Performance</a:t>
               </a:r>
+            </a:p>
+            <a:p>
+              <a:pPr>
+                <a:defRPr/>
+              </a:pPr>
+              <a:r>
+                <a:rPr lang="en-US" sz="3200" b="0" dirty="0">
+                  <a:latin typeface="Calibri" charset="0"/>
+                </a:rPr>
+                <a:t>[Graph of results on no manipulation task with different splits]</a:t>
+              </a:r>
+            </a:p>
+            <a:p>
+              <a:pPr>
+                <a:defRPr/>
+              </a:pPr>
+              <a:r>
+                <a:rPr lang="en-US" sz="3200" b="0" dirty="0">
+                  <a:latin typeface="Calibri" charset="0"/>
+                </a:rPr>
+                <a:t>[Motivation: different amounts of training data to represent different cases.]</a:t>
+              </a:r>
+            </a:p>
+            <a:p>
+              <a:pPr>
+                <a:defRPr/>
+              </a:pPr>
+              <a:endParaRPr lang="en-US" sz="3200" b="0" dirty="0">
+                <a:latin typeface="Calibri" charset="0"/>
+              </a:endParaRPr>
+            </a:p>
+            <a:p>
+              <a:pPr>
+                <a:defRPr/>
+              </a:pPr>
+              <a:endParaRPr lang="en-US" sz="3200" b="0" dirty="0">
+                <a:latin typeface="Calibri" charset="0"/>
+              </a:endParaRPr>
+            </a:p>
+            <a:p>
+              <a:pPr>
+                <a:defRPr/>
+              </a:pPr>
+              <a:r>
+                <a:rPr lang="en-US" sz="3200" dirty="0">
+                  <a:latin typeface="Calibri" charset="0"/>
+                </a:rPr>
+                <a:t>Performance with Distortion</a:t>
+              </a:r>
+            </a:p>
+            <a:p>
+              <a:pPr>
+                <a:defRPr/>
+              </a:pPr>
+              <a:r>
+                <a:rPr lang="en-US" sz="3200" b="0" dirty="0">
+                  <a:latin typeface="Calibri" charset="0"/>
+                </a:rPr>
+                <a:t>[Performance plots]</a:t>
+              </a:r>
+            </a:p>
+            <a:p>
+              <a:pPr>
+                <a:defRPr/>
+              </a:pPr>
+              <a:r>
+                <a:rPr lang="en-US" sz="3200" b="0" dirty="0">
+                  <a:latin typeface="Calibri" charset="0"/>
+                </a:rPr>
+                <a:t>[Plot change in performance vs </a:t>
+              </a:r>
+              <a:r>
+                <a:rPr lang="en-US" sz="3200" b="0">
+                  <a:latin typeface="Calibri" charset="0"/>
+                </a:rPr>
+                <a:t>baseline performance]</a:t>
+              </a:r>
+              <a:endParaRPr lang="en-US" sz="3200" b="0" dirty="0">
+                <a:latin typeface="Calibri" charset="0"/>
+              </a:endParaRPr>
+            </a:p>
+            <a:p>
+              <a:pPr>
+                <a:defRPr/>
+              </a:pPr>
               <a:endParaRPr lang="en-US" sz="3200" b="0" dirty="0">
                 <a:latin typeface="Calibri" charset="0"/>
               </a:endParaRPr>
@@ -2491,14 +2523,11 @@
                 <a:defRPr/>
               </a:pPr>
               <a:r>
-                <a:rPr lang="en-US" sz="3200" b="0" dirty="0" smtClean="0">
+                <a:rPr lang="en-US" sz="3200" b="0" dirty="0">
                   <a:latin typeface="Calibri" charset="0"/>
                 </a:rPr>
                 <a:t>More results</a:t>
               </a:r>
-              <a:endParaRPr lang="en-US" sz="3200" b="0" dirty="0">
-                <a:latin typeface="Calibri" charset="0"/>
-              </a:endParaRPr>
             </a:p>
           </p:txBody>
         </p:sp>
@@ -2550,7 +2579,7 @@
               <a:defRPr/>
             </a:pPr>
             <a:r>
-              <a:rPr lang="en-US" sz="3200" b="0" dirty="0" smtClean="0">
+              <a:rPr lang="en-US" sz="3200" b="0" dirty="0">
                 <a:solidFill>
                   <a:schemeClr val="tx1"/>
                 </a:solidFill>
@@ -2560,7 +2589,7 @@
               <a:t>Professor Olga </a:t>
             </a:r>
             <a:r>
-              <a:rPr lang="en-US" sz="3200" b="0" dirty="0" err="1" smtClean="0">
+              <a:rPr lang="en-US" sz="3200" b="0" dirty="0" err="1">
                 <a:solidFill>
                   <a:schemeClr val="tx1"/>
                 </a:solidFill>
@@ -2584,7 +2613,7 @@
               <a:defRPr/>
             </a:pPr>
             <a:r>
-              <a:rPr lang="en-US" sz="3200" b="0" dirty="0" smtClean="0">
+              <a:rPr lang="en-US" sz="3200" b="0" dirty="0">
                 <a:solidFill>
                   <a:schemeClr val="tx1"/>
                 </a:solidFill>
@@ -2594,7 +2623,7 @@
               <a:t>Kyle Genova, Riley Simmons-</a:t>
             </a:r>
             <a:r>
-              <a:rPr lang="en-US" sz="3200" b="0" dirty="0" err="1" smtClean="0">
+              <a:rPr lang="en-US" sz="3200" b="0" dirty="0" err="1">
                 <a:solidFill>
                   <a:schemeClr val="tx1"/>
                 </a:solidFill>
@@ -2603,7 +2632,7 @@
               </a:rPr>
               <a:t>Edler</a:t>
             </a:r>
-            <a:endParaRPr lang="en-US" sz="3200" b="0" dirty="0" smtClean="0">
+            <a:endParaRPr lang="en-US" sz="3200" b="0" dirty="0">
               <a:solidFill>
                 <a:schemeClr val="tx1"/>
               </a:solidFill>
@@ -2743,7 +2772,7 @@
           <a:lstStyle/>
           <a:p>
             <a:r>
-              <a:rPr lang="en-US" sz="4000" dirty="0" smtClean="0">
+              <a:rPr lang="en-US" sz="4000" dirty="0">
                 <a:solidFill>
                   <a:srgbClr val="FFFFFF"/>
                 </a:solidFill>
@@ -2847,7 +2876,7 @@
             <a:pPr>
               <a:defRPr/>
             </a:pPr>
-            <a:endParaRPr lang="en-US" sz="2800" dirty="0" smtClean="0">
+            <a:endParaRPr lang="en-US" sz="2800" dirty="0">
               <a:solidFill>
                 <a:schemeClr val="tx1"/>
               </a:solidFill>
@@ -2873,7 +2902,7 @@
               <a:buChar char="§"/>
               <a:defRPr/>
             </a:pPr>
-            <a:endParaRPr lang="en-US" sz="2800" dirty="0" smtClean="0">
+            <a:endParaRPr lang="en-US" sz="2800" dirty="0">
               <a:solidFill>
                 <a:schemeClr val="tx1"/>
               </a:solidFill>
@@ -2899,7 +2928,7 @@
               <a:buChar char="§"/>
               <a:defRPr/>
             </a:pPr>
-            <a:endParaRPr lang="en-US" sz="2800" dirty="0" smtClean="0">
+            <a:endParaRPr lang="en-US" sz="2800" dirty="0">
               <a:solidFill>
                 <a:schemeClr val="tx1"/>
               </a:solidFill>
@@ -2925,7 +2954,7 @@
               <a:buChar char="§"/>
               <a:defRPr/>
             </a:pPr>
-            <a:endParaRPr lang="en-US" sz="2800" dirty="0" smtClean="0">
+            <a:endParaRPr lang="en-US" sz="2800" dirty="0">
               <a:solidFill>
                 <a:schemeClr val="tx1"/>
               </a:solidFill>
@@ -2951,7 +2980,7 @@
               <a:buChar char="§"/>
               <a:defRPr/>
             </a:pPr>
-            <a:endParaRPr lang="en-US" sz="2800" dirty="0" smtClean="0">
+            <a:endParaRPr lang="en-US" sz="2800" dirty="0">
               <a:solidFill>
                 <a:schemeClr val="tx1"/>
               </a:solidFill>
@@ -3052,29 +3081,7 @@
                   <a:ea typeface="Calibri" charset="0"/>
                   <a:cs typeface="Calibri" charset="0"/>
                 </a:rPr>
-                <a:t>[1] </a:t>
-              </a:r>
-              <a:r>
-                <a:rPr lang="en-US" sz="2500" b="0" dirty="0" smtClean="0">
-                  <a:solidFill>
-                    <a:schemeClr val="tx1"/>
-                  </a:solidFill>
-                  <a:latin typeface="Calibri" charset="0"/>
-                  <a:ea typeface="Calibri" charset="0"/>
-                  <a:cs typeface="Calibri" charset="0"/>
-                </a:rPr>
-                <a:t>Face Recognition Homepage - Algorithms</a:t>
-              </a:r>
-              <a:r>
-                <a:rPr lang="en-US" sz="2500" b="0" dirty="0">
-                  <a:solidFill>
-                    <a:schemeClr val="tx1"/>
-                  </a:solidFill>
-                  <a:latin typeface="Calibri" charset="0"/>
-                  <a:ea typeface="Calibri" charset="0"/>
-                  <a:cs typeface="Calibri" charset="0"/>
-                </a:rPr>
-                <a:t>. </a:t>
+                <a:t>[1] Face Recognition Homepage - Algorithms. </a:t>
               </a:r>
               <a:endParaRPr lang="en-US" sz="2500" b="0" dirty="0">
                 <a:latin typeface="Calibri" charset="0"/>
@@ -3158,18 +3165,7 @@
                   <a:ea typeface="Calibri" charset="0"/>
                   <a:cs typeface="Calibri" charset="0"/>
                 </a:rPr>
-                <a:t>, 16(6), June 2016</a:t>
-              </a:r>
-              <a:r>
-                <a:rPr lang="en-US" sz="2500" b="0" dirty="0" smtClean="0">
-                  <a:solidFill>
-                    <a:schemeClr val="tx1"/>
-                  </a:solidFill>
-                  <a:latin typeface="Calibri" charset="0"/>
-                  <a:ea typeface="Calibri" charset="0"/>
-                  <a:cs typeface="Calibri" charset="0"/>
-                </a:rPr>
-                <a:t>.</a:t>
+                <a:t>, 16(6), June 2016.</a:t>
               </a:r>
             </a:p>
             <a:p>
@@ -3184,7 +3180,7 @@
                 </a:rPr>
                 <a:t>[3] </a:t>
               </a:r>
-              <a:endParaRPr lang="en-US" sz="2500" b="0" dirty="0" smtClean="0">
+              <a:endParaRPr lang="en-US" sz="2500" b="0" dirty="0">
                 <a:latin typeface="Calibri" charset="0"/>
                 <a:ea typeface="Calibri" charset="0"/>
                 <a:cs typeface="Calibri" charset="0"/>
@@ -3203,14 +3199,17 @@
                 <a:buChar char="§"/>
                 <a:defRPr/>
               </a:pPr>
-              <a:endParaRPr lang="en-US" sz="2500" b="0" dirty="0">
-                <a:solidFill>
-                  <a:schemeClr val="tx1"/>
-                </a:solidFill>
-                <a:latin typeface="Calibri" charset="0"/>
-                <a:ea typeface="Calibri" charset="0"/>
-                <a:cs typeface="Calibri" charset="0"/>
-              </a:endParaRPr>
+              <a:r>
+                <a:rPr lang="en-US" sz="2500" dirty="0">
+                  <a:solidFill>
+                    <a:schemeClr val="tx1"/>
+                  </a:solidFill>
+                  <a:latin typeface="Calibri" charset="0"/>
+                  <a:ea typeface="Calibri" charset="0"/>
+                  <a:cs typeface="Calibri" charset="0"/>
+                </a:rPr>
+                <a:t>Just copy over from paper?</a:t>
+              </a:r>
             </a:p>
           </p:txBody>
         </p:sp>
@@ -3260,7 +3259,7 @@
             <a:lstStyle/>
             <a:p>
               <a:r>
-                <a:rPr lang="en-US" sz="4000" dirty="0" smtClean="0">
+                <a:rPr lang="en-US" sz="4000" dirty="0">
                   <a:solidFill>
                     <a:srgbClr val="FFFFFF"/>
                   </a:solidFill>
@@ -3329,23 +3328,20 @@
           <a:lstStyle/>
           <a:p>
             <a:r>
-              <a:rPr lang="en-US" sz="3000" dirty="0" smtClean="0">
+              <a:rPr lang="en-US" sz="3000" dirty="0">
                 <a:latin typeface="Calibri" charset="0"/>
               </a:rPr>
               <a:t>COS 429 Computer Vision</a:t>
             </a:r>
+          </a:p>
+          <a:p>
             <a:endParaRPr lang="en-US" sz="3000" dirty="0">
               <a:latin typeface="Calibri" charset="0"/>
             </a:endParaRPr>
           </a:p>
           <a:p>
-            <a:endParaRPr lang="en-US" sz="3000" dirty="0">
-              <a:latin typeface="Calibri" charset="0"/>
-            </a:endParaRPr>
-          </a:p>
-          <a:p>
             <a:r>
-              <a:rPr lang="en-US" sz="3000" dirty="0" smtClean="0">
+              <a:rPr lang="en-US" sz="3000" dirty="0">
                 <a:latin typeface="Calibri" charset="0"/>
               </a:rPr>
               <a:t>Project Adviser: Kyle Genova</a:t>
@@ -3381,7 +3377,7 @@
               <a:defRPr/>
             </a:pPr>
             <a:r>
-              <a:rPr lang="en-US" sz="3200" b="0" dirty="0" smtClean="0">
+              <a:rPr lang="en-US" sz="3200" b="0" dirty="0">
                 <a:latin typeface="Calibri" charset="0"/>
               </a:rPr>
               <a:t>Traditional statistical methods and deep learning used in face recognition problems</a:t>
@@ -3394,7 +3390,7 @@
               <a:defRPr/>
             </a:pPr>
             <a:r>
-              <a:rPr lang="en-US" sz="3200" b="0" dirty="0" smtClean="0">
+              <a:rPr lang="en-US" sz="3200" b="0" dirty="0">
                 <a:latin typeface="Calibri" charset="0"/>
               </a:rPr>
               <a:t>Image manipulations from linear algebras, mimicking lens distortion, neural networks</a:t>
@@ -3407,14 +3403,11 @@
               <a:defRPr/>
             </a:pPr>
             <a:r>
-              <a:rPr lang="en-US" sz="3200" b="0" dirty="0" smtClean="0">
+              <a:rPr lang="en-US" sz="3200" b="0" dirty="0">
                 <a:latin typeface="Calibri" charset="0"/>
               </a:rPr>
               <a:t>Psychology indicates that image manipulation may equalize face recognition ability in human beings</a:t>
             </a:r>
-            <a:endParaRPr lang="en-US" sz="3200" b="0" dirty="0">
-              <a:latin typeface="Calibri" charset="0"/>
-            </a:endParaRPr>
           </a:p>
         </p:txBody>
       </p:sp>
@@ -3464,7 +3457,7 @@
           <a:lstStyle/>
           <a:p>
             <a:r>
-              <a:rPr lang="en-US" sz="4000" dirty="0" smtClean="0">
+              <a:rPr lang="en-US" sz="4000" dirty="0">
                 <a:solidFill>
                   <a:srgbClr val="FFFFFF"/>
                 </a:solidFill>
@@ -3531,7 +3524,7 @@
           <a:lstStyle/>
           <a:p>
             <a:r>
-              <a:rPr lang="en-US" sz="4000" dirty="0" smtClean="0">
+              <a:rPr lang="en-US" sz="4000" dirty="0">
                 <a:solidFill>
                   <a:srgbClr val="FFFFFF"/>
                 </a:solidFill>
@@ -3598,7 +3591,7 @@
           <a:lstStyle/>
           <a:p>
             <a:r>
-              <a:rPr lang="en-US" sz="4000" dirty="0" smtClean="0">
+              <a:rPr lang="en-US" sz="4000" dirty="0">
                 <a:solidFill>
                   <a:srgbClr val="FFFFFF"/>
                 </a:solidFill>
@@ -3645,16 +3638,10 @@
               <a:defRPr/>
             </a:pPr>
             <a:r>
-              <a:rPr lang="en-US" sz="3200" dirty="0" smtClean="0">
+              <a:rPr lang="en-US" sz="3200">
                 <a:latin typeface="Calibri" charset="0"/>
               </a:rPr>
-              <a:t>Face </a:t>
-            </a:r>
-            <a:r>
-              <a:rPr lang="en-US" sz="3200" dirty="0">
-                <a:latin typeface="Calibri" charset="0"/>
-              </a:rPr>
-              <a:t>recognition algorithms</a:t>
+              <a:t>Face recognition algorithms</a:t>
             </a:r>
           </a:p>
           <a:p>
@@ -3664,7 +3651,7 @@
               <a:defRPr/>
             </a:pPr>
             <a:r>
-              <a:rPr lang="en-US" sz="3200" b="0" dirty="0">
+              <a:rPr lang="en-US" sz="3200" b="0">
                 <a:latin typeface="Calibri" charset="0"/>
               </a:rPr>
               <a:t>PCA</a:t>
@@ -3677,7 +3664,7 @@
               <a:defRPr/>
             </a:pPr>
             <a:r>
-              <a:rPr lang="en-US" sz="3200" b="0" dirty="0">
+              <a:rPr lang="en-US" sz="3200" b="0">
                 <a:latin typeface="Calibri" charset="0"/>
               </a:rPr>
               <a:t>Sparse Representation</a:t>
@@ -3690,7 +3677,7 @@
               <a:defRPr/>
             </a:pPr>
             <a:r>
-              <a:rPr lang="en-US" sz="3200" b="0" dirty="0">
+              <a:rPr lang="en-US" sz="3200" b="0">
                 <a:latin typeface="Calibri" charset="0"/>
               </a:rPr>
               <a:t>With Dimension Reduction</a:t>
@@ -3703,7 +3690,7 @@
               <a:defRPr/>
             </a:pPr>
             <a:r>
-              <a:rPr lang="en-US" sz="3200" b="0" dirty="0">
+              <a:rPr lang="en-US" sz="3200" b="0">
                 <a:latin typeface="Calibri" charset="0"/>
               </a:rPr>
               <a:t>With Combined L1 Loss</a:t>
@@ -3716,20 +3703,17 @@
               <a:defRPr/>
             </a:pPr>
             <a:r>
-              <a:rPr lang="en-US" sz="3200" b="0" dirty="0" smtClean="0">
+              <a:rPr lang="en-US" sz="3200" b="0">
                 <a:latin typeface="Calibri" charset="0"/>
               </a:rPr>
               <a:t>VGG-FACE</a:t>
             </a:r>
-            <a:endParaRPr lang="en-US" sz="3200" b="0" dirty="0" smtClean="0">
-              <a:latin typeface="Calibri" charset="0"/>
-            </a:endParaRPr>
           </a:p>
           <a:p>
             <a:pPr>
               <a:defRPr/>
             </a:pPr>
-            <a:endParaRPr lang="en-US" sz="3200" b="0" dirty="0" smtClean="0">
+            <a:endParaRPr lang="en-US" sz="3200" b="0">
               <a:latin typeface="Calibri" charset="0"/>
             </a:endParaRPr>
           </a:p>
@@ -3738,16 +3722,10 @@
               <a:defRPr/>
             </a:pPr>
             <a:r>
-              <a:rPr lang="en-US" sz="3200" dirty="0" smtClean="0">
+              <a:rPr lang="en-US" sz="3200">
                 <a:latin typeface="Calibri" charset="0"/>
               </a:rPr>
-              <a:t>Image </a:t>
-            </a:r>
-            <a:r>
-              <a:rPr lang="en-US" sz="3200" dirty="0">
-                <a:latin typeface="Calibri" charset="0"/>
-              </a:rPr>
-              <a:t>Manipulations</a:t>
+              <a:t>Image Manipulations</a:t>
             </a:r>
           </a:p>
           <a:p>
@@ -3757,7 +3735,7 @@
               <a:defRPr/>
             </a:pPr>
             <a:r>
-              <a:rPr lang="en-US" sz="3200" b="0" dirty="0">
+              <a:rPr lang="en-US" sz="3200" b="0">
                 <a:latin typeface="Calibri" charset="0"/>
               </a:rPr>
               <a:t>Occlusion</a:t>
@@ -3770,7 +3748,7 @@
               <a:defRPr/>
             </a:pPr>
             <a:r>
-              <a:rPr lang="en-US" sz="3200" b="0" dirty="0">
+              <a:rPr lang="en-US" sz="3200" b="0">
                 <a:latin typeface="Calibri" charset="0"/>
               </a:rPr>
               <a:t>Radial Distortion</a:t>
@@ -3783,7 +3761,7 @@
               <a:defRPr/>
             </a:pPr>
             <a:r>
-              <a:rPr lang="en-US" sz="3200" b="0" dirty="0">
+              <a:rPr lang="en-US" sz="3200" b="0">
                 <a:latin typeface="Calibri" charset="0"/>
               </a:rPr>
               <a:t>Blur</a:t>
@@ -3796,16 +3774,10 @@
               <a:defRPr/>
             </a:pPr>
             <a:r>
-              <a:rPr lang="en-US" sz="3200" b="0" dirty="0">
+              <a:rPr lang="en-US" sz="3200" b="0">
                 <a:latin typeface="Calibri" charset="0"/>
               </a:rPr>
-              <a:t>Deep Feature </a:t>
-            </a:r>
-            <a:r>
-              <a:rPr lang="en-US" sz="3200" b="0" dirty="0" smtClean="0">
-                <a:latin typeface="Calibri" charset="0"/>
-              </a:rPr>
-              <a:t>Interpretation</a:t>
+              <a:t>Deep Feature Interpretation</a:t>
             </a:r>
           </a:p>
           <a:p>
@@ -3814,7 +3786,7 @@
               <a:buChar char="§"/>
               <a:defRPr/>
             </a:pPr>
-            <a:endParaRPr lang="en-US" sz="3200" b="0" dirty="0">
+            <a:endParaRPr lang="en-US" sz="3200" b="0">
               <a:latin typeface="Calibri" charset="0"/>
             </a:endParaRPr>
           </a:p>
@@ -3823,7 +3795,7 @@
               <a:defRPr/>
             </a:pPr>
             <a:r>
-              <a:rPr lang="en-US" sz="3200" dirty="0" smtClean="0">
+              <a:rPr lang="en-US" sz="3200">
                 <a:latin typeface="Calibri" charset="0"/>
               </a:rPr>
               <a:t>Dataset</a:t>
@@ -3834,14 +3806,11 @@
               <a:defRPr/>
             </a:pPr>
             <a:r>
-              <a:rPr lang="en-US" sz="3200" b="0" dirty="0" smtClean="0">
+              <a:rPr lang="en-US" sz="3200" b="0">
                 <a:latin typeface="Calibri" charset="0"/>
               </a:rPr>
               <a:t>Labeled Faces in the Wild (LFW)</a:t>
             </a:r>
-            <a:endParaRPr lang="en-US" sz="3200" b="0" dirty="0">
-              <a:latin typeface="Calibri" charset="0"/>
-            </a:endParaRPr>
           </a:p>
           <a:p>
             <a:pPr marL="1200150" lvl="1" indent="-742950">
@@ -3849,7 +3818,7 @@
               <a:buChar char="§"/>
               <a:defRPr/>
             </a:pPr>
-            <a:endParaRPr lang="en-US" sz="3200" b="0" dirty="0">
+            <a:endParaRPr lang="en-US" sz="3200" b="0">
               <a:latin typeface="Calibri" charset="0"/>
             </a:endParaRPr>
           </a:p>
@@ -3918,7 +3887,7 @@
           <a:lstStyle/>
           <a:p>
             <a:r>
-              <a:rPr lang="en-US" b="0" smtClean="0">
+              <a:rPr lang="en-US" b="0">
                 <a:latin typeface="Calibri" charset="0"/>
               </a:rPr>
               <a:t>Blur</a:t>
@@ -3980,7 +3949,7 @@
           <a:lstStyle/>
           <a:p>
             <a:r>
-              <a:rPr lang="en-US" b="0" dirty="0" smtClean="0">
+              <a:rPr lang="en-US" b="0" dirty="0">
                 <a:latin typeface="Calibri" charset="0"/>
               </a:rPr>
               <a:t>Occlusion</a:t>
@@ -4042,7 +4011,7 @@
           <a:lstStyle/>
           <a:p>
             <a:r>
-              <a:rPr lang="en-US" b="0" dirty="0" smtClean="0">
+              <a:rPr lang="en-US" b="0" dirty="0">
                 <a:latin typeface="Calibri" charset="0"/>
               </a:rPr>
               <a:t>Radial Distortion</a:t>
@@ -4074,7 +4043,7 @@
           <a:lstStyle/>
           <a:p>
             <a:r>
-              <a:rPr lang="en-US" b="0" dirty="0" smtClean="0">
+              <a:rPr lang="en-US" b="0" dirty="0">
                 <a:latin typeface="Calibri" charset="0"/>
               </a:rPr>
               <a:t>Deep Feature Interpretation</a:t>
@@ -4091,8 +4060,8 @@
         </p:nvSpPr>
         <p:spPr>
           <a:xfrm>
-            <a:off x="15654528" y="13972032"/>
-            <a:ext cx="4151372" cy="830997"/>
+            <a:off x="15479885" y="12740429"/>
+            <a:ext cx="4151372" cy="1938992"/>
           </a:xfrm>
           <a:prstGeom prst="rect">
             <a:avLst/>
@@ -4106,10 +4075,9 @@
           <a:lstStyle/>
           <a:p>
             <a:r>
-              <a:rPr lang="en-US" dirty="0" smtClean="0"/>
-              <a:t>Any way to represent the algorithms visually?</a:t>
+              <a:rPr lang="en-US" dirty="0"/>
+              <a:t>Any way to represent the algorithms visually? We could make flow charts of what they do? Or add equations representing what they do.</a:t>
             </a:r>
-            <a:endParaRPr lang="en-US" dirty="0"/>
           </a:p>
         </p:txBody>
       </p:sp>
@@ -4136,16 +4104,50 @@
           <a:lstStyle/>
           <a:p>
             <a:r>
-              <a:rPr lang="en-US" smtClean="0"/>
+              <a:rPr lang="en-US"/>
               <a:t>Annoying blank space here </a:t>
             </a:r>
             <a:r>
-              <a:rPr lang="en-US" smtClean="0">
+              <a:rPr lang="en-US">
                 <a:sym typeface="Wingdings"/>
               </a:rPr>
               <a:t></a:t>
             </a:r>
             <a:endParaRPr lang="en-US" dirty="0"/>
+          </a:p>
+        </p:txBody>
+      </p:sp>
+      <p:sp>
+        <p:nvSpPr>
+          <p:cNvPr id="2" name="Rectangle 1">
+            <a:extLst>
+              <a:ext uri="{FF2B5EF4-FFF2-40B4-BE49-F238E27FC236}">
+                <a16:creationId xmlns:a16="http://schemas.microsoft.com/office/drawing/2014/main" id="{F56CF026-2437-400B-8D77-36D9BD54E57E}"/>
+              </a:ext>
+            </a:extLst>
+          </p:cNvPr>
+          <p:cNvSpPr/>
+          <p:nvPr/>
+        </p:nvSpPr>
+        <p:spPr>
+          <a:xfrm rot="10377139" flipV="1">
+            <a:off x="13490792" y="22073186"/>
+            <a:ext cx="8129556" cy="830997"/>
+          </a:xfrm>
+          <a:prstGeom prst="rect">
+            <a:avLst/>
+          </a:prstGeom>
+        </p:spPr>
+        <p:txBody>
+          <a:bodyPr wrap="square">
+            <a:spAutoFit/>
+          </a:bodyPr>
+          <a:lstStyle/>
+          <a:p>
+            <a:r>
+              <a:rPr lang="en-US" dirty="0"/>
+              <a:t>If there’s space, could describe the algorithms here and put the results in the other column.</a:t>
+            </a:r>
           </a:p>
         </p:txBody>
       </p:sp>
@@ -4154,13 +4156,6 @@
   <p:clrMapOvr>
     <a:masterClrMapping/>
   </p:clrMapOvr>
-  <p:timing>
-    <p:tnLst>
-      <p:par>
-        <p:cTn id="1" dur="indefinite" restart="never" nodeType="tmRoot"/>
-      </p:par>
-    </p:tnLst>
-  </p:timing>
 </p:sld>
 </file>
 

</xml_diff>

<commit_message>
Add descriptions and TODOs to poster.
</commit_message>
<xml_diff>
--- a/poster.pptx
+++ b/poster.pptx
@@ -1653,7 +1653,7 @@
                   </a:solidFill>
                   <a:latin typeface="Calibri" charset="0"/>
                 </a:rPr>
-                <a:t>Humans can often recognize faces even if it is distorted or occluded</a:t>
+                <a:t>Humans can often recognize faces even if they are distorted or occluded.</a:t>
               </a:r>
             </a:p>
             <a:p>
@@ -1669,7 +1669,7 @@
                   </a:solidFill>
                   <a:latin typeface="Calibri" charset="0"/>
                 </a:rPr>
-                <a:t>Computer facial recognition applications must continue to recognize faces even when the face may look slightly different</a:t>
+                <a:t>Computer facial recognition applications must continue to recognize faces even when the face may look slightly different.</a:t>
               </a:r>
             </a:p>
             <a:p>
@@ -1678,7 +1678,7 @@
                 <a:buChar char="§"/>
                 <a:defRPr/>
               </a:pPr>
-              <a:endParaRPr lang="en-US" sz="3200" dirty="0">
+              <a:endParaRPr lang="en-US" sz="1600" dirty="0">
                 <a:solidFill>
                   <a:schemeClr val="tx1"/>
                 </a:solidFill>
@@ -1707,7 +1707,7 @@
                   </a:solidFill>
                   <a:latin typeface="Calibri" charset="0"/>
                 </a:rPr>
-                <a:t> Implement/use a variety of face recognition algorithms and implement image manipulations. Analyze the impact of each manipulation on the accuracy of the algorithms.</a:t>
+                <a:t> Implement and use a variety of face recognition algorithms and implement image manipulations. Analyze the impact of each manipulation on the accuracy of the algorithms.</a:t>
               </a:r>
               <a:endParaRPr lang="en-US" sz="3200" dirty="0">
                 <a:solidFill>
@@ -1813,8 +1813,8 @@
         </p:nvGrpSpPr>
         <p:grpSpPr bwMode="auto">
           <a:xfrm>
-            <a:off x="685799" y="14854425"/>
-            <a:ext cx="11177000" cy="8938532"/>
+            <a:off x="718473" y="14225623"/>
+            <a:ext cx="11177000" cy="12923792"/>
             <a:chOff x="990599" y="3962400"/>
             <a:chExt cx="9645905" cy="3919887"/>
           </a:xfrm>
@@ -1942,7 +1942,7 @@
                   <a:ea typeface="ＭＳ Ｐゴシック" charset="-128"/>
                   <a:cs typeface="ＭＳ Ｐゴシック" charset="-128"/>
                 </a:rPr>
-                <a:t> Methods</a:t>
+                <a:t>Face Recognition</a:t>
               </a:r>
               <a:endParaRPr lang="en-US" sz="4400" dirty="0">
                 <a:solidFill>
@@ -2184,7 +2184,41 @@
                   <a:latin typeface="Calibri" charset="0"/>
                   <a:sym typeface="Wingdings"/>
                 </a:rPr>
-                <a:t> (PCA, Sparse Representation)</a:t>
+                <a:t> by a large margin (PCA, Sparse </a:t>
+              </a:r>
+              <a:r>
+                <a:rPr lang="en-US" sz="3200" b="0">
+                  <a:solidFill>
+                    <a:schemeClr val="tx1"/>
+                  </a:solidFill>
+                  <a:latin typeface="Calibri" charset="0"/>
+                  <a:sym typeface="Wingdings"/>
+                </a:rPr>
+                <a:t>Representation).</a:t>
+              </a:r>
+              <a:endParaRPr lang="en-US" sz="3200" b="0" dirty="0">
+                <a:solidFill>
+                  <a:schemeClr val="tx1"/>
+                </a:solidFill>
+                <a:latin typeface="Calibri" charset="0"/>
+                <a:sym typeface="Wingdings"/>
+              </a:endParaRPr>
+            </a:p>
+            <a:p>
+              <a:pPr marL="742950" indent="-742950">
+                <a:buFont typeface="Wingdings" charset="2"/>
+                <a:buChar char="§"/>
+                <a:defRPr/>
+              </a:pPr>
+              <a:r>
+                <a:rPr lang="en-US" sz="3200" b="0" dirty="0">
+                  <a:solidFill>
+                    <a:schemeClr val="tx1"/>
+                  </a:solidFill>
+                  <a:latin typeface="Calibri" charset="0"/>
+                  <a:sym typeface="Wingdings"/>
+                </a:rPr>
+                <a:t>Overall decrease in performance across all algorithms for manipulated images.</a:t>
               </a:r>
             </a:p>
             <a:p>
@@ -2201,24 +2235,7 @@
                   <a:latin typeface="Calibri" charset="0"/>
                   <a:sym typeface="Wingdings"/>
                 </a:rPr>
-                <a:t>Overall decrease in performance across all algorithms for manipulated images</a:t>
-              </a:r>
-            </a:p>
-            <a:p>
-              <a:pPr marL="742950" indent="-742950">
-                <a:buFont typeface="Wingdings" charset="2"/>
-                <a:buChar char="§"/>
-                <a:defRPr/>
-              </a:pPr>
-              <a:r>
-                <a:rPr lang="en-US" sz="3200" b="0" dirty="0">
-                  <a:solidFill>
-                    <a:schemeClr val="tx1"/>
-                  </a:solidFill>
-                  <a:latin typeface="Calibri" charset="0"/>
-                  <a:sym typeface="Wingdings"/>
-                </a:rPr>
-                <a:t>Manipulation specifics</a:t>
+                <a:t>[MANIPULATION SPECIFICS]</a:t>
               </a:r>
             </a:p>
             <a:p>
@@ -2315,7 +2332,7 @@
         <p:grpSpPr bwMode="auto">
           <a:xfrm>
             <a:off x="12216399" y="5695329"/>
-            <a:ext cx="23603346" cy="21150502"/>
+            <a:ext cx="23603346" cy="21454086"/>
             <a:chOff x="685800" y="11108124"/>
             <a:chExt cx="20883753" cy="15661818"/>
           </a:xfrm>
@@ -2384,7 +2401,7 @@
           <p:spPr>
             <a:xfrm>
               <a:off x="770149" y="19331351"/>
-              <a:ext cx="10525404" cy="3714879"/>
+              <a:ext cx="10525404" cy="1145876"/>
             </a:xfrm>
             <a:prstGeom prst="rect">
               <a:avLst/>
@@ -2414,85 +2431,8 @@
                 <a:rPr lang="en-US" sz="3200" b="0" dirty="0">
                   <a:latin typeface="Calibri" charset="0"/>
                 </a:rPr>
-                <a:t>[Graph of results on no manipulation task with different splits]</a:t>
+                <a:t>We test our algorithms on un-manipulated images with different amounts of train faces to mimic different real-world scenarios.</a:t>
               </a:r>
-            </a:p>
-            <a:p>
-              <a:pPr>
-                <a:defRPr/>
-              </a:pPr>
-              <a:r>
-                <a:rPr lang="en-US" sz="3200" b="0" dirty="0">
-                  <a:latin typeface="Calibri" charset="0"/>
-                </a:rPr>
-                <a:t>[Motivation: different amounts of training data to represent different cases.]</a:t>
-              </a:r>
-            </a:p>
-            <a:p>
-              <a:pPr>
-                <a:defRPr/>
-              </a:pPr>
-              <a:endParaRPr lang="en-US" sz="3200" b="0" dirty="0">
-                <a:latin typeface="Calibri" charset="0"/>
-              </a:endParaRPr>
-            </a:p>
-            <a:p>
-              <a:pPr>
-                <a:defRPr/>
-              </a:pPr>
-              <a:endParaRPr lang="en-US" sz="3200" b="0" dirty="0">
-                <a:latin typeface="Calibri" charset="0"/>
-              </a:endParaRPr>
-            </a:p>
-            <a:p>
-              <a:pPr>
-                <a:defRPr/>
-              </a:pPr>
-              <a:r>
-                <a:rPr lang="en-US" sz="3200" dirty="0">
-                  <a:latin typeface="Calibri" charset="0"/>
-                </a:rPr>
-                <a:t>Performance with Distortion</a:t>
-              </a:r>
-            </a:p>
-            <a:p>
-              <a:pPr>
-                <a:defRPr/>
-              </a:pPr>
-              <a:r>
-                <a:rPr lang="en-US" sz="3200" b="0" dirty="0">
-                  <a:latin typeface="Calibri" charset="0"/>
-                </a:rPr>
-                <a:t>[Performance plots]</a:t>
-              </a:r>
-            </a:p>
-            <a:p>
-              <a:pPr>
-                <a:defRPr/>
-              </a:pPr>
-              <a:r>
-                <a:rPr lang="en-US" sz="3200" b="0" dirty="0">
-                  <a:latin typeface="Calibri" charset="0"/>
-                </a:rPr>
-                <a:t>[Plot change in performance vs </a:t>
-              </a:r>
-              <a:r>
-                <a:rPr lang="en-US" sz="3200" b="0">
-                  <a:latin typeface="Calibri" charset="0"/>
-                </a:rPr>
-                <a:t>baseline performance]</a:t>
-              </a:r>
-              <a:endParaRPr lang="en-US" sz="3200" b="0" dirty="0">
-                <a:latin typeface="Calibri" charset="0"/>
-              </a:endParaRPr>
-            </a:p>
-            <a:p>
-              <a:pPr>
-                <a:defRPr/>
-              </a:pPr>
-              <a:endParaRPr lang="en-US" sz="3200" b="0" dirty="0">
-                <a:latin typeface="Calibri" charset="0"/>
-              </a:endParaRPr>
             </a:p>
           </p:txBody>
         </p:sp>
@@ -2505,7 +2445,7 @@
           <p:spPr>
             <a:xfrm>
               <a:off x="11788543" y="11108124"/>
-              <a:ext cx="9781010" cy="433022"/>
+              <a:ext cx="9781010" cy="1145876"/>
             </a:xfrm>
             <a:prstGeom prst="rect">
               <a:avLst/>
@@ -2517,16 +2457,25 @@
             </a:bodyPr>
             <a:lstStyle/>
             <a:p>
-              <a:pPr marL="742950" indent="-742950">
-                <a:buFont typeface="Wingdings" charset="2"/>
-                <a:buChar char="§"/>
+              <a:pPr>
                 <a:defRPr/>
               </a:pPr>
               <a:r>
                 <a:rPr lang="en-US" sz="3200" b="0" dirty="0">
                   <a:latin typeface="Calibri" charset="0"/>
                 </a:rPr>
-                <a:t>More results</a:t>
+                <a:t>[EITHER OVERFLOW FROM OTHER RESULTS OR PLOT OF CHANGE IN PERFORMANCE VS DISTORTION FOR DIFFERENT ALGORITHMS]</a:t>
+              </a:r>
+            </a:p>
+            <a:p>
+              <a:pPr>
+                <a:defRPr/>
+              </a:pPr>
+              <a:r>
+                <a:rPr lang="en-US" sz="3200" b="0" dirty="0">
+                  <a:latin typeface="Calibri" charset="0"/>
+                </a:rPr>
+                <a:t>OR SPLIT INTO VGG AND NON-VGG?</a:t>
               </a:r>
             </a:p>
           </p:txBody>
@@ -2540,7 +2489,7 @@
         </p:nvSpPr>
         <p:spPr bwMode="auto">
           <a:xfrm>
-            <a:off x="685799" y="25354358"/>
+            <a:off x="24765000" y="25656444"/>
             <a:ext cx="11176999" cy="1468041"/>
           </a:xfrm>
           <a:prstGeom prst="rect">
@@ -2597,6 +2546,26 @@
                 <a:sym typeface="Wingdings" pitchFamily="2" charset="2"/>
               </a:rPr>
               <a:t>Russakovsky</a:t>
+            </a:r>
+            <a:r>
+              <a:rPr lang="en-US" sz="3200" b="0" dirty="0">
+                <a:solidFill>
+                  <a:schemeClr val="tx1"/>
+                </a:solidFill>
+                <a:latin typeface="Calibri" pitchFamily="34" charset="0"/>
+                <a:sym typeface="Wingdings" pitchFamily="2" charset="2"/>
+              </a:rPr>
+              <a:t>, Dr. Andras </a:t>
+            </a:r>
+            <a:r>
+              <a:rPr lang="en-US" sz="3200" b="0" dirty="0" err="1">
+                <a:solidFill>
+                  <a:schemeClr val="tx1"/>
+                </a:solidFill>
+                <a:latin typeface="Calibri" pitchFamily="34" charset="0"/>
+                <a:sym typeface="Wingdings" pitchFamily="2" charset="2"/>
+              </a:rPr>
+              <a:t>Ferencz</a:t>
             </a:r>
             <a:endParaRPr lang="en-US" sz="3200" b="0" dirty="0">
               <a:solidFill>
@@ -2780,7 +2749,7 @@
                 <a:ea typeface="ＭＳ Ｐゴシック" charset="-128"/>
                 <a:cs typeface="ＭＳ Ｐゴシック" charset="-128"/>
               </a:rPr>
-              <a:t> Implementation</a:t>
+              <a:t>Face Manipulation</a:t>
             </a:r>
             <a:endParaRPr lang="en-US" sz="4400" dirty="0">
               <a:solidFill>
@@ -2841,7 +2810,7 @@
         <p:spPr bwMode="auto">
           <a:xfrm>
             <a:off x="685801" y="10580517"/>
-            <a:ext cx="11176997" cy="3724360"/>
+            <a:ext cx="11176997" cy="3222566"/>
           </a:xfrm>
           <a:prstGeom prst="rect">
             <a:avLst/>
@@ -3025,10 +2994,10 @@
         </p:nvGrpSpPr>
         <p:grpSpPr bwMode="auto">
           <a:xfrm>
-            <a:off x="24739075" y="18193806"/>
-            <a:ext cx="11156565" cy="8652030"/>
+            <a:off x="24739075" y="18193804"/>
+            <a:ext cx="11156565" cy="6299285"/>
             <a:chOff x="990600" y="3962400"/>
-            <a:chExt cx="9601201" cy="4863697"/>
+            <a:chExt cx="9601201" cy="2593267"/>
           </a:xfrm>
         </p:grpSpPr>
         <p:sp>
@@ -3040,7 +3009,7 @@
           <p:spPr>
             <a:xfrm>
               <a:off x="990600" y="4474368"/>
-              <a:ext cx="9601201" cy="4351729"/>
+              <a:ext cx="9601201" cy="2081299"/>
             </a:xfrm>
             <a:prstGeom prst="rect">
               <a:avLst/>
@@ -3180,27 +3149,20 @@
                 </a:rPr>
                 <a:t>[3] </a:t>
               </a:r>
+            </a:p>
+            <a:p>
               <a:endParaRPr lang="en-US" sz="2500" b="0" dirty="0">
+                <a:solidFill>
+                  <a:schemeClr val="tx1"/>
+                </a:solidFill>
                 <a:latin typeface="Calibri" charset="0"/>
                 <a:ea typeface="Calibri" charset="0"/>
                 <a:cs typeface="Calibri" charset="0"/>
               </a:endParaRPr>
             </a:p>
             <a:p>
-              <a:endParaRPr lang="en-US" sz="2500" b="0" dirty="0">
-                <a:latin typeface="Calibri" charset="0"/>
-                <a:ea typeface="Calibri" charset="0"/>
-                <a:cs typeface="Calibri" charset="0"/>
-              </a:endParaRPr>
-            </a:p>
-            <a:p>
-              <a:pPr marL="457200" indent="-457200">
-                <a:buFont typeface="Wingdings" charset="2"/>
-                <a:buChar char="§"/>
-                <a:defRPr/>
-              </a:pPr>
               <a:r>
-                <a:rPr lang="en-US" sz="2500" dirty="0">
+                <a:rPr lang="en-US" sz="2500" b="0" dirty="0">
                   <a:solidFill>
                     <a:schemeClr val="tx1"/>
                   </a:solidFill>
@@ -3208,8 +3170,13 @@
                   <a:ea typeface="Calibri" charset="0"/>
                   <a:cs typeface="Calibri" charset="0"/>
                 </a:rPr>
-                <a:t>Just copy over from paper?</a:t>
+                <a:t>[ADD AT THE END AND FILL IN [X] IN REST OF POSTER]</a:t>
               </a:r>
+              <a:endParaRPr lang="en-US" sz="2500" b="0" dirty="0">
+                <a:latin typeface="Calibri" charset="0"/>
+                <a:ea typeface="Calibri" charset="0"/>
+                <a:cs typeface="Calibri" charset="0"/>
+              </a:endParaRPr>
             </a:p>
           </p:txBody>
         </p:sp>
@@ -3380,7 +3347,7 @@
               <a:rPr lang="en-US" sz="3200" b="0" dirty="0">
                 <a:latin typeface="Calibri" charset="0"/>
               </a:rPr>
-              <a:t>Traditional statistical methods and deep learning used in face recognition problems</a:t>
+              <a:t>Traditional statistical methods and deep learning used in face recognition problems.</a:t>
             </a:r>
           </a:p>
           <a:p>
@@ -3393,7 +3360,7 @@
               <a:rPr lang="en-US" sz="3200" b="0" dirty="0">
                 <a:latin typeface="Calibri" charset="0"/>
               </a:rPr>
-              <a:t>Image manipulations from linear algebras, mimicking lens distortion, neural networks</a:t>
+              <a:t>Image manipulations from linear algebras, mimicking lens distortion, neural networks.</a:t>
             </a:r>
           </a:p>
           <a:p>
@@ -3406,7 +3373,7 @@
               <a:rPr lang="en-US" sz="3200" b="0" dirty="0">
                 <a:latin typeface="Calibri" charset="0"/>
               </a:rPr>
-              <a:t>Psychology indicates that image manipulation may equalize face recognition ability in human beings</a:t>
+              <a:t>Psychology indicates that image manipulation may equalize face recognition ability in human beings. [X]</a:t>
             </a:r>
           </a:p>
         </p:txBody>
@@ -3419,7 +3386,7 @@
         </p:nvSpPr>
         <p:spPr bwMode="auto">
           <a:xfrm>
-            <a:off x="685800" y="24493090"/>
+            <a:off x="24765001" y="24795176"/>
             <a:ext cx="11195959" cy="886952"/>
           </a:xfrm>
           <a:prstGeom prst="rect">
@@ -3612,293 +3579,846 @@
           </a:p>
         </p:txBody>
       </p:sp>
-      <p:sp>
-        <p:nvSpPr>
-          <p:cNvPr id="11" name="TextBox 10"/>
-          <p:cNvSpPr txBox="1"/>
-          <p:nvPr/>
-        </p:nvSpPr>
-        <p:spPr>
-          <a:xfrm>
-            <a:off x="756256" y="16107221"/>
-            <a:ext cx="11125504" cy="8463855"/>
-          </a:xfrm>
-          <a:prstGeom prst="rect">
-            <a:avLst/>
-          </a:prstGeom>
-          <a:noFill/>
-        </p:spPr>
-        <p:txBody>
-          <a:bodyPr wrap="square" rtlCol="0">
-            <a:spAutoFit/>
-          </a:bodyPr>
-          <a:lstStyle/>
-          <a:p>
-            <a:pPr>
-              <a:defRPr/>
-            </a:pPr>
-            <a:r>
-              <a:rPr lang="en-US" sz="3200">
-                <a:latin typeface="Calibri" charset="0"/>
-              </a:rPr>
-              <a:t>Face recognition algorithms</a:t>
-            </a:r>
-          </a:p>
-          <a:p>
-            <a:pPr marL="457200" indent="-457200">
-              <a:buFont typeface="Arial" charset="0"/>
-              <a:buChar char="•"/>
-              <a:defRPr/>
-            </a:pPr>
-            <a:r>
-              <a:rPr lang="en-US" sz="3200" b="0">
-                <a:latin typeface="Calibri" charset="0"/>
-              </a:rPr>
-              <a:t>PCA</a:t>
-            </a:r>
-          </a:p>
-          <a:p>
-            <a:pPr marL="457200" indent="-457200">
-              <a:buFont typeface="Arial" charset="0"/>
-              <a:buChar char="•"/>
-              <a:defRPr/>
-            </a:pPr>
-            <a:r>
-              <a:rPr lang="en-US" sz="3200" b="0">
-                <a:latin typeface="Calibri" charset="0"/>
-              </a:rPr>
-              <a:t>Sparse Representation</a:t>
-            </a:r>
-          </a:p>
-          <a:p>
-            <a:pPr marL="914400" lvl="1" indent="-457200">
-              <a:buFont typeface="Arial" charset="0"/>
-              <a:buChar char="•"/>
-              <a:defRPr/>
-            </a:pPr>
-            <a:r>
-              <a:rPr lang="en-US" sz="3200" b="0">
-                <a:latin typeface="Calibri" charset="0"/>
-              </a:rPr>
-              <a:t>With Dimension Reduction</a:t>
-            </a:r>
-          </a:p>
-          <a:p>
-            <a:pPr marL="914400" lvl="1" indent="-457200">
-              <a:buFont typeface="Arial" charset="0"/>
-              <a:buChar char="•"/>
-              <a:defRPr/>
-            </a:pPr>
-            <a:r>
-              <a:rPr lang="en-US" sz="3200" b="0">
-                <a:latin typeface="Calibri" charset="0"/>
-              </a:rPr>
-              <a:t>With Combined L1 Loss</a:t>
-            </a:r>
-          </a:p>
-          <a:p>
-            <a:pPr marL="457200" indent="-457200">
-              <a:buFont typeface="Arial" charset="0"/>
-              <a:buChar char="•"/>
-              <a:defRPr/>
-            </a:pPr>
-            <a:r>
-              <a:rPr lang="en-US" sz="3200" b="0">
-                <a:latin typeface="Calibri" charset="0"/>
-              </a:rPr>
-              <a:t>VGG-FACE</a:t>
-            </a:r>
-          </a:p>
-          <a:p>
-            <a:pPr>
-              <a:defRPr/>
-            </a:pPr>
-            <a:endParaRPr lang="en-US" sz="3200" b="0">
-              <a:latin typeface="Calibri" charset="0"/>
-            </a:endParaRPr>
-          </a:p>
-          <a:p>
-            <a:pPr>
-              <a:defRPr/>
-            </a:pPr>
-            <a:r>
-              <a:rPr lang="en-US" sz="3200">
-                <a:latin typeface="Calibri" charset="0"/>
-              </a:rPr>
-              <a:t>Image Manipulations</a:t>
-            </a:r>
-          </a:p>
-          <a:p>
-            <a:pPr marL="742950" indent="-742950">
-              <a:buFont typeface="Wingdings" charset="2"/>
-              <a:buChar char="§"/>
-              <a:defRPr/>
-            </a:pPr>
-            <a:r>
-              <a:rPr lang="en-US" sz="3200" b="0">
-                <a:latin typeface="Calibri" charset="0"/>
-              </a:rPr>
-              <a:t>Occlusion</a:t>
-            </a:r>
-          </a:p>
-          <a:p>
-            <a:pPr marL="742950" indent="-742950">
-              <a:buFont typeface="Wingdings" charset="2"/>
-              <a:buChar char="§"/>
-              <a:defRPr/>
-            </a:pPr>
-            <a:r>
-              <a:rPr lang="en-US" sz="3200" b="0">
-                <a:latin typeface="Calibri" charset="0"/>
-              </a:rPr>
-              <a:t>Radial Distortion</a:t>
-            </a:r>
-          </a:p>
-          <a:p>
-            <a:pPr marL="742950" indent="-742950">
-              <a:buFont typeface="Wingdings" charset="2"/>
-              <a:buChar char="§"/>
-              <a:defRPr/>
-            </a:pPr>
-            <a:r>
-              <a:rPr lang="en-US" sz="3200" b="0">
-                <a:latin typeface="Calibri" charset="0"/>
-              </a:rPr>
-              <a:t>Blur</a:t>
-            </a:r>
-          </a:p>
-          <a:p>
-            <a:pPr marL="742950" indent="-742950">
-              <a:buFont typeface="Wingdings" charset="2"/>
-              <a:buChar char="§"/>
-              <a:defRPr/>
-            </a:pPr>
-            <a:r>
-              <a:rPr lang="en-US" sz="3200" b="0">
-                <a:latin typeface="Calibri" charset="0"/>
-              </a:rPr>
-              <a:t>Deep Feature Interpretation</a:t>
-            </a:r>
-          </a:p>
-          <a:p>
-            <a:pPr marL="742950" indent="-742950">
-              <a:buFont typeface="Wingdings" charset="2"/>
-              <a:buChar char="§"/>
-              <a:defRPr/>
-            </a:pPr>
-            <a:endParaRPr lang="en-US" sz="3200" b="0">
-              <a:latin typeface="Calibri" charset="0"/>
-            </a:endParaRPr>
-          </a:p>
-          <a:p>
-            <a:pPr>
-              <a:defRPr/>
-            </a:pPr>
-            <a:r>
-              <a:rPr lang="en-US" sz="3200">
-                <a:latin typeface="Calibri" charset="0"/>
-              </a:rPr>
-              <a:t>Dataset</a:t>
-            </a:r>
-          </a:p>
-          <a:p>
-            <a:pPr>
-              <a:defRPr/>
-            </a:pPr>
-            <a:r>
-              <a:rPr lang="en-US" sz="3200" b="0">
-                <a:latin typeface="Calibri" charset="0"/>
-              </a:rPr>
-              <a:t>Labeled Faces in the Wild (LFW)</a:t>
-            </a:r>
-          </a:p>
-          <a:p>
-            <a:pPr marL="1200150" lvl="1" indent="-742950">
-              <a:buFont typeface="Wingdings" charset="2"/>
-              <a:buChar char="§"/>
-              <a:defRPr/>
-            </a:pPr>
-            <a:endParaRPr lang="en-US" sz="3200" b="0">
-              <a:latin typeface="Calibri" charset="0"/>
-            </a:endParaRPr>
-          </a:p>
-          <a:p>
-            <a:pPr marL="1200150" lvl="1" indent="-742950">
-              <a:buFont typeface="Wingdings" charset="2"/>
-              <a:buChar char="§"/>
-              <a:defRPr/>
-            </a:pPr>
-            <a:endParaRPr lang="en-US" sz="3200" b="0" dirty="0">
-              <a:latin typeface="Calibri" charset="0"/>
-            </a:endParaRPr>
-          </a:p>
-        </p:txBody>
-      </p:sp>
+      <mc:AlternateContent xmlns:mc="http://schemas.openxmlformats.org/markup-compatibility/2006">
+        <mc:Choice xmlns:a14="http://schemas.microsoft.com/office/drawing/2010/main" Requires="a14">
+          <p:sp>
+            <p:nvSpPr>
+              <p:cNvPr id="11" name="TextBox 10"/>
+              <p:cNvSpPr txBox="1"/>
+              <p:nvPr/>
+            </p:nvSpPr>
+            <p:spPr>
+              <a:xfrm>
+                <a:off x="788833" y="16524567"/>
+                <a:ext cx="11125504" cy="11679864"/>
+              </a:xfrm>
+              <a:prstGeom prst="rect">
+                <a:avLst/>
+              </a:prstGeom>
+              <a:noFill/>
+            </p:spPr>
+            <p:txBody>
+              <a:bodyPr wrap="square" rtlCol="0">
+                <a:spAutoFit/>
+              </a:bodyPr>
+              <a:lstStyle/>
+              <a:p>
+                <a:pPr>
+                  <a:defRPr/>
+                </a:pPr>
+                <a:r>
+                  <a:rPr lang="en-US" sz="3200" dirty="0">
+                    <a:latin typeface="Calibri" charset="0"/>
+                  </a:rPr>
+                  <a:t>Face recognition algorithms</a:t>
+                </a:r>
+              </a:p>
+              <a:p>
+                <a:pPr marL="457200" indent="-457200">
+                  <a:buFont typeface="Arial" charset="0"/>
+                  <a:buChar char="•"/>
+                  <a:defRPr/>
+                </a:pPr>
+                <a:r>
+                  <a:rPr lang="en-US" sz="3200" b="0" u="sng" dirty="0">
+                    <a:latin typeface="Calibri" charset="0"/>
+                  </a:rPr>
+                  <a:t>PCA</a:t>
+                </a:r>
+                <a:r>
+                  <a:rPr lang="en-US" sz="3200" b="0" dirty="0">
+                    <a:latin typeface="Calibri" charset="0"/>
+                  </a:rPr>
+                  <a:t>: Compute “eigenface” face projections of test image (</a:t>
+                </a:r>
+                <a14:m>
+                  <m:oMath xmlns:m="http://schemas.openxmlformats.org/officeDocument/2006/math">
+                    <m:r>
+                      <m:rPr>
+                        <m:sty m:val="p"/>
+                      </m:rPr>
+                      <a:rPr lang="en-US" sz="3200" b="0" i="0" smtClean="0">
+                        <a:latin typeface="Cambria Math" panose="02040503050406030204" pitchFamily="18" charset="0"/>
+                      </a:rPr>
+                      <m:t>Ω</m:t>
+                    </m:r>
+                  </m:oMath>
+                </a14:m>
+                <a:r>
+                  <a:rPr lang="en-US" sz="3200" b="0" dirty="0">
+                    <a:latin typeface="Calibri" charset="0"/>
+                  </a:rPr>
+                  <a:t>) and training images (</a:t>
+                </a:r>
+                <a14:m>
+                  <m:oMath xmlns:m="http://schemas.openxmlformats.org/officeDocument/2006/math">
+                    <m:sSub>
+                      <m:sSubPr>
+                        <m:ctrlPr>
+                          <a:rPr lang="en-US" sz="3200" b="0" i="1" smtClean="0">
+                            <a:latin typeface="Cambria Math" panose="02040503050406030204" pitchFamily="18" charset="0"/>
+                          </a:rPr>
+                        </m:ctrlPr>
+                      </m:sSubPr>
+                      <m:e>
+                        <m:r>
+                          <m:rPr>
+                            <m:sty m:val="p"/>
+                          </m:rPr>
+                          <a:rPr lang="en-US" sz="3200" b="0" i="0" smtClean="0">
+                            <a:latin typeface="Cambria Math" panose="02040503050406030204" pitchFamily="18" charset="0"/>
+                          </a:rPr>
+                          <m:t>Ω</m:t>
+                        </m:r>
+                      </m:e>
+                      <m:sub>
+                        <m:r>
+                          <a:rPr lang="en-US" sz="3200" b="0" i="1" smtClean="0">
+                            <a:latin typeface="Cambria Math" panose="02040503050406030204" pitchFamily="18" charset="0"/>
+                          </a:rPr>
+                          <m:t>𝑖</m:t>
+                        </m:r>
+                      </m:sub>
+                    </m:sSub>
+                  </m:oMath>
+                </a14:m>
+                <a:r>
+                  <a:rPr lang="en-US" sz="3200" b="0" dirty="0">
+                    <a:latin typeface="Calibri" charset="0"/>
+                  </a:rPr>
+                  <a:t>) and solve </a:t>
+                </a:r>
+                <a14:m>
+                  <m:oMath xmlns:m="http://schemas.openxmlformats.org/officeDocument/2006/math">
+                    <m:r>
+                      <a:rPr lang="en-US" sz="3200" b="0" i="1" smtClean="0">
+                        <a:latin typeface="Cambria Math" panose="02040503050406030204" pitchFamily="18" charset="0"/>
+                      </a:rPr>
+                      <m:t>𝑙𝑎𝑏𝑒𝑙</m:t>
+                    </m:r>
+                    <m:r>
+                      <a:rPr lang="en-US" sz="3200" b="0" i="1" smtClean="0">
+                        <a:latin typeface="Cambria Math" panose="02040503050406030204" pitchFamily="18" charset="0"/>
+                      </a:rPr>
+                      <m:t>(</m:t>
+                    </m:r>
+                    <m:r>
+                      <a:rPr lang="en-US" sz="3200" b="0" i="1" smtClean="0">
+                        <a:latin typeface="Cambria Math" panose="02040503050406030204" pitchFamily="18" charset="0"/>
+                      </a:rPr>
+                      <m:t>𝑎𝑟𝑔𝑚𝑖</m:t>
+                    </m:r>
+                    <m:sSub>
+                      <m:sSubPr>
+                        <m:ctrlPr>
+                          <a:rPr lang="en-US" sz="3200" b="0" i="1" smtClean="0">
+                            <a:latin typeface="Cambria Math" panose="02040503050406030204" pitchFamily="18" charset="0"/>
+                          </a:rPr>
+                        </m:ctrlPr>
+                      </m:sSubPr>
+                      <m:e>
+                        <m:r>
+                          <a:rPr lang="en-US" sz="3200" b="0" i="1" smtClean="0">
+                            <a:latin typeface="Cambria Math" panose="02040503050406030204" pitchFamily="18" charset="0"/>
+                          </a:rPr>
+                          <m:t>𝑛</m:t>
+                        </m:r>
+                      </m:e>
+                      <m:sub>
+                        <m:r>
+                          <a:rPr lang="en-US" sz="3200" b="0" i="1" smtClean="0">
+                            <a:latin typeface="Cambria Math" panose="02040503050406030204" pitchFamily="18" charset="0"/>
+                          </a:rPr>
+                          <m:t>𝑖</m:t>
+                        </m:r>
+                      </m:sub>
+                    </m:sSub>
+                    <m:sSub>
+                      <m:sSubPr>
+                        <m:ctrlPr>
+                          <a:rPr lang="en-US" sz="3200" b="0" i="1" smtClean="0">
+                            <a:latin typeface="Cambria Math" panose="02040503050406030204" pitchFamily="18" charset="0"/>
+                          </a:rPr>
+                        </m:ctrlPr>
+                      </m:sSubPr>
+                      <m:e>
+                        <m:d>
+                          <m:dPr>
+                            <m:begChr m:val="|"/>
+                            <m:endChr m:val="|"/>
+                            <m:ctrlPr>
+                              <a:rPr lang="en-US" sz="3200" b="0" i="1" smtClean="0">
+                                <a:latin typeface="Cambria Math" panose="02040503050406030204" pitchFamily="18" charset="0"/>
+                              </a:rPr>
+                            </m:ctrlPr>
+                          </m:dPr>
+                          <m:e>
+                            <m:d>
+                              <m:dPr>
+                                <m:begChr m:val="|"/>
+                                <m:endChr m:val="|"/>
+                                <m:ctrlPr>
+                                  <a:rPr lang="en-US" sz="3200" b="0" i="1" smtClean="0">
+                                    <a:latin typeface="Cambria Math" panose="02040503050406030204" pitchFamily="18" charset="0"/>
+                                  </a:rPr>
+                                </m:ctrlPr>
+                              </m:dPr>
+                              <m:e>
+                                <m:r>
+                                  <m:rPr>
+                                    <m:sty m:val="p"/>
+                                  </m:rPr>
+                                  <a:rPr lang="en-US" sz="3200" b="0" i="0" smtClean="0">
+                                    <a:latin typeface="Cambria Math" panose="02040503050406030204" pitchFamily="18" charset="0"/>
+                                  </a:rPr>
+                                  <m:t>Ω</m:t>
+                                </m:r>
+                                <m:r>
+                                  <a:rPr lang="en-US" sz="3200" b="0" i="1" smtClean="0">
+                                    <a:latin typeface="Cambria Math" panose="02040503050406030204" pitchFamily="18" charset="0"/>
+                                  </a:rPr>
+                                  <m:t>−</m:t>
+                                </m:r>
+                                <m:r>
+                                  <m:rPr>
+                                    <m:sty m:val="p"/>
+                                  </m:rPr>
+                                  <a:rPr lang="en-US" sz="3200" b="0" i="0" smtClean="0">
+                                    <a:latin typeface="Cambria Math" panose="02040503050406030204" pitchFamily="18" charset="0"/>
+                                  </a:rPr>
+                                  <m:t>Ω</m:t>
+                                </m:r>
+                                <m:r>
+                                  <a:rPr lang="en-US" sz="3200" b="0" i="1" smtClean="0">
+                                    <a:latin typeface="Cambria Math" panose="02040503050406030204" pitchFamily="18" charset="0"/>
+                                  </a:rPr>
+                                  <m:t>𝑖</m:t>
+                                </m:r>
+                              </m:e>
+                            </m:d>
+                          </m:e>
+                        </m:d>
+                      </m:e>
+                      <m:sub>
+                        <m:r>
+                          <a:rPr lang="en-US" sz="3200" b="0" i="1" smtClean="0">
+                            <a:latin typeface="Cambria Math" panose="02040503050406030204" pitchFamily="18" charset="0"/>
+                          </a:rPr>
+                          <m:t>2</m:t>
+                        </m:r>
+                      </m:sub>
+                    </m:sSub>
+                    <m:r>
+                      <a:rPr lang="en-US" sz="3200" b="0" i="1" smtClean="0">
+                        <a:latin typeface="Cambria Math" panose="02040503050406030204" pitchFamily="18" charset="0"/>
+                      </a:rPr>
+                      <m:t>)</m:t>
+                    </m:r>
+                  </m:oMath>
+                </a14:m>
+                <a:r>
+                  <a:rPr lang="en-US" sz="3200" b="0" dirty="0">
+                    <a:latin typeface="Calibri" charset="0"/>
+                  </a:rPr>
+                  <a:t>. [X]</a:t>
+                </a:r>
+              </a:p>
+              <a:p>
+                <a:pPr marL="457200" indent="-457200">
+                  <a:buFont typeface="Arial" charset="0"/>
+                  <a:buChar char="•"/>
+                  <a:defRPr/>
+                </a:pPr>
+                <a:r>
+                  <a:rPr lang="en-US" sz="3200" b="0" u="sng" dirty="0">
+                    <a:latin typeface="Calibri" charset="0"/>
+                  </a:rPr>
+                  <a:t>Sparse Representation</a:t>
+                </a:r>
+                <a:r>
+                  <a:rPr lang="en-US" sz="3200" b="0" dirty="0">
+                    <a:latin typeface="Calibri" charset="0"/>
+                  </a:rPr>
+                  <a:t>: Encode test image as sparse representation of training faces (For test image </a:t>
+                </a:r>
+                <a14:m>
+                  <m:oMath xmlns:m="http://schemas.openxmlformats.org/officeDocument/2006/math">
+                    <m:r>
+                      <a:rPr lang="en-US" sz="3200" b="0" i="1" smtClean="0">
+                        <a:latin typeface="Cambria Math" panose="02040503050406030204" pitchFamily="18" charset="0"/>
+                      </a:rPr>
+                      <m:t>𝑦</m:t>
+                    </m:r>
+                  </m:oMath>
+                </a14:m>
+                <a:r>
+                  <a:rPr lang="en-US" sz="3200" b="0" dirty="0">
+                    <a:latin typeface="Calibri" charset="0"/>
+                  </a:rPr>
+                  <a:t> and  train images </a:t>
+                </a:r>
+                <a14:m>
+                  <m:oMath xmlns:m="http://schemas.openxmlformats.org/officeDocument/2006/math">
+                    <m:r>
+                      <m:rPr>
+                        <m:sty m:val="p"/>
+                      </m:rPr>
+                      <a:rPr lang="en-US" sz="3200" b="0" i="0" smtClean="0">
+                        <a:latin typeface="Cambria Math" panose="02040503050406030204" pitchFamily="18" charset="0"/>
+                      </a:rPr>
+                      <m:t>Φ</m:t>
+                    </m:r>
+                  </m:oMath>
+                </a14:m>
+                <a:r>
+                  <a:rPr lang="en-US" sz="3200" b="0" dirty="0">
+                    <a:latin typeface="Calibri" charset="0"/>
+                  </a:rPr>
+                  <a:t>, solve </a:t>
+                </a:r>
+                <a14:m>
+                  <m:oMath xmlns:m="http://schemas.openxmlformats.org/officeDocument/2006/math">
+                    <m:sSub>
+                      <m:sSubPr>
+                        <m:ctrlPr>
+                          <a:rPr lang="en-US" sz="3200" b="0" i="1" smtClean="0">
+                            <a:latin typeface="Cambria Math" panose="02040503050406030204" pitchFamily="18" charset="0"/>
+                          </a:rPr>
+                        </m:ctrlPr>
+                      </m:sSubPr>
+                      <m:e>
+                        <m:func>
+                          <m:funcPr>
+                            <m:ctrlPr>
+                              <a:rPr lang="en-US" sz="3200" b="0" i="1" smtClean="0">
+                                <a:latin typeface="Cambria Math" panose="02040503050406030204" pitchFamily="18" charset="0"/>
+                              </a:rPr>
+                            </m:ctrlPr>
+                          </m:funcPr>
+                          <m:fName>
+                            <m:r>
+                              <m:rPr>
+                                <m:sty m:val="p"/>
+                              </m:rPr>
+                              <a:rPr lang="en-US" sz="3200" b="0" i="0" smtClean="0">
+                                <a:latin typeface="Cambria Math" panose="02040503050406030204" pitchFamily="18" charset="0"/>
+                              </a:rPr>
+                              <m:t>min</m:t>
+                            </m:r>
+                          </m:fName>
+                          <m:e>
+                            <m:d>
+                              <m:dPr>
+                                <m:begChr m:val="|"/>
+                                <m:endChr m:val="|"/>
+                                <m:ctrlPr>
+                                  <a:rPr lang="en-US" sz="3200" b="0" i="1" smtClean="0">
+                                    <a:latin typeface="Cambria Math" panose="02040503050406030204" pitchFamily="18" charset="0"/>
+                                  </a:rPr>
+                                </m:ctrlPr>
+                              </m:dPr>
+                              <m:e>
+                                <m:d>
+                                  <m:dPr>
+                                    <m:begChr m:val="|"/>
+                                    <m:endChr m:val="|"/>
+                                    <m:ctrlPr>
+                                      <a:rPr lang="en-US" sz="3200" b="0" i="1" smtClean="0">
+                                        <a:latin typeface="Cambria Math" panose="02040503050406030204" pitchFamily="18" charset="0"/>
+                                      </a:rPr>
+                                    </m:ctrlPr>
+                                  </m:dPr>
+                                  <m:e>
+                                    <m:r>
+                                      <a:rPr lang="en-US" sz="3200" b="0" i="1" smtClean="0">
+                                        <a:latin typeface="Cambria Math" panose="02040503050406030204" pitchFamily="18" charset="0"/>
+                                      </a:rPr>
+                                      <m:t>𝑐</m:t>
+                                    </m:r>
+                                  </m:e>
+                                </m:d>
+                              </m:e>
+                            </m:d>
+                          </m:e>
+                        </m:func>
+                      </m:e>
+                      <m:sub>
+                        <m:r>
+                          <a:rPr lang="en-US" sz="3200" b="0" i="1" smtClean="0">
+                            <a:latin typeface="Cambria Math" panose="02040503050406030204" pitchFamily="18" charset="0"/>
+                          </a:rPr>
+                          <m:t>1</m:t>
+                        </m:r>
+                      </m:sub>
+                    </m:sSub>
+                    <m:r>
+                      <a:rPr lang="en-US" sz="3200" b="0" i="1" smtClean="0">
+                        <a:latin typeface="Cambria Math" panose="02040503050406030204" pitchFamily="18" charset="0"/>
+                      </a:rPr>
+                      <m:t>𝑠𝑡</m:t>
+                    </m:r>
+                    <m:d>
+                      <m:dPr>
+                        <m:begChr m:val="|"/>
+                        <m:endChr m:val="|"/>
+                        <m:ctrlPr>
+                          <a:rPr lang="en-US" sz="3200" b="0" i="1" smtClean="0">
+                            <a:latin typeface="Cambria Math" panose="02040503050406030204" pitchFamily="18" charset="0"/>
+                          </a:rPr>
+                        </m:ctrlPr>
+                      </m:dPr>
+                      <m:e>
+                        <m:d>
+                          <m:dPr>
+                            <m:begChr m:val="|"/>
+                            <m:endChr m:val="|"/>
+                            <m:ctrlPr>
+                              <a:rPr lang="en-US" sz="3200" b="0" i="1" smtClean="0">
+                                <a:latin typeface="Cambria Math" panose="02040503050406030204" pitchFamily="18" charset="0"/>
+                              </a:rPr>
+                            </m:ctrlPr>
+                          </m:dPr>
+                          <m:e>
+                            <m:r>
+                              <a:rPr lang="en-US" sz="3200" b="0" i="1" smtClean="0">
+                                <a:latin typeface="Cambria Math" panose="02040503050406030204" pitchFamily="18" charset="0"/>
+                              </a:rPr>
+                              <m:t>𝑦</m:t>
+                            </m:r>
+                            <m:r>
+                              <a:rPr lang="en-US" sz="3200" b="0" i="1" smtClean="0">
+                                <a:latin typeface="Cambria Math" panose="02040503050406030204" pitchFamily="18" charset="0"/>
+                              </a:rPr>
+                              <m:t>−</m:t>
+                            </m:r>
+                            <m:r>
+                              <m:rPr>
+                                <m:sty m:val="p"/>
+                              </m:rPr>
+                              <a:rPr lang="en-US" sz="3200" b="0" i="0" smtClean="0">
+                                <a:latin typeface="Cambria Math" panose="02040503050406030204" pitchFamily="18" charset="0"/>
+                              </a:rPr>
+                              <m:t>Φ</m:t>
+                            </m:r>
+                            <m:r>
+                              <a:rPr lang="en-US" sz="3200" b="0" i="1" smtClean="0">
+                                <a:latin typeface="Cambria Math" panose="02040503050406030204" pitchFamily="18" charset="0"/>
+                              </a:rPr>
+                              <m:t>𝑐</m:t>
+                            </m:r>
+                          </m:e>
+                        </m:d>
+                      </m:e>
+                    </m:d>
+                    <m:r>
+                      <a:rPr lang="en-US" sz="3200" b="0" i="1" smtClean="0">
+                        <a:latin typeface="Cambria Math" panose="02040503050406030204" pitchFamily="18" charset="0"/>
+                      </a:rPr>
+                      <m:t>≤</m:t>
+                    </m:r>
+                    <m:r>
+                      <a:rPr lang="en-US" sz="3200" b="0" i="1" smtClean="0">
+                        <a:latin typeface="Cambria Math" panose="02040503050406030204" pitchFamily="18" charset="0"/>
+                      </a:rPr>
+                      <m:t>𝜖</m:t>
+                    </m:r>
+                  </m:oMath>
+                </a14:m>
+                <a:r>
+                  <a:rPr lang="en-US" sz="3200" b="0" dirty="0">
+                    <a:latin typeface="Calibri" charset="0"/>
+                  </a:rPr>
+                  <a:t>) and classify according to weights. [X]</a:t>
+                </a:r>
+                <a:endParaRPr lang="en-US" sz="3200" b="0" u="sng" dirty="0">
+                  <a:latin typeface="Calibri" charset="0"/>
+                </a:endParaRPr>
+              </a:p>
+              <a:p>
+                <a:pPr marL="914400" lvl="1" indent="-457200">
+                  <a:buFont typeface="Arial" charset="0"/>
+                  <a:buChar char="•"/>
+                  <a:defRPr/>
+                </a:pPr>
+                <a:r>
+                  <a:rPr lang="en-US" sz="3200" b="0" dirty="0">
+                    <a:latin typeface="Calibri" charset="0"/>
+                  </a:rPr>
+                  <a:t>With </a:t>
+                </a:r>
+                <a:r>
+                  <a:rPr lang="en-US" sz="3200" b="0" u="sng" dirty="0">
+                    <a:latin typeface="Calibri" charset="0"/>
+                  </a:rPr>
+                  <a:t>Dimension Reduction</a:t>
+                </a:r>
+                <a:r>
+                  <a:rPr lang="en-US" sz="3200" b="0" dirty="0">
+                    <a:latin typeface="Calibri" charset="0"/>
+                  </a:rPr>
+                  <a:t>: Perform sparse representation after projecting images using PCA.</a:t>
+                </a:r>
+                <a:endParaRPr lang="en-US" sz="3200" b="0" u="sng" dirty="0">
+                  <a:latin typeface="Calibri" charset="0"/>
+                </a:endParaRPr>
+              </a:p>
+              <a:p>
+                <a:pPr marL="914400" lvl="1" indent="-457200">
+                  <a:buFont typeface="Arial" charset="0"/>
+                  <a:buChar char="•"/>
+                  <a:defRPr/>
+                </a:pPr>
+                <a:r>
+                  <a:rPr lang="en-US" sz="3200" b="0" dirty="0">
+                    <a:latin typeface="Calibri" charset="0"/>
+                  </a:rPr>
+                  <a:t>With </a:t>
+                </a:r>
+                <a:r>
+                  <a:rPr lang="en-US" sz="3200" b="0" u="sng" dirty="0">
+                    <a:latin typeface="Calibri" charset="0"/>
+                  </a:rPr>
+                  <a:t>Combined L1 Loss</a:t>
+                </a:r>
+                <a:r>
+                  <a:rPr lang="en-US" sz="3200" b="0" dirty="0">
+                    <a:latin typeface="Calibri" charset="0"/>
+                  </a:rPr>
+                  <a:t>: Encode test faces with both train faces and standard basis vectors (</a:t>
+                </a:r>
+                <a14:m>
+                  <m:oMath xmlns:m="http://schemas.openxmlformats.org/officeDocument/2006/math">
+                    <m:sSub>
+                      <m:sSubPr>
+                        <m:ctrlPr>
+                          <a:rPr lang="en-US" sz="3200" b="0" i="1">
+                            <a:latin typeface="Cambria Math" panose="02040503050406030204" pitchFamily="18" charset="0"/>
+                          </a:rPr>
+                        </m:ctrlPr>
+                      </m:sSubPr>
+                      <m:e>
+                        <m:func>
+                          <m:funcPr>
+                            <m:ctrlPr>
+                              <a:rPr lang="en-US" sz="3200" b="0" i="1">
+                                <a:latin typeface="Cambria Math" panose="02040503050406030204" pitchFamily="18" charset="0"/>
+                              </a:rPr>
+                            </m:ctrlPr>
+                          </m:funcPr>
+                          <m:fName>
+                            <m:r>
+                              <m:rPr>
+                                <m:sty m:val="p"/>
+                              </m:rPr>
+                              <a:rPr lang="en-US" sz="3200" b="0">
+                                <a:latin typeface="Cambria Math" panose="02040503050406030204" pitchFamily="18" charset="0"/>
+                              </a:rPr>
+                              <m:t>min</m:t>
+                            </m:r>
+                          </m:fName>
+                          <m:e>
+                            <m:d>
+                              <m:dPr>
+                                <m:begChr m:val="|"/>
+                                <m:endChr m:val="|"/>
+                                <m:ctrlPr>
+                                  <a:rPr lang="en-US" sz="3200" b="0" i="1">
+                                    <a:latin typeface="Cambria Math" panose="02040503050406030204" pitchFamily="18" charset="0"/>
+                                  </a:rPr>
+                                </m:ctrlPr>
+                              </m:dPr>
+                              <m:e>
+                                <m:d>
+                                  <m:dPr>
+                                    <m:begChr m:val="|"/>
+                                    <m:endChr m:val="|"/>
+                                    <m:ctrlPr>
+                                      <a:rPr lang="en-US" sz="3200" b="0" i="1">
+                                        <a:latin typeface="Cambria Math" panose="02040503050406030204" pitchFamily="18" charset="0"/>
+                                      </a:rPr>
+                                    </m:ctrlPr>
+                                  </m:dPr>
+                                  <m:e>
+                                    <m:r>
+                                      <a:rPr lang="en-US" sz="3200" b="0" i="1">
+                                        <a:latin typeface="Cambria Math" panose="02040503050406030204" pitchFamily="18" charset="0"/>
+                                      </a:rPr>
+                                      <m:t>𝑐</m:t>
+                                    </m:r>
+                                  </m:e>
+                                </m:d>
+                              </m:e>
+                            </m:d>
+                          </m:e>
+                        </m:func>
+                      </m:e>
+                      <m:sub>
+                        <m:r>
+                          <a:rPr lang="en-US" sz="3200" b="0" i="1">
+                            <a:latin typeface="Cambria Math" panose="02040503050406030204" pitchFamily="18" charset="0"/>
+                          </a:rPr>
+                          <m:t>1</m:t>
+                        </m:r>
+                      </m:sub>
+                    </m:sSub>
+                    <m:r>
+                      <a:rPr lang="en-US" sz="3200" b="0" i="1" smtClean="0">
+                        <a:latin typeface="Cambria Math" panose="02040503050406030204" pitchFamily="18" charset="0"/>
+                      </a:rPr>
+                      <m:t>+</m:t>
+                    </m:r>
+                    <m:sSub>
+                      <m:sSubPr>
+                        <m:ctrlPr>
+                          <a:rPr lang="en-US" sz="3200" b="0" i="1" smtClean="0">
+                            <a:latin typeface="Cambria Math" panose="02040503050406030204" pitchFamily="18" charset="0"/>
+                          </a:rPr>
+                        </m:ctrlPr>
+                      </m:sSubPr>
+                      <m:e>
+                        <m:d>
+                          <m:dPr>
+                            <m:begChr m:val="|"/>
+                            <m:endChr m:val="|"/>
+                            <m:ctrlPr>
+                              <a:rPr lang="en-US" sz="3200" b="0" i="1" smtClean="0">
+                                <a:latin typeface="Cambria Math" panose="02040503050406030204" pitchFamily="18" charset="0"/>
+                              </a:rPr>
+                            </m:ctrlPr>
+                          </m:dPr>
+                          <m:e>
+                            <m:d>
+                              <m:dPr>
+                                <m:begChr m:val="|"/>
+                                <m:endChr m:val="|"/>
+                                <m:ctrlPr>
+                                  <a:rPr lang="en-US" sz="3200" b="0" i="1" smtClean="0">
+                                    <a:latin typeface="Cambria Math" panose="02040503050406030204" pitchFamily="18" charset="0"/>
+                                  </a:rPr>
+                                </m:ctrlPr>
+                              </m:dPr>
+                              <m:e>
+                                <m:r>
+                                  <a:rPr lang="en-US" sz="3200" b="0" i="1" smtClean="0">
+                                    <a:latin typeface="Cambria Math" panose="02040503050406030204" pitchFamily="18" charset="0"/>
+                                  </a:rPr>
+                                  <m:t>𝑒</m:t>
+                                </m:r>
+                              </m:e>
+                            </m:d>
+                          </m:e>
+                        </m:d>
+                      </m:e>
+                      <m:sub>
+                        <m:r>
+                          <a:rPr lang="en-US" sz="3200" b="0" i="1" smtClean="0">
+                            <a:latin typeface="Cambria Math" panose="02040503050406030204" pitchFamily="18" charset="0"/>
+                          </a:rPr>
+                          <m:t>1</m:t>
+                        </m:r>
+                      </m:sub>
+                    </m:sSub>
+                    <m:r>
+                      <a:rPr lang="en-US" sz="3200" b="0" i="1">
+                        <a:latin typeface="Cambria Math" panose="02040503050406030204" pitchFamily="18" charset="0"/>
+                      </a:rPr>
+                      <m:t>𝑠</m:t>
+                    </m:r>
+                    <m:r>
+                      <a:rPr lang="en-US" sz="3200" b="0" i="1" smtClean="0">
+                        <a:latin typeface="Cambria Math" panose="02040503050406030204" pitchFamily="18" charset="0"/>
+                      </a:rPr>
+                      <m:t>𝑡</m:t>
+                    </m:r>
+                    <m:r>
+                      <a:rPr lang="en-US" sz="3200" b="0" i="1" smtClean="0">
+                        <a:latin typeface="Cambria Math" panose="02040503050406030204" pitchFamily="18" charset="0"/>
+                      </a:rPr>
+                      <m:t> </m:t>
+                    </m:r>
+                    <m:r>
+                      <a:rPr lang="en-US" sz="3200" b="0" i="1" smtClean="0">
+                        <a:latin typeface="Cambria Math" panose="02040503050406030204" pitchFamily="18" charset="0"/>
+                      </a:rPr>
+                      <m:t>𝑦</m:t>
+                    </m:r>
+                    <m:r>
+                      <a:rPr lang="en-US" sz="3200" b="0" i="1" smtClean="0">
+                        <a:latin typeface="Cambria Math" panose="02040503050406030204" pitchFamily="18" charset="0"/>
+                      </a:rPr>
+                      <m:t>=</m:t>
+                    </m:r>
+                    <m:r>
+                      <m:rPr>
+                        <m:sty m:val="p"/>
+                      </m:rPr>
+                      <a:rPr lang="en-US" sz="3200" b="0" i="0" smtClean="0">
+                        <a:latin typeface="Cambria Math" panose="02040503050406030204" pitchFamily="18" charset="0"/>
+                      </a:rPr>
+                      <m:t>Φ</m:t>
+                    </m:r>
+                    <m:r>
+                      <a:rPr lang="en-US" sz="3200" b="0" i="1" smtClean="0">
+                        <a:latin typeface="Cambria Math" panose="02040503050406030204" pitchFamily="18" charset="0"/>
+                      </a:rPr>
+                      <m:t>𝑐</m:t>
+                    </m:r>
+                    <m:r>
+                      <a:rPr lang="en-US" sz="3200" b="0" i="1" smtClean="0">
+                        <a:latin typeface="Cambria Math" panose="02040503050406030204" pitchFamily="18" charset="0"/>
+                      </a:rPr>
+                      <m:t>+</m:t>
+                    </m:r>
+                    <m:r>
+                      <a:rPr lang="en-US" sz="3200" b="0" i="1" smtClean="0">
+                        <a:latin typeface="Cambria Math" panose="02040503050406030204" pitchFamily="18" charset="0"/>
+                      </a:rPr>
+                      <m:t>𝑒</m:t>
+                    </m:r>
+                  </m:oMath>
+                </a14:m>
+                <a:r>
+                  <a:rPr lang="en-US" sz="3200" b="0" dirty="0">
+                    <a:latin typeface="Calibri" charset="0"/>
+                  </a:rPr>
+                  <a:t>) to account for small differences between images.</a:t>
+                </a:r>
+                <a:endParaRPr lang="en-US" sz="3200" b="0" u="sng" dirty="0">
+                  <a:latin typeface="Calibri" charset="0"/>
+                </a:endParaRPr>
+              </a:p>
+              <a:p>
+                <a:pPr marL="457200" indent="-457200">
+                  <a:buFont typeface="Arial" charset="0"/>
+                  <a:buChar char="•"/>
+                  <a:defRPr/>
+                </a:pPr>
+                <a:r>
+                  <a:rPr lang="en-US" sz="3200" b="0" u="sng" dirty="0">
+                    <a:latin typeface="Calibri" charset="0"/>
+                  </a:rPr>
+                  <a:t>VGG-FACE</a:t>
+                </a:r>
+                <a:r>
+                  <a:rPr lang="en-US" sz="3200" b="0" dirty="0">
+                    <a:latin typeface="Calibri" charset="0"/>
+                  </a:rPr>
+                  <a:t>: Use features from pre-trained VGG network and predict using K-nearest neighbors based on cosine distances. [X]</a:t>
+                </a:r>
+                <a:endParaRPr lang="en-US" sz="3200" b="0" u="sng" dirty="0">
+                  <a:latin typeface="Calibri" charset="0"/>
+                </a:endParaRPr>
+              </a:p>
+              <a:p>
+                <a:pPr>
+                  <a:defRPr/>
+                </a:pPr>
+                <a:endParaRPr lang="en-US" sz="1600" b="0" dirty="0">
+                  <a:latin typeface="Calibri" charset="0"/>
+                </a:endParaRPr>
+              </a:p>
+              <a:p>
+                <a:pPr>
+                  <a:defRPr/>
+                </a:pPr>
+                <a:r>
+                  <a:rPr lang="en-US" sz="3200" dirty="0">
+                    <a:latin typeface="Calibri" charset="0"/>
+                  </a:rPr>
+                  <a:t>Dataset</a:t>
+                </a:r>
+              </a:p>
+              <a:p>
+                <a:pPr marL="457200" indent="-457200">
+                  <a:buFont typeface="Arial" panose="020B0604020202020204" pitchFamily="34" charset="0"/>
+                  <a:buChar char="•"/>
+                  <a:defRPr/>
+                </a:pPr>
+                <a:r>
+                  <a:rPr lang="en-US" sz="3200" b="0" dirty="0">
+                    <a:latin typeface="Calibri" charset="0"/>
+                  </a:rPr>
+                  <a:t>Labeled Faces in the Wild (LFW): subjects with at least 20 faces.</a:t>
+                </a:r>
+              </a:p>
+              <a:p>
+                <a:pPr marL="457200" indent="-457200">
+                  <a:buFont typeface="Arial" panose="020B0604020202020204" pitchFamily="34" charset="0"/>
+                  <a:buChar char="•"/>
+                  <a:defRPr/>
+                </a:pPr>
+                <a:r>
+                  <a:rPr lang="en-US" sz="3200" b="0" dirty="0">
+                    <a:latin typeface="Calibri" charset="0"/>
+                  </a:rPr>
+                  <a:t>Use equal number of training faces for each subject.</a:t>
+                </a:r>
+              </a:p>
+              <a:p>
+                <a:pPr marL="1200150" lvl="1" indent="-742950">
+                  <a:buFont typeface="Wingdings" charset="2"/>
+                  <a:buChar char="§"/>
+                  <a:defRPr/>
+                </a:pPr>
+                <a:endParaRPr lang="en-US" sz="3200" b="0" dirty="0">
+                  <a:latin typeface="Calibri" charset="0"/>
+                </a:endParaRPr>
+              </a:p>
+              <a:p>
+                <a:pPr marL="1200150" lvl="1" indent="-742950">
+                  <a:buFont typeface="Wingdings" charset="2"/>
+                  <a:buChar char="§"/>
+                  <a:defRPr/>
+                </a:pPr>
+                <a:endParaRPr lang="en-US" sz="3200" b="0" dirty="0">
+                  <a:latin typeface="Calibri" charset="0"/>
+                </a:endParaRPr>
+              </a:p>
+            </p:txBody>
+          </p:sp>
+        </mc:Choice>
+        <mc:Fallback>
+          <p:sp>
+            <p:nvSpPr>
+              <p:cNvPr id="11" name="TextBox 10"/>
+              <p:cNvSpPr txBox="1">
+                <a:spLocks noRot="1" noChangeAspect="1" noMove="1" noResize="1" noEditPoints="1" noAdjustHandles="1" noChangeArrowheads="1" noChangeShapeType="1" noTextEdit="1"/>
+              </p:cNvSpPr>
+              <p:nvPr/>
+            </p:nvSpPr>
+            <p:spPr>
+              <a:xfrm>
+                <a:off x="788833" y="16524567"/>
+                <a:ext cx="11125504" cy="11679864"/>
+              </a:xfrm>
+              <a:prstGeom prst="rect">
+                <a:avLst/>
+              </a:prstGeom>
+              <a:blipFill>
+                <a:blip r:embed="rId11"/>
+                <a:stretch>
+                  <a:fillRect l="-1370" t="-678"/>
+                </a:stretch>
+              </a:blipFill>
+            </p:spPr>
+            <p:txBody>
+              <a:bodyPr/>
+              <a:lstStyle/>
+              <a:p>
+                <a:r>
+                  <a:rPr lang="en-US">
+                    <a:noFill/>
+                  </a:rPr>
+                  <a:t> </a:t>
+                </a:r>
+              </a:p>
+            </p:txBody>
+          </p:sp>
+        </mc:Fallback>
+      </mc:AlternateContent>
       <p:pic>
         <p:nvPicPr>
           <p:cNvPr id="4" name="Picture 3"/>
-          <p:cNvPicPr>
-            <a:picLocks noChangeAspect="1"/>
-          </p:cNvPicPr>
-          <p:nvPr/>
-        </p:nvPicPr>
-        <p:blipFill>
-          <a:blip r:embed="rId11">
-            <a:extLst>
-              <a:ext uri="{28A0092B-C50C-407E-A947-70E740481C1C}">
-                <a14:useLocalDpi xmlns:a14="http://schemas.microsoft.com/office/drawing/2010/main" val="0"/>
-              </a:ext>
-            </a:extLst>
-          </a:blip>
-          <a:stretch>
-            <a:fillRect/>
-          </a:stretch>
-        </p:blipFill>
-        <p:spPr>
-          <a:xfrm>
-            <a:off x="12342593" y="8860896"/>
-            <a:ext cx="5486400" cy="3657600"/>
-          </a:xfrm>
-          <a:prstGeom prst="rect">
-            <a:avLst/>
-          </a:prstGeom>
-        </p:spPr>
-      </p:pic>
-      <p:sp>
-        <p:nvSpPr>
-          <p:cNvPr id="7" name="TextBox 6"/>
-          <p:cNvSpPr txBox="1"/>
-          <p:nvPr/>
-        </p:nvSpPr>
-        <p:spPr>
-          <a:xfrm>
-            <a:off x="12568118" y="8674653"/>
-            <a:ext cx="3870645" cy="461665"/>
-          </a:xfrm>
-          <a:prstGeom prst="rect">
-            <a:avLst/>
-          </a:prstGeom>
-          <a:noFill/>
-        </p:spPr>
-        <p:txBody>
-          <a:bodyPr wrap="square" rtlCol="0">
-            <a:spAutoFit/>
-          </a:bodyPr>
-          <a:lstStyle/>
-          <a:p>
-            <a:r>
-              <a:rPr lang="en-US" b="0">
-                <a:latin typeface="Calibri" charset="0"/>
-              </a:rPr>
-              <a:t>Blur</a:t>
-            </a:r>
-            <a:endParaRPr lang="en-US" dirty="0"/>
-          </a:p>
-        </p:txBody>
-      </p:sp>
-      <p:pic>
-        <p:nvPicPr>
-          <p:cNvPr id="10" name="Picture 9"/>
           <p:cNvPicPr>
             <a:picLocks noChangeAspect="1"/>
           </p:cNvPicPr>
@@ -3918,7 +4438,7 @@
         </p:blipFill>
         <p:spPr>
           <a:xfrm>
-            <a:off x="12342593" y="5106476"/>
+            <a:off x="18108985" y="11770988"/>
             <a:ext cx="5486400" cy="3657600"/>
           </a:xfrm>
           <a:prstGeom prst="rect">
@@ -3928,14 +4448,14 @@
       </p:pic>
       <p:sp>
         <p:nvSpPr>
-          <p:cNvPr id="44" name="TextBox 43"/>
+          <p:cNvPr id="7" name="TextBox 6"/>
           <p:cNvSpPr txBox="1"/>
           <p:nvPr/>
         </p:nvSpPr>
         <p:spPr>
           <a:xfrm>
-            <a:off x="12568119" y="4862842"/>
-            <a:ext cx="3870645" cy="461665"/>
+            <a:off x="18916862" y="10619903"/>
+            <a:ext cx="3870645" cy="584775"/>
           </a:xfrm>
           <a:prstGeom prst="rect">
             <a:avLst/>
@@ -3948,19 +4468,20 @@
           </a:bodyPr>
           <a:lstStyle/>
           <a:p>
+            <a:pPr algn="ctr"/>
             <a:r>
-              <a:rPr lang="en-US" b="0" dirty="0">
+              <a:rPr lang="en-US" sz="3200" b="0" dirty="0">
                 <a:latin typeface="Calibri" charset="0"/>
               </a:rPr>
-              <a:t>Occlusion</a:t>
+              <a:t>Blur</a:t>
             </a:r>
-            <a:endParaRPr lang="en-US" dirty="0"/>
+            <a:endParaRPr lang="en-US" sz="3200" dirty="0"/>
           </a:p>
         </p:txBody>
       </p:sp>
       <p:pic>
         <p:nvPicPr>
-          <p:cNvPr id="12" name="Picture 11"/>
+          <p:cNvPr id="10" name="Picture 9"/>
           <p:cNvPicPr>
             <a:picLocks noChangeAspect="1"/>
           </p:cNvPicPr>
@@ -3980,7 +4501,70 @@
         </p:blipFill>
         <p:spPr>
           <a:xfrm>
-            <a:off x="18234394" y="5115789"/>
+            <a:off x="12652563" y="6169250"/>
+            <a:ext cx="5486400" cy="3657600"/>
+          </a:xfrm>
+          <a:prstGeom prst="rect">
+            <a:avLst/>
+          </a:prstGeom>
+        </p:spPr>
+      </p:pic>
+      <p:sp>
+        <p:nvSpPr>
+          <p:cNvPr id="44" name="TextBox 43"/>
+          <p:cNvSpPr txBox="1"/>
+          <p:nvPr/>
+        </p:nvSpPr>
+        <p:spPr>
+          <a:xfrm>
+            <a:off x="13372069" y="4862842"/>
+            <a:ext cx="3870645" cy="584775"/>
+          </a:xfrm>
+          <a:prstGeom prst="rect">
+            <a:avLst/>
+          </a:prstGeom>
+          <a:noFill/>
+        </p:spPr>
+        <p:txBody>
+          <a:bodyPr wrap="square" rtlCol="0">
+            <a:spAutoFit/>
+          </a:bodyPr>
+          <a:lstStyle/>
+          <a:p>
+            <a:pPr algn="ctr"/>
+            <a:r>
+              <a:rPr lang="en-US" sz="3200" b="0" dirty="0">
+                <a:latin typeface="Calibri" charset="0"/>
+              </a:rPr>
+              <a:t>Occlusion</a:t>
+            </a:r>
+            <a:endParaRPr lang="en-US" sz="3200" dirty="0"/>
+          </a:p>
+        </p:txBody>
+      </p:sp>
+      <p:pic>
+        <p:nvPicPr>
+          <p:cNvPr id="12" name="Picture 11"/>
+          <p:cNvPicPr>
+            <a:picLocks noChangeAspect="1"/>
+          </p:cNvPicPr>
+          <p:nvPr/>
+        </p:nvPicPr>
+        <p:blipFill>
+          <a:blip r:embed="rId14">
+            <a:extLst>
+              <a:ext uri="{28A0092B-C50C-407E-A947-70E740481C1C}">
+                <a14:useLocalDpi xmlns:a14="http://schemas.microsoft.com/office/drawing/2010/main" val="0"/>
+              </a:ext>
+            </a:extLst>
+          </a:blip>
+          <a:stretch>
+            <a:fillRect/>
+          </a:stretch>
+        </p:blipFill>
+        <p:spPr>
+          <a:xfrm>
+            <a:off x="18259771" y="7016396"/>
             <a:ext cx="5486400" cy="3657600"/>
           </a:xfrm>
           <a:prstGeom prst="rect">
@@ -3996,8 +4580,8 @@
         </p:nvSpPr>
         <p:spPr>
           <a:xfrm>
-            <a:off x="18686685" y="4896509"/>
-            <a:ext cx="3870645" cy="461665"/>
+            <a:off x="19042270" y="4829263"/>
+            <a:ext cx="3870645" cy="584775"/>
           </a:xfrm>
           <a:prstGeom prst="rect">
             <a:avLst/>
@@ -4010,13 +4594,14 @@
           </a:bodyPr>
           <a:lstStyle/>
           <a:p>
+            <a:pPr algn="ctr"/>
             <a:r>
-              <a:rPr lang="en-US" b="0" dirty="0">
+              <a:rPr lang="en-US" sz="3200" b="0" dirty="0">
                 <a:latin typeface="Calibri" charset="0"/>
               </a:rPr>
               <a:t>Radial Distortion</a:t>
             </a:r>
-            <a:endParaRPr lang="en-US" dirty="0"/>
+            <a:endParaRPr lang="en-US" sz="3200" dirty="0"/>
           </a:p>
         </p:txBody>
       </p:sp>
@@ -4028,8 +4613,8 @@
         </p:nvSpPr>
         <p:spPr>
           <a:xfrm>
-            <a:off x="18673260" y="8674653"/>
-            <a:ext cx="3870645" cy="461665"/>
+            <a:off x="12724621" y="9672684"/>
+            <a:ext cx="5165540" cy="584775"/>
           </a:xfrm>
           <a:prstGeom prst="rect">
             <a:avLst/>
@@ -4042,26 +4627,57 @@
           </a:bodyPr>
           <a:lstStyle/>
           <a:p>
+            <a:pPr algn="ctr"/>
+            <a:r>
+              <a:rPr lang="en-US" sz="3200" b="0" dirty="0">
+                <a:latin typeface="Calibri" charset="0"/>
+              </a:rPr>
+              <a:t>Deep</a:t>
+            </a:r>
             <a:r>
               <a:rPr lang="en-US" b="0" dirty="0">
                 <a:latin typeface="Calibri" charset="0"/>
               </a:rPr>
-              <a:t>Deep Feature Interpretation</a:t>
+              <a:t> </a:t>
             </a:r>
-            <a:endParaRPr lang="en-US" dirty="0"/>
+            <a:r>
+              <a:rPr lang="en-US" sz="3200" b="0" dirty="0">
+                <a:latin typeface="Calibri" charset="0"/>
+              </a:rPr>
+              <a:t>Feature</a:t>
+            </a:r>
+            <a:r>
+              <a:rPr lang="en-US" b="0" dirty="0">
+                <a:latin typeface="Calibri" charset="0"/>
+              </a:rPr>
+              <a:t> </a:t>
+            </a:r>
+            <a:r>
+              <a:rPr lang="en-US" sz="3200" b="0" dirty="0">
+                <a:latin typeface="Calibri" charset="0"/>
+              </a:rPr>
+              <a:t>Interpretation</a:t>
+            </a:r>
+            <a:endParaRPr lang="en-US" sz="3200" dirty="0"/>
           </a:p>
         </p:txBody>
       </p:sp>
       <p:sp>
         <p:nvSpPr>
-          <p:cNvPr id="15" name="TextBox 14"/>
+          <p:cNvPr id="48" name="TextBox 47">
+            <a:extLst>
+              <a:ext uri="{FF2B5EF4-FFF2-40B4-BE49-F238E27FC236}">
+                <a16:creationId xmlns:a16="http://schemas.microsoft.com/office/drawing/2014/main" id="{D9C6F1D3-02AF-4D2D-AD5C-A4546F877A04}"/>
+              </a:ext>
+            </a:extLst>
+          </p:cNvPr>
           <p:cNvSpPr txBox="1"/>
           <p:nvPr/>
         </p:nvSpPr>
         <p:spPr>
           <a:xfrm>
-            <a:off x="15479885" y="12740429"/>
-            <a:ext cx="4151372" cy="1938992"/>
+            <a:off x="13393651" y="5645116"/>
+            <a:ext cx="4451209" cy="707886"/>
           </a:xfrm>
           <a:prstGeom prst="rect">
             <a:avLst/>
@@ -4074,23 +4690,358 @@
           </a:bodyPr>
           <a:lstStyle/>
           <a:p>
+            <a:pPr>
+              <a:defRPr/>
+            </a:pPr>
             <a:r>
-              <a:rPr lang="en-US" dirty="0"/>
-              <a:t>Any way to represent the algorithms visually? We could make flow charts of what they do? Or add equations representing what they do.</a:t>
+              <a:rPr lang="en-US" sz="2000" b="0" dirty="0">
+                <a:latin typeface="Calibri" charset="0"/>
+              </a:rPr>
+              <a:t>Randomly reset pixels in a selected region of a specified </a:t>
+            </a:r>
+            <a:r>
+              <a:rPr lang="en-US" sz="2000" b="0" dirty="0" err="1">
+                <a:latin typeface="Calibri" charset="0"/>
+              </a:rPr>
+              <a:t>windowsize</a:t>
+            </a:r>
+            <a:r>
+              <a:rPr lang="en-US" sz="2000" b="0" dirty="0">
+                <a:latin typeface="Calibri" charset="0"/>
+              </a:rPr>
+              <a:t>.</a:t>
             </a:r>
           </a:p>
         </p:txBody>
       </p:sp>
+      <mc:AlternateContent xmlns:mc="http://schemas.openxmlformats.org/markup-compatibility/2006">
+        <mc:Choice xmlns:a14="http://schemas.microsoft.com/office/drawing/2010/main" Requires="a14">
+          <p:sp>
+            <p:nvSpPr>
+              <p:cNvPr id="50" name="TextBox 49">
+                <a:extLst>
+                  <a:ext uri="{FF2B5EF4-FFF2-40B4-BE49-F238E27FC236}">
+                    <a16:creationId xmlns:a16="http://schemas.microsoft.com/office/drawing/2014/main" id="{D3125782-10BA-4DA6-9538-1233D6DF295C}"/>
+                  </a:ext>
+                </a:extLst>
+              </p:cNvPr>
+              <p:cNvSpPr txBox="1"/>
+              <p:nvPr/>
+            </p:nvSpPr>
+            <p:spPr>
+              <a:xfrm>
+                <a:off x="18731141" y="5522900"/>
+                <a:ext cx="5028339" cy="1771254"/>
+              </a:xfrm>
+              <a:prstGeom prst="rect">
+                <a:avLst/>
+              </a:prstGeom>
+              <a:noFill/>
+            </p:spPr>
+            <p:txBody>
+              <a:bodyPr wrap="square" rtlCol="0">
+                <a:spAutoFit/>
+              </a:bodyPr>
+              <a:lstStyle/>
+              <a:p>
+                <a:pPr>
+                  <a:defRPr/>
+                </a:pPr>
+                <a:r>
+                  <a:rPr lang="en-US" sz="2000" b="0" dirty="0">
+                    <a:latin typeface="Calibri" charset="0"/>
+                  </a:rPr>
+                  <a:t>Impose pincushion and barrel distortion (caused by spherical camera lenses): replace pixel </a:t>
+                </a:r>
+                <a14:m>
+                  <m:oMath xmlns:m="http://schemas.openxmlformats.org/officeDocument/2006/math">
+                    <m:r>
+                      <a:rPr lang="en-US" sz="2000" b="0" i="1" smtClean="0">
+                        <a:latin typeface="Cambria Math" panose="02040503050406030204" pitchFamily="18" charset="0"/>
+                      </a:rPr>
+                      <m:t>(</m:t>
+                    </m:r>
+                    <m:r>
+                      <a:rPr lang="en-US" sz="2000" b="0" i="1" smtClean="0">
+                        <a:latin typeface="Cambria Math" panose="02040503050406030204" pitchFamily="18" charset="0"/>
+                      </a:rPr>
+                      <m:t>𝑖</m:t>
+                    </m:r>
+                    <m:r>
+                      <a:rPr lang="en-US" sz="2000" b="0" i="1" smtClean="0">
+                        <a:latin typeface="Cambria Math" panose="02040503050406030204" pitchFamily="18" charset="0"/>
+                      </a:rPr>
+                      <m:t>,</m:t>
+                    </m:r>
+                    <m:r>
+                      <a:rPr lang="en-US" sz="2000" b="0" i="1" smtClean="0">
+                        <a:latin typeface="Cambria Math" panose="02040503050406030204" pitchFamily="18" charset="0"/>
+                      </a:rPr>
+                      <m:t>𝑗</m:t>
+                    </m:r>
+                    <m:r>
+                      <a:rPr lang="en-US" sz="2000" b="0" i="1" smtClean="0">
+                        <a:latin typeface="Cambria Math" panose="02040503050406030204" pitchFamily="18" charset="0"/>
+                      </a:rPr>
+                      <m:t>)</m:t>
+                    </m:r>
+                  </m:oMath>
+                </a14:m>
+                <a:r>
+                  <a:rPr lang="en-US" sz="2000" b="0" dirty="0">
+                    <a:latin typeface="Calibri" charset="0"/>
+                  </a:rPr>
+                  <a:t> with </a:t>
+                </a:r>
+                <a14:m>
+                  <m:oMath xmlns:m="http://schemas.openxmlformats.org/officeDocument/2006/math">
+                    <m:r>
+                      <a:rPr lang="en-US" sz="2000" b="0" i="1" smtClean="0">
+                        <a:latin typeface="Cambria Math" panose="02040503050406030204" pitchFamily="18" charset="0"/>
+                      </a:rPr>
+                      <m:t>(</m:t>
+                    </m:r>
+                    <m:f>
+                      <m:fPr>
+                        <m:ctrlPr>
+                          <a:rPr lang="en-US" sz="2000" b="0" i="1" smtClean="0">
+                            <a:latin typeface="Cambria Math" panose="02040503050406030204" pitchFamily="18" charset="0"/>
+                          </a:rPr>
+                        </m:ctrlPr>
+                      </m:fPr>
+                      <m:num>
+                        <m:r>
+                          <a:rPr lang="en-US" sz="2000" b="0" i="1" smtClean="0">
+                            <a:latin typeface="Cambria Math" panose="02040503050406030204" pitchFamily="18" charset="0"/>
+                          </a:rPr>
+                          <m:t>𝑖</m:t>
+                        </m:r>
+                      </m:num>
+                      <m:den>
+                        <m:r>
+                          <a:rPr lang="en-US" sz="2000" b="0" i="1" smtClean="0">
+                            <a:latin typeface="Cambria Math" panose="02040503050406030204" pitchFamily="18" charset="0"/>
+                          </a:rPr>
+                          <m:t>1</m:t>
+                        </m:r>
+                        <m:r>
+                          <a:rPr lang="en-US" sz="2000" b="0" i="1" smtClean="0">
+                            <a:latin typeface="Cambria Math" panose="02040503050406030204" pitchFamily="18" charset="0"/>
+                          </a:rPr>
+                          <m:t>+</m:t>
+                        </m:r>
+                        <m:r>
+                          <a:rPr lang="en-US" sz="2000" b="0" i="1" smtClean="0">
+                            <a:latin typeface="Cambria Math" panose="02040503050406030204" pitchFamily="18" charset="0"/>
+                          </a:rPr>
+                          <m:t>𝑘</m:t>
+                        </m:r>
+                        <m:sSup>
+                          <m:sSupPr>
+                            <m:ctrlPr>
+                              <a:rPr lang="en-US" sz="2000" b="0" i="1" smtClean="0">
+                                <a:latin typeface="Cambria Math" panose="02040503050406030204" pitchFamily="18" charset="0"/>
+                              </a:rPr>
+                            </m:ctrlPr>
+                          </m:sSupPr>
+                          <m:e>
+                            <m:r>
+                              <a:rPr lang="en-US" sz="2000" b="0" i="1" smtClean="0">
+                                <a:latin typeface="Cambria Math" panose="02040503050406030204" pitchFamily="18" charset="0"/>
+                              </a:rPr>
+                              <m:t>𝑟</m:t>
+                            </m:r>
+                          </m:e>
+                          <m:sup>
+                            <m:r>
+                              <a:rPr lang="en-US" sz="2000" b="0" i="1" smtClean="0">
+                                <a:latin typeface="Cambria Math" panose="02040503050406030204" pitchFamily="18" charset="0"/>
+                              </a:rPr>
+                              <m:t>2</m:t>
+                            </m:r>
+                          </m:sup>
+                        </m:sSup>
+                      </m:den>
+                    </m:f>
+                    <m:r>
+                      <a:rPr lang="en-US" sz="2000" b="0" i="1" smtClean="0">
+                        <a:latin typeface="Cambria Math" panose="02040503050406030204" pitchFamily="18" charset="0"/>
+                      </a:rPr>
+                      <m:t>,</m:t>
+                    </m:r>
+                    <m:f>
+                      <m:fPr>
+                        <m:ctrlPr>
+                          <a:rPr lang="en-US" sz="2000" b="0" i="1" smtClean="0">
+                            <a:latin typeface="Cambria Math" panose="02040503050406030204" pitchFamily="18" charset="0"/>
+                          </a:rPr>
+                        </m:ctrlPr>
+                      </m:fPr>
+                      <m:num>
+                        <m:r>
+                          <a:rPr lang="en-US" sz="2000" b="0" i="1" smtClean="0">
+                            <a:latin typeface="Cambria Math" panose="02040503050406030204" pitchFamily="18" charset="0"/>
+                          </a:rPr>
+                          <m:t>𝑗</m:t>
+                        </m:r>
+                      </m:num>
+                      <m:den>
+                        <m:r>
+                          <a:rPr lang="en-US" sz="2000" b="0" i="1" smtClean="0">
+                            <a:latin typeface="Cambria Math" panose="02040503050406030204" pitchFamily="18" charset="0"/>
+                          </a:rPr>
+                          <m:t>1</m:t>
+                        </m:r>
+                        <m:r>
+                          <a:rPr lang="en-US" sz="2000" b="0" i="1" smtClean="0">
+                            <a:latin typeface="Cambria Math" panose="02040503050406030204" pitchFamily="18" charset="0"/>
+                          </a:rPr>
+                          <m:t>+</m:t>
+                        </m:r>
+                        <m:r>
+                          <a:rPr lang="en-US" sz="2000" b="0" i="1" smtClean="0">
+                            <a:latin typeface="Cambria Math" panose="02040503050406030204" pitchFamily="18" charset="0"/>
+                          </a:rPr>
+                          <m:t>𝑘</m:t>
+                        </m:r>
+                        <m:sSup>
+                          <m:sSupPr>
+                            <m:ctrlPr>
+                              <a:rPr lang="en-US" sz="2000" b="0" i="1" smtClean="0">
+                                <a:latin typeface="Cambria Math" panose="02040503050406030204" pitchFamily="18" charset="0"/>
+                              </a:rPr>
+                            </m:ctrlPr>
+                          </m:sSupPr>
+                          <m:e>
+                            <m:r>
+                              <a:rPr lang="en-US" sz="2000" b="0" i="1" smtClean="0">
+                                <a:latin typeface="Cambria Math" panose="02040503050406030204" pitchFamily="18" charset="0"/>
+                              </a:rPr>
+                              <m:t>𝑟</m:t>
+                            </m:r>
+                          </m:e>
+                          <m:sup>
+                            <m:r>
+                              <a:rPr lang="en-US" sz="2000" b="0" i="1" smtClean="0">
+                                <a:latin typeface="Cambria Math" panose="02040503050406030204" pitchFamily="18" charset="0"/>
+                              </a:rPr>
+                              <m:t>2</m:t>
+                            </m:r>
+                          </m:sup>
+                        </m:sSup>
+                      </m:den>
+                    </m:f>
+                    <m:r>
+                      <a:rPr lang="en-US" sz="2000" b="0" i="1" smtClean="0">
+                        <a:latin typeface="Cambria Math" panose="02040503050406030204" pitchFamily="18" charset="0"/>
+                      </a:rPr>
+                      <m:t>)</m:t>
+                    </m:r>
+                  </m:oMath>
+                </a14:m>
+                <a:r>
+                  <a:rPr lang="en-US" sz="2000" b="0" dirty="0">
+                    <a:latin typeface="Calibri" charset="0"/>
+                  </a:rPr>
+                  <a:t> where </a:t>
+                </a:r>
+                <a14:m>
+                  <m:oMath xmlns:m="http://schemas.openxmlformats.org/officeDocument/2006/math">
+                    <m:r>
+                      <a:rPr lang="en-US" sz="2000" b="0" i="1" smtClean="0">
+                        <a:latin typeface="Cambria Math" panose="02040503050406030204" pitchFamily="18" charset="0"/>
+                      </a:rPr>
+                      <m:t>𝑟</m:t>
+                    </m:r>
+                  </m:oMath>
+                </a14:m>
+                <a:r>
+                  <a:rPr lang="en-US" sz="2000" b="0" dirty="0">
+                    <a:latin typeface="Calibri" charset="0"/>
+                  </a:rPr>
+                  <a:t> is distance from center of image and </a:t>
+                </a:r>
+                <a14:m>
+                  <m:oMath xmlns:m="http://schemas.openxmlformats.org/officeDocument/2006/math">
+                    <m:r>
+                      <a:rPr lang="en-US" sz="2000" b="0" i="1" smtClean="0">
+                        <a:latin typeface="Cambria Math" panose="02040503050406030204" pitchFamily="18" charset="0"/>
+                      </a:rPr>
+                      <m:t>𝑘</m:t>
+                    </m:r>
+                  </m:oMath>
+                </a14:m>
+                <a:r>
+                  <a:rPr lang="en-US" sz="2000" b="0" dirty="0">
+                    <a:latin typeface="Calibri" charset="0"/>
+                  </a:rPr>
+                  <a:t> controls distortion amount and type.</a:t>
+                </a:r>
+              </a:p>
+            </p:txBody>
+          </p:sp>
+        </mc:Choice>
+        <mc:Fallback>
+          <p:sp>
+            <p:nvSpPr>
+              <p:cNvPr id="50" name="TextBox 49">
+                <a:extLst>
+                  <a:ext uri="{FF2B5EF4-FFF2-40B4-BE49-F238E27FC236}">
+                    <a16:creationId xmlns:a16="http://schemas.microsoft.com/office/drawing/2014/main" id="{D3125782-10BA-4DA6-9538-1233D6DF295C}"/>
+                  </a:ext>
+                </a:extLst>
+              </p:cNvPr>
+              <p:cNvSpPr txBox="1">
+                <a:spLocks noRot="1" noChangeAspect="1" noMove="1" noResize="1" noEditPoints="1" noAdjustHandles="1" noChangeArrowheads="1" noChangeShapeType="1" noTextEdit="1"/>
+              </p:cNvSpPr>
+              <p:nvPr/>
+            </p:nvSpPr>
+            <p:spPr>
+              <a:xfrm>
+                <a:off x="18731141" y="5522900"/>
+                <a:ext cx="5028339" cy="1771254"/>
+              </a:xfrm>
+              <a:prstGeom prst="rect">
+                <a:avLst/>
+              </a:prstGeom>
+              <a:blipFill>
+                <a:blip r:embed="rId15"/>
+                <a:stretch>
+                  <a:fillRect l="-1333" t="-2062" b="-5155"/>
+                </a:stretch>
+              </a:blipFill>
+            </p:spPr>
+            <p:txBody>
+              <a:bodyPr/>
+              <a:lstStyle/>
+              <a:p>
+                <a:r>
+                  <a:rPr lang="en-US">
+                    <a:noFill/>
+                  </a:rPr>
+                  <a:t> </a:t>
+                </a:r>
+              </a:p>
+            </p:txBody>
+          </p:sp>
+        </mc:Fallback>
+      </mc:AlternateContent>
       <p:sp>
         <p:nvSpPr>
-          <p:cNvPr id="49" name="TextBox 48"/>
+          <p:cNvPr id="51" name="TextBox 50">
+            <a:extLst>
+              <a:ext uri="{FF2B5EF4-FFF2-40B4-BE49-F238E27FC236}">
+                <a16:creationId xmlns:a16="http://schemas.microsoft.com/office/drawing/2014/main" id="{B5A937F8-C361-4646-A97C-459B3A61504E}"/>
+              </a:ext>
+            </a:extLst>
+          </p:cNvPr>
           <p:cNvSpPr txBox="1"/>
           <p:nvPr/>
         </p:nvSpPr>
         <p:spPr>
           <a:xfrm>
-            <a:off x="7667632" y="20069323"/>
-            <a:ext cx="4151372" cy="461665"/>
+            <a:off x="12902886" y="10362961"/>
+            <a:ext cx="5028339" cy="707886"/>
           </a:xfrm>
           <a:prstGeom prst="rect">
             <a:avLst/>
@@ -4103,26 +5054,338 @@
           </a:bodyPr>
           <a:lstStyle/>
           <a:p>
+            <a:pPr>
+              <a:defRPr/>
+            </a:pPr>
             <a:r>
-              <a:rPr lang="en-US"/>
-              <a:t>Annoying blank space here </a:t>
+              <a:rPr lang="en-US" sz="2000" b="0" dirty="0">
+                <a:latin typeface="Calibri" charset="0"/>
+              </a:rPr>
+              <a:t>Use DFI network to make faces look older or add a moustache to the face. [X]</a:t>
             </a:r>
-            <a:r>
-              <a:rPr lang="en-US">
-                <a:sym typeface="Wingdings"/>
-              </a:rPr>
-              <a:t></a:t>
-            </a:r>
-            <a:endParaRPr lang="en-US" dirty="0"/>
           </a:p>
         </p:txBody>
       </p:sp>
       <p:sp>
         <p:nvSpPr>
-          <p:cNvPr id="2" name="Rectangle 1">
+          <p:cNvPr id="52" name="TextBox 51">
             <a:extLst>
               <a:ext uri="{FF2B5EF4-FFF2-40B4-BE49-F238E27FC236}">
-                <a16:creationId xmlns:a16="http://schemas.microsoft.com/office/drawing/2014/main" id="{F56CF026-2437-400B-8D77-36D9BD54E57E}"/>
+                <a16:creationId xmlns:a16="http://schemas.microsoft.com/office/drawing/2014/main" id="{5B573FA1-48FA-4188-A006-2D497FA6855A}"/>
+              </a:ext>
+            </a:extLst>
+          </p:cNvPr>
+          <p:cNvSpPr txBox="1"/>
+          <p:nvPr/>
+        </p:nvSpPr>
+        <p:spPr>
+          <a:xfrm>
+            <a:off x="18853709" y="11149553"/>
+            <a:ext cx="4741676" cy="707886"/>
+          </a:xfrm>
+          <a:prstGeom prst="rect">
+            <a:avLst/>
+          </a:prstGeom>
+          <a:noFill/>
+        </p:spPr>
+        <p:txBody>
+          <a:bodyPr wrap="square" rtlCol="0">
+            <a:spAutoFit/>
+          </a:bodyPr>
+          <a:lstStyle/>
+          <a:p>
+            <a:pPr>
+              <a:defRPr/>
+            </a:pPr>
+            <a:r>
+              <a:rPr lang="en-US" sz="2000" b="0" dirty="0">
+                <a:latin typeface="Calibri" charset="0"/>
+              </a:rPr>
+              <a:t>Replace each pixel by the average of its neighbors within a specified </a:t>
+            </a:r>
+            <a:r>
+              <a:rPr lang="en-US" sz="2000" b="0" dirty="0" err="1">
+                <a:latin typeface="Calibri" charset="0"/>
+              </a:rPr>
+              <a:t>windowsize</a:t>
+            </a:r>
+            <a:r>
+              <a:rPr lang="en-US" sz="2000" b="0" dirty="0">
+                <a:latin typeface="Calibri" charset="0"/>
+              </a:rPr>
+              <a:t>.</a:t>
+            </a:r>
+          </a:p>
+        </p:txBody>
+      </p:sp>
+      <p:sp>
+        <p:nvSpPr>
+          <p:cNvPr id="18" name="TextBox 17">
+            <a:extLst>
+              <a:ext uri="{FF2B5EF4-FFF2-40B4-BE49-F238E27FC236}">
+                <a16:creationId xmlns:a16="http://schemas.microsoft.com/office/drawing/2014/main" id="{4662D3E9-9ECD-4FA3-81B8-390F9A9855D5}"/>
+              </a:ext>
+            </a:extLst>
+          </p:cNvPr>
+          <p:cNvSpPr txBox="1"/>
+          <p:nvPr/>
+        </p:nvSpPr>
+        <p:spPr>
+          <a:xfrm>
+            <a:off x="12902886" y="11503496"/>
+            <a:ext cx="4741676" cy="3416320"/>
+          </a:xfrm>
+          <a:prstGeom prst="rect">
+            <a:avLst/>
+          </a:prstGeom>
+          <a:noFill/>
+          <a:ln>
+            <a:solidFill>
+              <a:schemeClr val="accent6"/>
+            </a:solidFill>
+          </a:ln>
+        </p:spPr>
+        <p:txBody>
+          <a:bodyPr wrap="square" rtlCol="0">
+            <a:spAutoFit/>
+          </a:bodyPr>
+          <a:lstStyle/>
+          <a:p>
+            <a:endParaRPr lang="en-US" dirty="0"/>
+          </a:p>
+          <a:p>
+            <a:endParaRPr lang="en-US" dirty="0"/>
+          </a:p>
+          <a:p>
+            <a:endParaRPr lang="en-US" dirty="0"/>
+          </a:p>
+          <a:p>
+            <a:endParaRPr lang="en-US" dirty="0"/>
+          </a:p>
+          <a:p>
+            <a:endParaRPr lang="en-US" dirty="0"/>
+          </a:p>
+          <a:p>
+            <a:endParaRPr lang="en-US" dirty="0"/>
+          </a:p>
+          <a:p>
+            <a:endParaRPr lang="en-US" dirty="0"/>
+          </a:p>
+          <a:p>
+            <a:endParaRPr lang="en-US" dirty="0"/>
+          </a:p>
+          <a:p>
+            <a:endParaRPr lang="en-US" dirty="0"/>
+          </a:p>
+        </p:txBody>
+      </p:sp>
+      <p:sp>
+        <p:nvSpPr>
+          <p:cNvPr id="19" name="TextBox 18">
+            <a:extLst>
+              <a:ext uri="{FF2B5EF4-FFF2-40B4-BE49-F238E27FC236}">
+                <a16:creationId xmlns:a16="http://schemas.microsoft.com/office/drawing/2014/main" id="{006BBDAA-FDA5-4712-862E-EF1E7AB2B4D3}"/>
+              </a:ext>
+            </a:extLst>
+          </p:cNvPr>
+          <p:cNvSpPr txBox="1"/>
+          <p:nvPr/>
+        </p:nvSpPr>
+        <p:spPr>
+          <a:xfrm>
+            <a:off x="12902886" y="11770988"/>
+            <a:ext cx="1590364" cy="3046988"/>
+          </a:xfrm>
+          <a:prstGeom prst="rect">
+            <a:avLst/>
+          </a:prstGeom>
+        </p:spPr>
+        <p:style>
+          <a:lnRef idx="2">
+            <a:schemeClr val="dk1"/>
+          </a:lnRef>
+          <a:fillRef idx="1">
+            <a:schemeClr val="lt1"/>
+          </a:fillRef>
+          <a:effectRef idx="0">
+            <a:schemeClr val="dk1"/>
+          </a:effectRef>
+          <a:fontRef idx="minor">
+            <a:schemeClr val="dk1"/>
+          </a:fontRef>
+        </p:style>
+        <p:txBody>
+          <a:bodyPr wrap="square" rtlCol="0">
+            <a:spAutoFit/>
+          </a:bodyPr>
+          <a:lstStyle/>
+          <a:p>
+            <a:r>
+              <a:rPr lang="en-US" dirty="0"/>
+              <a:t>Original pic</a:t>
+            </a:r>
+          </a:p>
+          <a:p>
+            <a:endParaRPr lang="en-US" dirty="0"/>
+          </a:p>
+          <a:p>
+            <a:endParaRPr lang="en-US" dirty="0"/>
+          </a:p>
+          <a:p>
+            <a:endParaRPr lang="en-US" dirty="0"/>
+          </a:p>
+          <a:p>
+            <a:endParaRPr lang="en-US" dirty="0"/>
+          </a:p>
+          <a:p>
+            <a:endParaRPr lang="en-US" dirty="0"/>
+          </a:p>
+          <a:p>
+            <a:endParaRPr lang="en-US" dirty="0"/>
+          </a:p>
+        </p:txBody>
+      </p:sp>
+      <p:sp>
+        <p:nvSpPr>
+          <p:cNvPr id="53" name="TextBox 52">
+            <a:extLst>
+              <a:ext uri="{FF2B5EF4-FFF2-40B4-BE49-F238E27FC236}">
+                <a16:creationId xmlns:a16="http://schemas.microsoft.com/office/drawing/2014/main" id="{90D3C848-4F86-4BCF-BB38-22296BFFE0CF}"/>
+              </a:ext>
+            </a:extLst>
+          </p:cNvPr>
+          <p:cNvSpPr txBox="1"/>
+          <p:nvPr/>
+        </p:nvSpPr>
+        <p:spPr>
+          <a:xfrm>
+            <a:off x="14413049" y="11782237"/>
+            <a:ext cx="1590364" cy="3046988"/>
+          </a:xfrm>
+          <a:prstGeom prst="rect">
+            <a:avLst/>
+          </a:prstGeom>
+        </p:spPr>
+        <p:style>
+          <a:lnRef idx="2">
+            <a:schemeClr val="dk1"/>
+          </a:lnRef>
+          <a:fillRef idx="1">
+            <a:schemeClr val="lt1"/>
+          </a:fillRef>
+          <a:effectRef idx="0">
+            <a:schemeClr val="dk1"/>
+          </a:effectRef>
+          <a:fontRef idx="minor">
+            <a:schemeClr val="dk1"/>
+          </a:fontRef>
+        </p:style>
+        <p:txBody>
+          <a:bodyPr wrap="square" rtlCol="0">
+            <a:spAutoFit/>
+          </a:bodyPr>
+          <a:lstStyle/>
+          <a:p>
+            <a:r>
+              <a:rPr lang="en-US" dirty="0"/>
+              <a:t>Older pic</a:t>
+            </a:r>
+          </a:p>
+          <a:p>
+            <a:endParaRPr lang="en-US" dirty="0"/>
+          </a:p>
+          <a:p>
+            <a:endParaRPr lang="en-US" dirty="0"/>
+          </a:p>
+          <a:p>
+            <a:endParaRPr lang="en-US" dirty="0"/>
+          </a:p>
+          <a:p>
+            <a:endParaRPr lang="en-US" dirty="0"/>
+          </a:p>
+          <a:p>
+            <a:endParaRPr lang="en-US" dirty="0"/>
+          </a:p>
+          <a:p>
+            <a:endParaRPr lang="en-US" dirty="0"/>
+          </a:p>
+          <a:p>
+            <a:endParaRPr lang="en-US" dirty="0"/>
+          </a:p>
+        </p:txBody>
+      </p:sp>
+      <p:sp>
+        <p:nvSpPr>
+          <p:cNvPr id="54" name="TextBox 53">
+            <a:extLst>
+              <a:ext uri="{FF2B5EF4-FFF2-40B4-BE49-F238E27FC236}">
+                <a16:creationId xmlns:a16="http://schemas.microsoft.com/office/drawing/2014/main" id="{87BB1F18-41DD-48F1-8040-03AA8015C748}"/>
+              </a:ext>
+            </a:extLst>
+          </p:cNvPr>
+          <p:cNvSpPr txBox="1"/>
+          <p:nvPr/>
+        </p:nvSpPr>
+        <p:spPr>
+          <a:xfrm>
+            <a:off x="15980845" y="11770988"/>
+            <a:ext cx="1590364" cy="3046988"/>
+          </a:xfrm>
+          <a:prstGeom prst="rect">
+            <a:avLst/>
+          </a:prstGeom>
+        </p:spPr>
+        <p:style>
+          <a:lnRef idx="2">
+            <a:schemeClr val="dk1"/>
+          </a:lnRef>
+          <a:fillRef idx="1">
+            <a:schemeClr val="lt1"/>
+          </a:fillRef>
+          <a:effectRef idx="0">
+            <a:schemeClr val="dk1"/>
+          </a:effectRef>
+          <a:fontRef idx="minor">
+            <a:schemeClr val="dk1"/>
+          </a:fontRef>
+        </p:style>
+        <p:txBody>
+          <a:bodyPr wrap="square" rtlCol="0">
+            <a:spAutoFit/>
+          </a:bodyPr>
+          <a:lstStyle/>
+          <a:p>
+            <a:r>
+              <a:rPr lang="en-US" dirty="0"/>
+              <a:t>moustache pic</a:t>
+            </a:r>
+          </a:p>
+          <a:p>
+            <a:endParaRPr lang="en-US" dirty="0"/>
+          </a:p>
+          <a:p>
+            <a:endParaRPr lang="en-US" dirty="0"/>
+          </a:p>
+          <a:p>
+            <a:endParaRPr lang="en-US" dirty="0"/>
+          </a:p>
+          <a:p>
+            <a:endParaRPr lang="en-US" dirty="0"/>
+          </a:p>
+          <a:p>
+            <a:endParaRPr lang="en-US" dirty="0"/>
+          </a:p>
+          <a:p>
+            <a:endParaRPr lang="en-US" dirty="0"/>
+          </a:p>
+        </p:txBody>
+      </p:sp>
+      <p:sp>
+        <p:nvSpPr>
+          <p:cNvPr id="20" name="Rectangle 19">
+            <a:extLst>
+              <a:ext uri="{FF2B5EF4-FFF2-40B4-BE49-F238E27FC236}">
+                <a16:creationId xmlns:a16="http://schemas.microsoft.com/office/drawing/2014/main" id="{3CAE3BEA-A501-4FE2-8519-F5F66F4F5354}"/>
               </a:ext>
             </a:extLst>
           </p:cNvPr>
@@ -4130,9 +5393,9 @@
           <p:nvPr/>
         </p:nvSpPr>
         <p:spPr>
-          <a:xfrm rot="10377139" flipV="1">
-            <a:off x="13490792" y="22073186"/>
-            <a:ext cx="8129556" cy="830997"/>
+          <a:xfrm>
+            <a:off x="12378667" y="22262469"/>
+            <a:ext cx="11555247" cy="954107"/>
           </a:xfrm>
           <a:prstGeom prst="rect">
             <a:avLst/>
@@ -4144,10 +5407,167 @@
           </a:bodyPr>
           <a:lstStyle/>
           <a:p>
+            <a:pPr>
+              <a:defRPr/>
+            </a:pPr>
+            <a:endParaRPr lang="en-US" b="0" dirty="0">
+              <a:latin typeface="Calibri" charset="0"/>
+            </a:endParaRPr>
+          </a:p>
+          <a:p>
+            <a:pPr>
+              <a:defRPr/>
+            </a:pPr>
+            <a:r>
+              <a:rPr lang="en-US" sz="3200" dirty="0">
+                <a:latin typeface="Calibri" charset="0"/>
+              </a:rPr>
+              <a:t>Performance with Distortion</a:t>
+            </a:r>
+          </a:p>
+        </p:txBody>
+      </p:sp>
+      <p:sp>
+        <p:nvSpPr>
+          <p:cNvPr id="21" name="TextBox 20">
+            <a:extLst>
+              <a:ext uri="{FF2B5EF4-FFF2-40B4-BE49-F238E27FC236}">
+                <a16:creationId xmlns:a16="http://schemas.microsoft.com/office/drawing/2014/main" id="{7E29A687-3D42-4B37-9A48-72C3DB8BEEFC}"/>
+              </a:ext>
+            </a:extLst>
+          </p:cNvPr>
+          <p:cNvSpPr txBox="1"/>
+          <p:nvPr/>
+        </p:nvSpPr>
+        <p:spPr>
+          <a:xfrm>
+            <a:off x="12417574" y="18744078"/>
+            <a:ext cx="11684394" cy="3416320"/>
+          </a:xfrm>
+          <a:prstGeom prst="rect">
+            <a:avLst/>
+          </a:prstGeom>
+        </p:spPr>
+        <p:style>
+          <a:lnRef idx="2">
+            <a:schemeClr val="dk1"/>
+          </a:lnRef>
+          <a:fillRef idx="1">
+            <a:schemeClr val="lt1"/>
+          </a:fillRef>
+          <a:effectRef idx="0">
+            <a:schemeClr val="dk1"/>
+          </a:effectRef>
+          <a:fontRef idx="minor">
+            <a:schemeClr val="dk1"/>
+          </a:fontRef>
+        </p:style>
+        <p:txBody>
+          <a:bodyPr wrap="square" rtlCol="0">
+            <a:spAutoFit/>
+          </a:bodyPr>
+          <a:lstStyle/>
+          <a:p>
             <a:r>
               <a:rPr lang="en-US" dirty="0"/>
-              <a:t>If there’s space, could describe the algorithms here and put the results in the other column.</a:t>
+              <a:t>BASELINE PERFORMANCE PLOT</a:t>
             </a:r>
+          </a:p>
+          <a:p>
+            <a:endParaRPr lang="en-US" dirty="0"/>
+          </a:p>
+          <a:p>
+            <a:endParaRPr lang="en-US" dirty="0"/>
+          </a:p>
+          <a:p>
+            <a:endParaRPr lang="en-US" dirty="0"/>
+          </a:p>
+          <a:p>
+            <a:endParaRPr lang="en-US" dirty="0"/>
+          </a:p>
+          <a:p>
+            <a:endParaRPr lang="en-US" dirty="0"/>
+          </a:p>
+          <a:p>
+            <a:endParaRPr lang="en-US" dirty="0"/>
+          </a:p>
+          <a:p>
+            <a:endParaRPr lang="en-US" dirty="0"/>
+          </a:p>
+          <a:p>
+            <a:endParaRPr lang="en-US" dirty="0"/>
+          </a:p>
+        </p:txBody>
+      </p:sp>
+      <p:sp>
+        <p:nvSpPr>
+          <p:cNvPr id="56" name="TextBox 55">
+            <a:extLst>
+              <a:ext uri="{FF2B5EF4-FFF2-40B4-BE49-F238E27FC236}">
+                <a16:creationId xmlns:a16="http://schemas.microsoft.com/office/drawing/2014/main" id="{8F0D1DD6-A904-470B-BBAB-4A9B662C15C0}"/>
+              </a:ext>
+            </a:extLst>
+          </p:cNvPr>
+          <p:cNvSpPr txBox="1"/>
+          <p:nvPr/>
+        </p:nvSpPr>
+        <p:spPr>
+          <a:xfrm>
+            <a:off x="12471701" y="23411133"/>
+            <a:ext cx="11684394" cy="3416320"/>
+          </a:xfrm>
+          <a:prstGeom prst="rect">
+            <a:avLst/>
+          </a:prstGeom>
+        </p:spPr>
+        <p:style>
+          <a:lnRef idx="2">
+            <a:schemeClr val="dk1"/>
+          </a:lnRef>
+          <a:fillRef idx="1">
+            <a:schemeClr val="lt1"/>
+          </a:fillRef>
+          <a:effectRef idx="0">
+            <a:schemeClr val="dk1"/>
+          </a:effectRef>
+          <a:fontRef idx="minor">
+            <a:schemeClr val="dk1"/>
+          </a:fontRef>
+        </p:style>
+        <p:txBody>
+          <a:bodyPr wrap="square" rtlCol="0">
+            <a:spAutoFit/>
+          </a:bodyPr>
+          <a:lstStyle/>
+          <a:p>
+            <a:r>
+              <a:rPr lang="en-US" dirty="0"/>
+              <a:t>PLOT PERFORMANCES WITH DISTORTIONS</a:t>
+            </a:r>
+          </a:p>
+          <a:p>
+            <a:endParaRPr lang="en-US" dirty="0"/>
+          </a:p>
+          <a:p>
+            <a:endParaRPr lang="en-US" dirty="0"/>
+          </a:p>
+          <a:p>
+            <a:endParaRPr lang="en-US" dirty="0"/>
+          </a:p>
+          <a:p>
+            <a:endParaRPr lang="en-US" dirty="0"/>
+          </a:p>
+          <a:p>
+            <a:endParaRPr lang="en-US" dirty="0"/>
+          </a:p>
+          <a:p>
+            <a:endParaRPr lang="en-US" dirty="0"/>
+          </a:p>
+          <a:p>
+            <a:endParaRPr lang="en-US" dirty="0"/>
+          </a:p>
+          <a:p>
+            <a:endParaRPr lang="en-US" dirty="0"/>
           </a:p>
         </p:txBody>
       </p:sp>

</xml_diff>

<commit_message>
Make dfi plot title uppercase.
</commit_message>
<xml_diff>
--- a/poster.pptx
+++ b/poster.pptx
@@ -4033,8 +4033,8 @@
           </a:p>
         </p:txBody>
       </p:sp>
-      <mc:AlternateContent xmlns:mc="http://schemas.openxmlformats.org/markup-compatibility/2006">
-        <mc:Choice xmlns:a14="http://schemas.microsoft.com/office/drawing/2010/main" Requires="a14">
+      <mc:AlternateContent xmlns:mc="http://schemas.openxmlformats.org/markup-compatibility/2006" xmlns:a14="http://schemas.microsoft.com/office/drawing/2010/main">
+        <mc:Choice Requires="a14">
           <p:sp>
             <p:nvSpPr>
               <p:cNvPr id="50" name="TextBox 49">
@@ -4288,7 +4288,7 @@
             </p:txBody>
           </p:sp>
         </mc:Choice>
-        <mc:Fallback>
+        <mc:Fallback xmlns="">
           <p:sp>
             <p:nvSpPr>
               <p:cNvPr id="50" name="TextBox 49">
@@ -4795,44 +4795,8 @@
           </a:prstGeom>
         </p:spPr>
       </p:pic>
-      <p:pic>
-        <p:nvPicPr>
-          <p:cNvPr id="27" name="Picture 26" descr="A screenshot of a cell phone&#10;&#10;Description generated with very high confidence">
-            <a:extLst>
-              <a:ext uri="{FF2B5EF4-FFF2-40B4-BE49-F238E27FC236}">
-                <a16:creationId xmlns:a16="http://schemas.microsoft.com/office/drawing/2014/main" id="{E24ACED1-81E5-4EBE-928E-3176CB993108}"/>
-              </a:ext>
-            </a:extLst>
-          </p:cNvPr>
-          <p:cNvPicPr>
-            <a:picLocks noChangeAspect="1"/>
-          </p:cNvPicPr>
-          <p:nvPr/>
-        </p:nvPicPr>
-        <p:blipFill>
-          <a:blip r:embed="rId18">
-            <a:extLst>
-              <a:ext uri="{28A0092B-C50C-407E-A947-70E740481C1C}">
-                <a14:useLocalDpi xmlns:a14="http://schemas.microsoft.com/office/drawing/2010/main" val="0"/>
-              </a:ext>
-            </a:extLst>
-          </a:blip>
-          <a:stretch>
-            <a:fillRect/>
-          </a:stretch>
-        </p:blipFill>
-        <p:spPr>
-          <a:xfrm>
-            <a:off x="24826987" y="10752059"/>
-            <a:ext cx="5487650" cy="3658433"/>
-          </a:xfrm>
-          <a:prstGeom prst="rect">
-            <a:avLst/>
-          </a:prstGeom>
-        </p:spPr>
-      </p:pic>
-      <mc:AlternateContent xmlns:mc="http://schemas.openxmlformats.org/markup-compatibility/2006">
-        <mc:Choice xmlns:a14="http://schemas.microsoft.com/office/drawing/2010/main" Requires="a14">
+      <mc:AlternateContent xmlns:mc="http://schemas.openxmlformats.org/markup-compatibility/2006" xmlns:a14="http://schemas.microsoft.com/office/drawing/2010/main">
+        <mc:Choice Requires="a14">
           <p:sp>
             <p:nvSpPr>
               <p:cNvPr id="65" name="TextBox 64">
@@ -5635,7 +5599,7 @@
             </p:txBody>
           </p:sp>
         </mc:Choice>
-        <mc:Fallback>
+        <mc:Fallback xmlns="">
           <p:sp>
             <p:nvSpPr>
               <p:cNvPr id="65" name="TextBox 64">
@@ -5709,6 +5673,42 @@
         <p:spPr>
           <a:xfrm>
             <a:off x="24900638" y="5990681"/>
+            <a:ext cx="5487650" cy="3658433"/>
+          </a:xfrm>
+          <a:prstGeom prst="rect">
+            <a:avLst/>
+          </a:prstGeom>
+        </p:spPr>
+      </p:pic>
+      <p:pic>
+        <p:nvPicPr>
+          <p:cNvPr id="11" name="Picture 10" descr="A screenshot of a cell phone&#10;&#10;Description generated with very high confidence">
+            <a:extLst>
+              <a:ext uri="{FF2B5EF4-FFF2-40B4-BE49-F238E27FC236}">
+                <a16:creationId xmlns:a16="http://schemas.microsoft.com/office/drawing/2014/main" id="{CCF21058-8E41-48BC-AA3C-EEBF85882427}"/>
+              </a:ext>
+            </a:extLst>
+          </p:cNvPr>
+          <p:cNvPicPr>
+            <a:picLocks noChangeAspect="1"/>
+          </p:cNvPicPr>
+          <p:nvPr/>
+        </p:nvPicPr>
+        <p:blipFill>
+          <a:blip r:embed="rId21">
+            <a:extLst>
+              <a:ext uri="{28A0092B-C50C-407E-A947-70E740481C1C}">
+                <a14:useLocalDpi xmlns:a14="http://schemas.microsoft.com/office/drawing/2010/main" val="0"/>
+              </a:ext>
+            </a:extLst>
+          </a:blip>
+          <a:stretch>
+            <a:fillRect/>
+          </a:stretch>
+        </p:blipFill>
+        <p:spPr>
+          <a:xfrm>
+            <a:off x="24873607" y="10753721"/>
             <a:ext cx="5487650" cy="3658433"/>
           </a:xfrm>
           <a:prstGeom prst="rect">

</xml_diff>

<commit_message>
Change base graph in poster
</commit_message>
<xml_diff>
--- a/poster.pptx
+++ b/poster.pptx
@@ -3986,7 +3986,7 @@
           <p:cNvPr id="48" name="TextBox 47">
             <a:extLst>
               <a:ext uri="{FF2B5EF4-FFF2-40B4-BE49-F238E27FC236}">
-                <a16:creationId xmlns:a16="http://schemas.microsoft.com/office/drawing/2014/main" id="{D9C6F1D3-02AF-4D2D-AD5C-A4546F877A04}"/>
+                <a16:creationId xmlns:a16="http://schemas.microsoft.com/office/drawing/2014/main" xmlns="" id="{D9C6F1D3-02AF-4D2D-AD5C-A4546F877A04}"/>
               </a:ext>
             </a:extLst>
           </p:cNvPr>
@@ -4040,7 +4040,7 @@
               <p:cNvPr id="50" name="TextBox 49">
                 <a:extLst>
                   <a:ext uri="{FF2B5EF4-FFF2-40B4-BE49-F238E27FC236}">
-                    <a16:creationId xmlns:a16="http://schemas.microsoft.com/office/drawing/2014/main" id="{D3125782-10BA-4DA6-9538-1233D6DF295C}"/>
+                    <a16:creationId xmlns:a16="http://schemas.microsoft.com/office/drawing/2014/main" xmlns="" id="{D3125782-10BA-4DA6-9538-1233D6DF295C}"/>
                   </a:ext>
                 </a:extLst>
               </p:cNvPr>
@@ -4124,7 +4124,7 @@
                       <m:fPr>
                         <m:ctrlPr>
                           <a:rPr lang="en-US" sz="2000" b="0" i="1" smtClean="0">
-                            <a:latin typeface="Cambria Math" panose="02040503050406030204" pitchFamily="18" charset="0"/>
+                            <a:latin typeface="Cambria Math" charset="0"/>
                           </a:rPr>
                         </m:ctrlPr>
                       </m:fPr>
@@ -4153,7 +4153,7 @@
                           <m:sSupPr>
                             <m:ctrlPr>
                               <a:rPr lang="en-US" sz="2000" b="0" i="1" smtClean="0">
-                                <a:latin typeface="Cambria Math" panose="02040503050406030204" pitchFamily="18" charset="0"/>
+                                <a:latin typeface="Cambria Math" charset="0"/>
                               </a:rPr>
                             </m:ctrlPr>
                           </m:sSupPr>
@@ -4186,7 +4186,7 @@
                       <m:fPr>
                         <m:ctrlPr>
                           <a:rPr lang="en-US" sz="2000" b="0" i="1" smtClean="0">
-                            <a:latin typeface="Cambria Math" panose="02040503050406030204" pitchFamily="18" charset="0"/>
+                            <a:latin typeface="Cambria Math" charset="0"/>
                           </a:rPr>
                         </m:ctrlPr>
                       </m:fPr>
@@ -4215,7 +4215,7 @@
                           <m:sSupPr>
                             <m:ctrlPr>
                               <a:rPr lang="en-US" sz="2000" b="0" i="1" smtClean="0">
-                                <a:latin typeface="Cambria Math" panose="02040503050406030204" pitchFamily="18" charset="0"/>
+                                <a:latin typeface="Cambria Math" charset="0"/>
                               </a:rPr>
                             </m:ctrlPr>
                           </m:sSupPr>
@@ -4338,7 +4338,7 @@
           <p:cNvPr id="51" name="TextBox 50">
             <a:extLst>
               <a:ext uri="{FF2B5EF4-FFF2-40B4-BE49-F238E27FC236}">
-                <a16:creationId xmlns:a16="http://schemas.microsoft.com/office/drawing/2014/main" id="{B5A937F8-C361-4646-A97C-459B3A61504E}"/>
+                <a16:creationId xmlns:a16="http://schemas.microsoft.com/office/drawing/2014/main" xmlns="" id="{B5A937F8-C361-4646-A97C-459B3A61504E}"/>
               </a:ext>
             </a:extLst>
           </p:cNvPr>
@@ -4378,7 +4378,7 @@
           <p:cNvPr id="52" name="TextBox 51">
             <a:extLst>
               <a:ext uri="{FF2B5EF4-FFF2-40B4-BE49-F238E27FC236}">
-                <a16:creationId xmlns:a16="http://schemas.microsoft.com/office/drawing/2014/main" id="{5B573FA1-48FA-4188-A006-2D497FA6855A}"/>
+                <a16:creationId xmlns:a16="http://schemas.microsoft.com/office/drawing/2014/main" xmlns="" id="{5B573FA1-48FA-4188-A006-2D497FA6855A}"/>
               </a:ext>
             </a:extLst>
           </p:cNvPr>
@@ -4430,7 +4430,7 @@
           <p:cNvPr id="18" name="TextBox 17">
             <a:extLst>
               <a:ext uri="{FF2B5EF4-FFF2-40B4-BE49-F238E27FC236}">
-                <a16:creationId xmlns:a16="http://schemas.microsoft.com/office/drawing/2014/main" id="{4662D3E9-9ECD-4FA3-81B8-390F9A9855D5}"/>
+                <a16:creationId xmlns:a16="http://schemas.microsoft.com/office/drawing/2014/main" xmlns="" id="{4662D3E9-9ECD-4FA3-81B8-390F9A9855D5}"/>
               </a:ext>
             </a:extLst>
           </p:cNvPr>
@@ -4491,7 +4491,7 @@
           <p:cNvPr id="19" name="TextBox 18">
             <a:extLst>
               <a:ext uri="{FF2B5EF4-FFF2-40B4-BE49-F238E27FC236}">
-                <a16:creationId xmlns:a16="http://schemas.microsoft.com/office/drawing/2014/main" id="{006BBDAA-FDA5-4712-862E-EF1E7AB2B4D3}"/>
+                <a16:creationId xmlns:a16="http://schemas.microsoft.com/office/drawing/2014/main" xmlns="" id="{006BBDAA-FDA5-4712-862E-EF1E7AB2B4D3}"/>
               </a:ext>
             </a:extLst>
           </p:cNvPr>
@@ -4557,7 +4557,7 @@
           <p:cNvPr id="53" name="TextBox 52">
             <a:extLst>
               <a:ext uri="{FF2B5EF4-FFF2-40B4-BE49-F238E27FC236}">
-                <a16:creationId xmlns:a16="http://schemas.microsoft.com/office/drawing/2014/main" id="{90D3C848-4F86-4BCF-BB38-22296BFFE0CF}"/>
+                <a16:creationId xmlns:a16="http://schemas.microsoft.com/office/drawing/2014/main" xmlns="" id="{90D3C848-4F86-4BCF-BB38-22296BFFE0CF}"/>
               </a:ext>
             </a:extLst>
           </p:cNvPr>
@@ -4626,7 +4626,7 @@
           <p:cNvPr id="54" name="TextBox 53">
             <a:extLst>
               <a:ext uri="{FF2B5EF4-FFF2-40B4-BE49-F238E27FC236}">
-                <a16:creationId xmlns:a16="http://schemas.microsoft.com/office/drawing/2014/main" id="{87BB1F18-41DD-48F1-8040-03AA8015C748}"/>
+                <a16:creationId xmlns:a16="http://schemas.microsoft.com/office/drawing/2014/main" xmlns="" id="{87BB1F18-41DD-48F1-8040-03AA8015C748}"/>
               </a:ext>
             </a:extLst>
           </p:cNvPr>
@@ -4689,10 +4689,10 @@
       </p:sp>
       <p:pic>
         <p:nvPicPr>
-          <p:cNvPr id="15" name="Picture 14" descr="A screenshot of a cell phone&#10;&#10;Description generated with very high confidence">
+          <p:cNvPr id="15" name="Picture 14">
             <a:extLst>
               <a:ext uri="{FF2B5EF4-FFF2-40B4-BE49-F238E27FC236}">
-                <a16:creationId xmlns:a16="http://schemas.microsoft.com/office/drawing/2014/main" id="{4437C01A-ADA0-4010-9246-AE26BCA35816}"/>
+                <a16:creationId xmlns:a16="http://schemas.microsoft.com/office/drawing/2014/main" xmlns="" id="{4437C01A-ADA0-4010-9246-AE26BCA35816}"/>
               </a:ext>
             </a:extLst>
           </p:cNvPr>
@@ -4715,8 +4715,8 @@
         </p:blipFill>
         <p:spPr>
           <a:xfrm>
-            <a:off x="14900737" y="20437721"/>
-            <a:ext cx="5487650" cy="3658433"/>
+            <a:off x="14883692" y="19886340"/>
+            <a:ext cx="6114679" cy="4586010"/>
           </a:xfrm>
           <a:prstGeom prst="rect">
             <a:avLst/>
@@ -4728,7 +4728,7 @@
           <p:cNvPr id="23" name="Picture 22" descr="A screenshot of a cell phone&#10;&#10;Description generated with very high confidence">
             <a:extLst>
               <a:ext uri="{FF2B5EF4-FFF2-40B4-BE49-F238E27FC236}">
-                <a16:creationId xmlns:a16="http://schemas.microsoft.com/office/drawing/2014/main" id="{BABAE0BD-F4B4-44DF-B4F6-B18DEF29E73D}"/>
+                <a16:creationId xmlns:a16="http://schemas.microsoft.com/office/drawing/2014/main" xmlns="" id="{BABAE0BD-F4B4-44DF-B4F6-B18DEF29E73D}"/>
               </a:ext>
             </a:extLst>
           </p:cNvPr>
@@ -4764,7 +4764,7 @@
           <p:cNvPr id="25" name="Picture 24" descr="A screenshot of a cell phone&#10;&#10;Description generated with very high confidence">
             <a:extLst>
               <a:ext uri="{FF2B5EF4-FFF2-40B4-BE49-F238E27FC236}">
-                <a16:creationId xmlns:a16="http://schemas.microsoft.com/office/drawing/2014/main" id="{DE95F0EC-F99C-4DD5-AD92-919571B8CB48}"/>
+                <a16:creationId xmlns:a16="http://schemas.microsoft.com/office/drawing/2014/main" xmlns="" id="{DE95F0EC-F99C-4DD5-AD92-919571B8CB48}"/>
               </a:ext>
             </a:extLst>
           </p:cNvPr>
@@ -4802,7 +4802,7 @@
               <p:cNvPr id="65" name="TextBox 64">
                 <a:extLst>
                   <a:ext uri="{FF2B5EF4-FFF2-40B4-BE49-F238E27FC236}">
-                    <a16:creationId xmlns:a16="http://schemas.microsoft.com/office/drawing/2014/main" id="{2C57997F-D395-4221-B117-91AC8D3BD8F5}"/>
+                    <a16:creationId xmlns:a16="http://schemas.microsoft.com/office/drawing/2014/main" xmlns="" id="{2C57997F-D395-4221-B117-91AC8D3BD8F5}"/>
                   </a:ext>
                 </a:extLst>
               </p:cNvPr>
@@ -4878,7 +4878,7 @@
                       <m:sSubPr>
                         <m:ctrlPr>
                           <a:rPr lang="en-US" sz="3200" b="0" i="1" smtClean="0">
-                            <a:latin typeface="Cambria Math" panose="02040503050406030204" pitchFamily="18" charset="0"/>
+                            <a:latin typeface="Cambria Math" charset="0"/>
                           </a:rPr>
                         </m:ctrlPr>
                       </m:sSubPr>
@@ -4934,7 +4934,7 @@
                       <m:sSubPr>
                         <m:ctrlPr>
                           <a:rPr lang="en-US" sz="3200" b="0" i="1" smtClean="0">
-                            <a:latin typeface="Cambria Math" panose="02040503050406030204" pitchFamily="18" charset="0"/>
+                            <a:latin typeface="Cambria Math" charset="0"/>
                           </a:rPr>
                         </m:ctrlPr>
                       </m:sSubPr>
@@ -4959,7 +4959,7 @@
                       <m:sSubPr>
                         <m:ctrlPr>
                           <a:rPr lang="en-US" sz="3200" b="0" i="1" smtClean="0">
-                            <a:latin typeface="Cambria Math" panose="02040503050406030204" pitchFamily="18" charset="0"/>
+                            <a:latin typeface="Cambria Math" charset="0"/>
                           </a:rPr>
                         </m:ctrlPr>
                       </m:sSubPr>
@@ -4970,7 +4970,7 @@
                             <m:endChr m:val="|"/>
                             <m:ctrlPr>
                               <a:rPr lang="en-US" sz="3200" b="0" i="1" smtClean="0">
-                                <a:latin typeface="Cambria Math" panose="02040503050406030204" pitchFamily="18" charset="0"/>
+                                <a:latin typeface="Cambria Math" charset="0"/>
                               </a:rPr>
                             </m:ctrlPr>
                           </m:dPr>
@@ -4981,7 +4981,7 @@
                                 <m:endChr m:val="|"/>
                                 <m:ctrlPr>
                                   <a:rPr lang="en-US" sz="3200" b="0" i="1" smtClean="0">
-                                    <a:latin typeface="Cambria Math" panose="02040503050406030204" pitchFamily="18" charset="0"/>
+                                    <a:latin typeface="Cambria Math" charset="0"/>
                                   </a:rPr>
                                 </m:ctrlPr>
                               </m:dPr>
@@ -5104,7 +5104,7 @@
                       <m:sSubPr>
                         <m:ctrlPr>
                           <a:rPr lang="en-US" sz="3200" b="0" i="1" smtClean="0">
-                            <a:latin typeface="Cambria Math" panose="02040503050406030204" pitchFamily="18" charset="0"/>
+                            <a:latin typeface="Cambria Math" charset="0"/>
                           </a:rPr>
                         </m:ctrlPr>
                       </m:sSubPr>
@@ -5113,7 +5113,7 @@
                           <m:funcPr>
                             <m:ctrlPr>
                               <a:rPr lang="en-US" sz="3200" b="0" i="1" smtClean="0">
-                                <a:latin typeface="Cambria Math" panose="02040503050406030204" pitchFamily="18" charset="0"/>
+                                <a:latin typeface="Cambria Math" charset="0"/>
                               </a:rPr>
                             </m:ctrlPr>
                           </m:funcPr>
@@ -5135,7 +5135,7 @@
                                 <m:endChr m:val="|"/>
                                 <m:ctrlPr>
                                   <a:rPr lang="en-US" sz="3200" b="0" i="1" smtClean="0">
-                                    <a:latin typeface="Cambria Math" panose="02040503050406030204" pitchFamily="18" charset="0"/>
+                                    <a:latin typeface="Cambria Math" charset="0"/>
                                   </a:rPr>
                                 </m:ctrlPr>
                               </m:dPr>
@@ -5146,7 +5146,7 @@
                                     <m:endChr m:val="|"/>
                                     <m:ctrlPr>
                                       <a:rPr lang="en-US" sz="3200" b="0" i="1" smtClean="0">
-                                        <a:latin typeface="Cambria Math" panose="02040503050406030204" pitchFamily="18" charset="0"/>
+                                        <a:latin typeface="Cambria Math" charset="0"/>
                                       </a:rPr>
                                     </m:ctrlPr>
                                   </m:dPr>
@@ -5185,7 +5185,7 @@
                         <m:endChr m:val="|"/>
                         <m:ctrlPr>
                           <a:rPr lang="en-US" sz="3200" b="0" i="1" smtClean="0">
-                            <a:latin typeface="Cambria Math" panose="02040503050406030204" pitchFamily="18" charset="0"/>
+                            <a:latin typeface="Cambria Math" charset="0"/>
                           </a:rPr>
                         </m:ctrlPr>
                       </m:dPr>
@@ -5196,7 +5196,7 @@
                             <m:endChr m:val="|"/>
                             <m:ctrlPr>
                               <a:rPr lang="en-US" sz="3200" b="0" i="1" smtClean="0">
-                                <a:latin typeface="Cambria Math" panose="02040503050406030204" pitchFamily="18" charset="0"/>
+                                <a:latin typeface="Cambria Math" charset="0"/>
                               </a:rPr>
                             </m:ctrlPr>
                           </m:dPr>
@@ -5314,7 +5314,7 @@
                       <m:sSubPr>
                         <m:ctrlPr>
                           <a:rPr lang="en-US" sz="3200" b="0" i="1">
-                            <a:latin typeface="Cambria Math" panose="02040503050406030204" pitchFamily="18" charset="0"/>
+                            <a:latin typeface="Cambria Math" charset="0"/>
                           </a:rPr>
                         </m:ctrlPr>
                       </m:sSubPr>
@@ -5323,7 +5323,7 @@
                           <m:funcPr>
                             <m:ctrlPr>
                               <a:rPr lang="en-US" sz="3200" b="0" i="1">
-                                <a:latin typeface="Cambria Math" panose="02040503050406030204" pitchFamily="18" charset="0"/>
+                                <a:latin typeface="Cambria Math" charset="0"/>
                               </a:rPr>
                             </m:ctrlPr>
                           </m:funcPr>
@@ -5345,7 +5345,7 @@
                                 <m:endChr m:val="|"/>
                                 <m:ctrlPr>
                                   <a:rPr lang="en-US" sz="3200" b="0" i="1">
-                                    <a:latin typeface="Cambria Math" panose="02040503050406030204" pitchFamily="18" charset="0"/>
+                                    <a:latin typeface="Cambria Math" charset="0"/>
                                   </a:rPr>
                                 </m:ctrlPr>
                               </m:dPr>
@@ -5356,7 +5356,7 @@
                                     <m:endChr m:val="|"/>
                                     <m:ctrlPr>
                                       <a:rPr lang="en-US" sz="3200" b="0" i="1">
-                                        <a:latin typeface="Cambria Math" panose="02040503050406030204" pitchFamily="18" charset="0"/>
+                                        <a:latin typeface="Cambria Math" charset="0"/>
                                       </a:rPr>
                                     </m:ctrlPr>
                                   </m:dPr>
@@ -5393,7 +5393,7 @@
                       <m:sSubPr>
                         <m:ctrlPr>
                           <a:rPr lang="en-US" sz="3200" b="0" i="1" smtClean="0">
-                            <a:latin typeface="Cambria Math" panose="02040503050406030204" pitchFamily="18" charset="0"/>
+                            <a:latin typeface="Cambria Math" charset="0"/>
                           </a:rPr>
                         </m:ctrlPr>
                       </m:sSubPr>
@@ -5404,7 +5404,7 @@
                             <m:endChr m:val="|"/>
                             <m:ctrlPr>
                               <a:rPr lang="en-US" sz="3200" b="0" i="1" smtClean="0">
-                                <a:latin typeface="Cambria Math" panose="02040503050406030204" pitchFamily="18" charset="0"/>
+                                <a:latin typeface="Cambria Math" charset="0"/>
                               </a:rPr>
                             </m:ctrlPr>
                           </m:dPr>
@@ -5415,7 +5415,7 @@
                                 <m:endChr m:val="|"/>
                                 <m:ctrlPr>
                                   <a:rPr lang="en-US" sz="3200" b="0" i="1" smtClean="0">
-                                    <a:latin typeface="Cambria Math" panose="02040503050406030204" pitchFamily="18" charset="0"/>
+                                    <a:latin typeface="Cambria Math" charset="0"/>
                                   </a:rPr>
                                 </m:ctrlPr>
                               </m:dPr>
@@ -5649,7 +5649,7 @@
           <p:cNvPr id="31" name="Picture 30" descr="A screenshot of a cell phone&#10;&#10;Description generated with very high confidence">
             <a:extLst>
               <a:ext uri="{FF2B5EF4-FFF2-40B4-BE49-F238E27FC236}">
-                <a16:creationId xmlns:a16="http://schemas.microsoft.com/office/drawing/2014/main" id="{0BFA8D0B-04CF-460A-977D-0F69FE2F4204}"/>
+                <a16:creationId xmlns:a16="http://schemas.microsoft.com/office/drawing/2014/main" xmlns="" id="{0BFA8D0B-04CF-460A-977D-0F69FE2F4204}"/>
               </a:ext>
             </a:extLst>
           </p:cNvPr>
@@ -5685,7 +5685,7 @@
           <p:cNvPr id="11" name="Picture 10" descr="A screenshot of a cell phone&#10;&#10;Description generated with very high confidence">
             <a:extLst>
               <a:ext uri="{FF2B5EF4-FFF2-40B4-BE49-F238E27FC236}">
-                <a16:creationId xmlns:a16="http://schemas.microsoft.com/office/drawing/2014/main" id="{CCF21058-8E41-48BC-AA3C-EEBF85882427}"/>
+                <a16:creationId xmlns:a16="http://schemas.microsoft.com/office/drawing/2014/main" xmlns="" id="{CCF21058-8E41-48BC-AA3C-EEBF85882427}"/>
               </a:ext>
             </a:extLst>
           </p:cNvPr>

</xml_diff>

<commit_message>
Tweak object positions and add more detail to manipulation section
</commit_message>
<xml_diff>
--- a/poster.pptx
+++ b/poster.pptx
@@ -1457,6 +1457,36 @@
           <a:chExt cx="0" cy="0"/>
         </a:xfrm>
       </p:grpSpPr>
+      <p:pic>
+        <p:nvPicPr>
+          <p:cNvPr id="12" name="Picture 11"/>
+          <p:cNvPicPr>
+            <a:picLocks noChangeAspect="1"/>
+          </p:cNvPicPr>
+          <p:nvPr/>
+        </p:nvPicPr>
+        <p:blipFill>
+          <a:blip r:embed="rId10">
+            <a:extLst>
+              <a:ext uri="{28A0092B-C50C-407E-A947-70E740481C1C}">
+                <a14:useLocalDpi xmlns:a14="http://schemas.microsoft.com/office/drawing/2010/main" val="0"/>
+              </a:ext>
+            </a:extLst>
+          </a:blip>
+          <a:stretch>
+            <a:fillRect/>
+          </a:stretch>
+        </p:blipFill>
+        <p:spPr>
+          <a:xfrm>
+            <a:off x="18858801" y="6870420"/>
+            <a:ext cx="4917773" cy="3278515"/>
+          </a:xfrm>
+          <a:prstGeom prst="rect">
+            <a:avLst/>
+          </a:prstGeom>
+        </p:spPr>
+      </p:pic>
       <p:sp>
         <p:nvSpPr>
           <p:cNvPr id="6" name="TextBox 5"/>
@@ -1593,8 +1623,8 @@
           </p:nvSpPr>
           <p:spPr>
             <a:xfrm>
-              <a:off x="985937" y="5008055"/>
-              <a:ext cx="9584948" cy="5402779"/>
+              <a:off x="985937" y="5008053"/>
+              <a:ext cx="9584948" cy="5402781"/>
             </a:xfrm>
             <a:prstGeom prst="rect">
               <a:avLst/>
@@ -1625,7 +1655,7 @@
             </a:fontRef>
           </p:style>
           <p:txBody>
-            <a:bodyPr anchor="ctr"/>
+            <a:bodyPr anchor="t"/>
             <a:lstStyle/>
             <a:p>
               <a:pPr marL="742950" indent="-742950">
@@ -1633,19 +1663,15 @@
                 <a:buChar char="§"/>
                 <a:defRPr/>
               </a:pPr>
-              <a:endParaRPr lang="en-US" sz="3200" dirty="0">
-                <a:solidFill>
-                  <a:schemeClr val="tx1"/>
-                </a:solidFill>
-                <a:latin typeface="Calibri" charset="0"/>
-              </a:endParaRPr>
-            </a:p>
-            <a:p>
-              <a:pPr marL="742950" indent="-742950">
-                <a:buFont typeface="Wingdings" charset="2"/>
-                <a:buChar char="§"/>
-                <a:defRPr/>
-              </a:pPr>
+              <a:r>
+                <a:rPr lang="en-US" sz="3200" b="0" dirty="0" smtClean="0">
+                  <a:solidFill>
+                    <a:schemeClr val="tx1"/>
+                  </a:solidFill>
+                  <a:latin typeface="Calibri" charset="0"/>
+                </a:rPr>
+                <a:t>Humans </a:t>
+              </a:r>
               <a:r>
                 <a:rPr lang="en-US" sz="3200" b="0" dirty="0">
                   <a:solidFill>
@@ -1653,7 +1679,7 @@
                   </a:solidFill>
                   <a:latin typeface="Calibri" charset="0"/>
                 </a:rPr>
-                <a:t>Humans can often recognize faces even if they are distorted or occluded.</a:t>
+                <a:t>can often recognize faces even if they are distorted or occluded.</a:t>
               </a:r>
             </a:p>
             <a:p>
@@ -1812,75 +1838,1303 @@
             <a:chExt cx="9645905" cy="3919887"/>
           </a:xfrm>
         </p:grpSpPr>
-        <p:sp>
-          <p:nvSpPr>
-            <p:cNvPr id="13" name="Rectangle 12"/>
-            <p:cNvSpPr/>
-            <p:nvPr/>
-          </p:nvSpPr>
-          <p:spPr>
-            <a:xfrm>
-              <a:off x="990599" y="4343670"/>
-              <a:ext cx="9608109" cy="3538617"/>
-            </a:xfrm>
-            <a:prstGeom prst="rect">
-              <a:avLst/>
-            </a:prstGeom>
-            <a:solidFill>
-              <a:schemeClr val="bg1"/>
-            </a:solidFill>
-            <a:ln>
-              <a:solidFill>
-                <a:srgbClr val="26269A"/>
-              </a:solidFill>
-            </a:ln>
-          </p:spPr>
-          <p:style>
-            <a:lnRef idx="2">
-              <a:schemeClr val="accent1">
-                <a:shade val="50000"/>
-              </a:schemeClr>
-            </a:lnRef>
-            <a:fillRef idx="1">
-              <a:schemeClr val="accent1"/>
-            </a:fillRef>
-            <a:effectRef idx="0">
-              <a:schemeClr val="accent1"/>
-            </a:effectRef>
-            <a:fontRef idx="minor">
-              <a:schemeClr val="lt1"/>
-            </a:fontRef>
-          </p:style>
-          <p:txBody>
-            <a:bodyPr anchor="ctr"/>
-            <a:lstStyle/>
-            <a:p>
-              <a:pPr marL="1200150" marR="0" lvl="1" indent="-742950" defTabSz="914400" eaLnBrk="1" fontAlgn="auto" latinLnBrk="0" hangingPunct="1">
-                <a:lnSpc>
-                  <a:spcPct val="100000"/>
-                </a:lnSpc>
-                <a:spcBef>
-                  <a:spcPts val="0"/>
-                </a:spcBef>
-                <a:spcAft>
-                  <a:spcPts val="0"/>
-                </a:spcAft>
-                <a:buClrTx/>
-                <a:buSzTx/>
-                <a:buFont typeface="Wingdings" charset="2"/>
-                <a:buNone/>
-                <a:tabLst/>
-                <a:defRPr/>
-              </a:pPr>
-              <a:endParaRPr lang="en-US" sz="3200" b="0" dirty="0">
+        <mc:AlternateContent xmlns:mc="http://schemas.openxmlformats.org/markup-compatibility/2006">
+          <mc:Choice xmlns:a14="http://schemas.microsoft.com/office/drawing/2010/main" Requires="a14">
+            <p:sp>
+              <p:nvSpPr>
+                <p:cNvPr id="13" name="Rectangle 12"/>
+                <p:cNvSpPr/>
+                <p:nvPr/>
+              </p:nvSpPr>
+              <p:spPr>
+                <a:xfrm>
+                  <a:off x="990599" y="4420935"/>
+                  <a:ext cx="9608109" cy="3461352"/>
+                </a:xfrm>
+                <a:prstGeom prst="rect">
+                  <a:avLst/>
+                </a:prstGeom>
                 <a:solidFill>
-                  <a:schemeClr val="tx1"/>
+                  <a:schemeClr val="bg1"/>
                 </a:solidFill>
-                <a:latin typeface="Calibri" charset="0"/>
-              </a:endParaRPr>
-            </a:p>
-          </p:txBody>
-        </p:sp>
+                <a:ln>
+                  <a:solidFill>
+                    <a:srgbClr val="26269A"/>
+                  </a:solidFill>
+                </a:ln>
+              </p:spPr>
+              <p:style>
+                <a:lnRef idx="2">
+                  <a:schemeClr val="accent1">
+                    <a:shade val="50000"/>
+                  </a:schemeClr>
+                </a:lnRef>
+                <a:fillRef idx="1">
+                  <a:schemeClr val="accent1"/>
+                </a:fillRef>
+                <a:effectRef idx="0">
+                  <a:schemeClr val="accent1"/>
+                </a:effectRef>
+                <a:fontRef idx="minor">
+                  <a:schemeClr val="lt1"/>
+                </a:fontRef>
+              </p:style>
+              <p:txBody>
+                <a:bodyPr anchor="t"/>
+                <a:lstStyle/>
+                <a:p>
+                  <a:pPr lvl="0">
+                    <a:defRPr/>
+                  </a:pPr>
+                  <a:r>
+                    <a:rPr lang="en-US" sz="3200" dirty="0">
+                      <a:solidFill>
+                        <a:prstClr val="black"/>
+                      </a:solidFill>
+                      <a:latin typeface="Calibri" charset="0"/>
+                      <a:ea typeface="ＭＳ Ｐゴシック" charset="-128"/>
+                      <a:cs typeface="ＭＳ Ｐゴシック" charset="-128"/>
+                    </a:rPr>
+                    <a:t>Face recognition algorithms</a:t>
+                  </a:r>
+                </a:p>
+                <a:p>
+                  <a:pPr marL="457200" lvl="0" indent="-457200">
+                    <a:buFont typeface="Arial" charset="0"/>
+                    <a:buChar char="•"/>
+                    <a:defRPr/>
+                  </a:pPr>
+                  <a:r>
+                    <a:rPr lang="en-US" sz="3200" b="0" u="sng" dirty="0">
+                      <a:solidFill>
+                        <a:prstClr val="black"/>
+                      </a:solidFill>
+                      <a:latin typeface="Calibri" charset="0"/>
+                      <a:ea typeface="ＭＳ Ｐゴシック" charset="-128"/>
+                      <a:cs typeface="ＭＳ Ｐゴシック" charset="-128"/>
+                    </a:rPr>
+                    <a:t>PCA</a:t>
+                  </a:r>
+                  <a:r>
+                    <a:rPr lang="en-US" sz="3200" b="0" dirty="0">
+                      <a:solidFill>
+                        <a:prstClr val="black"/>
+                      </a:solidFill>
+                      <a:latin typeface="Calibri" charset="0"/>
+                      <a:ea typeface="ＭＳ Ｐゴシック" charset="-128"/>
+                      <a:cs typeface="ＭＳ Ｐゴシック" charset="-128"/>
+                    </a:rPr>
+                    <a:t>: Compute “eigenface” face projections of test image (</a:t>
+                  </a:r>
+                  <a14:m>
+                    <m:oMath xmlns:m="http://schemas.openxmlformats.org/officeDocument/2006/math">
+                      <m:r>
+                        <m:rPr>
+                          <m:sty m:val="p"/>
+                        </m:rPr>
+                        <a:rPr lang="en-US" sz="3200" b="0">
+                          <a:solidFill>
+                            <a:prstClr val="black"/>
+                          </a:solidFill>
+                          <a:latin typeface="Cambria Math" panose="02040503050406030204" pitchFamily="18" charset="0"/>
+                          <a:ea typeface="ＭＳ Ｐゴシック" charset="-128"/>
+                          <a:cs typeface="ＭＳ Ｐゴシック" charset="-128"/>
+                        </a:rPr>
+                        <m:t>Ω</m:t>
+                      </m:r>
+                    </m:oMath>
+                  </a14:m>
+                  <a:r>
+                    <a:rPr lang="en-US" sz="3200" b="0" dirty="0">
+                      <a:solidFill>
+                        <a:prstClr val="black"/>
+                      </a:solidFill>
+                      <a:latin typeface="Calibri" charset="0"/>
+                      <a:ea typeface="ＭＳ Ｐゴシック" charset="-128"/>
+                      <a:cs typeface="ＭＳ Ｐゴシック" charset="-128"/>
+                    </a:rPr>
+                    <a:t>) and training images (</a:t>
+                  </a:r>
+                  <a14:m>
+                    <m:oMath xmlns:m="http://schemas.openxmlformats.org/officeDocument/2006/math">
+                      <m:sSub>
+                        <m:sSubPr>
+                          <m:ctrlPr>
+                            <a:rPr lang="en-US" sz="3200" b="0" i="1">
+                              <a:solidFill>
+                                <a:prstClr val="black"/>
+                              </a:solidFill>
+                              <a:latin typeface="Cambria Math" charset="0"/>
+                              <a:ea typeface="ＭＳ Ｐゴシック" charset="-128"/>
+                              <a:cs typeface="ＭＳ Ｐゴシック" charset="-128"/>
+                            </a:rPr>
+                          </m:ctrlPr>
+                        </m:sSubPr>
+                        <m:e>
+                          <m:r>
+                            <m:rPr>
+                              <m:sty m:val="p"/>
+                            </m:rPr>
+                            <a:rPr lang="en-US" sz="3200" b="0">
+                              <a:solidFill>
+                                <a:prstClr val="black"/>
+                              </a:solidFill>
+                              <a:latin typeface="Cambria Math" panose="02040503050406030204" pitchFamily="18" charset="0"/>
+                              <a:ea typeface="ＭＳ Ｐゴシック" charset="-128"/>
+                              <a:cs typeface="ＭＳ Ｐゴシック" charset="-128"/>
+                            </a:rPr>
+                            <m:t>Ω</m:t>
+                          </m:r>
+                        </m:e>
+                        <m:sub>
+                          <m:r>
+                            <a:rPr lang="en-US" sz="3200" b="0" i="1">
+                              <a:solidFill>
+                                <a:prstClr val="black"/>
+                              </a:solidFill>
+                              <a:latin typeface="Cambria Math" panose="02040503050406030204" pitchFamily="18" charset="0"/>
+                              <a:ea typeface="ＭＳ Ｐゴシック" charset="-128"/>
+                              <a:cs typeface="ＭＳ Ｐゴシック" charset="-128"/>
+                            </a:rPr>
+                            <m:t>𝑖</m:t>
+                          </m:r>
+                        </m:sub>
+                      </m:sSub>
+                    </m:oMath>
+                  </a14:m>
+                  <a:r>
+                    <a:rPr lang="en-US" sz="3200" b="0" dirty="0">
+                      <a:solidFill>
+                        <a:prstClr val="black"/>
+                      </a:solidFill>
+                      <a:latin typeface="Calibri" charset="0"/>
+                      <a:ea typeface="ＭＳ Ｐゴシック" charset="-128"/>
+                      <a:cs typeface="ＭＳ Ｐゴシック" charset="-128"/>
+                    </a:rPr>
+                    <a:t>) and solve </a:t>
+                  </a:r>
+                  <a14:m>
+                    <m:oMath xmlns:m="http://schemas.openxmlformats.org/officeDocument/2006/math">
+                      <m:r>
+                        <a:rPr lang="en-US" sz="3200" b="0" i="1">
+                          <a:solidFill>
+                            <a:prstClr val="black"/>
+                          </a:solidFill>
+                          <a:latin typeface="Cambria Math" panose="02040503050406030204" pitchFamily="18" charset="0"/>
+                          <a:ea typeface="ＭＳ Ｐゴシック" charset="-128"/>
+                          <a:cs typeface="ＭＳ Ｐゴシック" charset="-128"/>
+                        </a:rPr>
+                        <m:t>𝑙𝑎𝑏𝑒𝑙</m:t>
+                      </m:r>
+                      <m:r>
+                        <a:rPr lang="en-US" sz="3200" b="0" i="1">
+                          <a:solidFill>
+                            <a:prstClr val="black"/>
+                          </a:solidFill>
+                          <a:latin typeface="Cambria Math" panose="02040503050406030204" pitchFamily="18" charset="0"/>
+                          <a:ea typeface="ＭＳ Ｐゴシック" charset="-128"/>
+                          <a:cs typeface="ＭＳ Ｐゴシック" charset="-128"/>
+                        </a:rPr>
+                        <m:t>(</m:t>
+                      </m:r>
+                      <m:r>
+                        <a:rPr lang="en-US" sz="3200" b="0" i="1">
+                          <a:solidFill>
+                            <a:prstClr val="black"/>
+                          </a:solidFill>
+                          <a:latin typeface="Cambria Math" panose="02040503050406030204" pitchFamily="18" charset="0"/>
+                          <a:ea typeface="ＭＳ Ｐゴシック" charset="-128"/>
+                          <a:cs typeface="ＭＳ Ｐゴシック" charset="-128"/>
+                        </a:rPr>
+                        <m:t>𝑎𝑟𝑔𝑚𝑖</m:t>
+                      </m:r>
+                      <m:sSub>
+                        <m:sSubPr>
+                          <m:ctrlPr>
+                            <a:rPr lang="en-US" sz="3200" b="0" i="1">
+                              <a:solidFill>
+                                <a:prstClr val="black"/>
+                              </a:solidFill>
+                              <a:latin typeface="Cambria Math" charset="0"/>
+                              <a:ea typeface="ＭＳ Ｐゴシック" charset="-128"/>
+                              <a:cs typeface="ＭＳ Ｐゴシック" charset="-128"/>
+                            </a:rPr>
+                          </m:ctrlPr>
+                        </m:sSubPr>
+                        <m:e>
+                          <m:r>
+                            <a:rPr lang="en-US" sz="3200" b="0" i="1">
+                              <a:solidFill>
+                                <a:prstClr val="black"/>
+                              </a:solidFill>
+                              <a:latin typeface="Cambria Math" panose="02040503050406030204" pitchFamily="18" charset="0"/>
+                              <a:ea typeface="ＭＳ Ｐゴシック" charset="-128"/>
+                              <a:cs typeface="ＭＳ Ｐゴシック" charset="-128"/>
+                            </a:rPr>
+                            <m:t>𝑛</m:t>
+                          </m:r>
+                        </m:e>
+                        <m:sub>
+                          <m:r>
+                            <a:rPr lang="en-US" sz="3200" b="0" i="1">
+                              <a:solidFill>
+                                <a:prstClr val="black"/>
+                              </a:solidFill>
+                              <a:latin typeface="Cambria Math" panose="02040503050406030204" pitchFamily="18" charset="0"/>
+                              <a:ea typeface="ＭＳ Ｐゴシック" charset="-128"/>
+                              <a:cs typeface="ＭＳ Ｐゴシック" charset="-128"/>
+                            </a:rPr>
+                            <m:t>𝑖</m:t>
+                          </m:r>
+                        </m:sub>
+                      </m:sSub>
+                      <m:sSub>
+                        <m:sSubPr>
+                          <m:ctrlPr>
+                            <a:rPr lang="en-US" sz="3200" b="0" i="1">
+                              <a:solidFill>
+                                <a:prstClr val="black"/>
+                              </a:solidFill>
+                              <a:latin typeface="Cambria Math" charset="0"/>
+                              <a:ea typeface="ＭＳ Ｐゴシック" charset="-128"/>
+                              <a:cs typeface="ＭＳ Ｐゴシック" charset="-128"/>
+                            </a:rPr>
+                          </m:ctrlPr>
+                        </m:sSubPr>
+                        <m:e>
+                          <m:d>
+                            <m:dPr>
+                              <m:begChr m:val="|"/>
+                              <m:endChr m:val="|"/>
+                              <m:ctrlPr>
+                                <a:rPr lang="en-US" sz="3200" b="0" i="1">
+                                  <a:solidFill>
+                                    <a:prstClr val="black"/>
+                                  </a:solidFill>
+                                  <a:latin typeface="Cambria Math" charset="0"/>
+                                  <a:ea typeface="ＭＳ Ｐゴシック" charset="-128"/>
+                                  <a:cs typeface="ＭＳ Ｐゴシック" charset="-128"/>
+                                </a:rPr>
+                              </m:ctrlPr>
+                            </m:dPr>
+                            <m:e>
+                              <m:d>
+                                <m:dPr>
+                                  <m:begChr m:val="|"/>
+                                  <m:endChr m:val="|"/>
+                                  <m:ctrlPr>
+                                    <a:rPr lang="en-US" sz="3200" b="0" i="1">
+                                      <a:solidFill>
+                                        <a:prstClr val="black"/>
+                                      </a:solidFill>
+                                      <a:latin typeface="Cambria Math" charset="0"/>
+                                      <a:ea typeface="ＭＳ Ｐゴシック" charset="-128"/>
+                                      <a:cs typeface="ＭＳ Ｐゴシック" charset="-128"/>
+                                    </a:rPr>
+                                  </m:ctrlPr>
+                                </m:dPr>
+                                <m:e>
+                                  <m:r>
+                                    <m:rPr>
+                                      <m:sty m:val="p"/>
+                                    </m:rPr>
+                                    <a:rPr lang="en-US" sz="3200" b="0">
+                                      <a:solidFill>
+                                        <a:prstClr val="black"/>
+                                      </a:solidFill>
+                                      <a:latin typeface="Cambria Math" panose="02040503050406030204" pitchFamily="18" charset="0"/>
+                                      <a:ea typeface="ＭＳ Ｐゴシック" charset="-128"/>
+                                      <a:cs typeface="ＭＳ Ｐゴシック" charset="-128"/>
+                                    </a:rPr>
+                                    <m:t>Ω</m:t>
+                                  </m:r>
+                                  <m:r>
+                                    <a:rPr lang="en-US" sz="3200" b="0" i="1">
+                                      <a:solidFill>
+                                        <a:prstClr val="black"/>
+                                      </a:solidFill>
+                                      <a:latin typeface="Cambria Math" panose="02040503050406030204" pitchFamily="18" charset="0"/>
+                                      <a:ea typeface="ＭＳ Ｐゴシック" charset="-128"/>
+                                      <a:cs typeface="ＭＳ Ｐゴシック" charset="-128"/>
+                                    </a:rPr>
+                                    <m:t>−</m:t>
+                                  </m:r>
+                                  <m:r>
+                                    <m:rPr>
+                                      <m:sty m:val="p"/>
+                                    </m:rPr>
+                                    <a:rPr lang="en-US" sz="3200" b="0">
+                                      <a:solidFill>
+                                        <a:prstClr val="black"/>
+                                      </a:solidFill>
+                                      <a:latin typeface="Cambria Math" panose="02040503050406030204" pitchFamily="18" charset="0"/>
+                                      <a:ea typeface="ＭＳ Ｐゴシック" charset="-128"/>
+                                      <a:cs typeface="ＭＳ Ｐゴシック" charset="-128"/>
+                                    </a:rPr>
+                                    <m:t>Ω</m:t>
+                                  </m:r>
+                                  <m:r>
+                                    <a:rPr lang="en-US" sz="3200" b="0" i="1">
+                                      <a:solidFill>
+                                        <a:prstClr val="black"/>
+                                      </a:solidFill>
+                                      <a:latin typeface="Cambria Math" panose="02040503050406030204" pitchFamily="18" charset="0"/>
+                                      <a:ea typeface="ＭＳ Ｐゴシック" charset="-128"/>
+                                      <a:cs typeface="ＭＳ Ｐゴシック" charset="-128"/>
+                                    </a:rPr>
+                                    <m:t>𝑖</m:t>
+                                  </m:r>
+                                </m:e>
+                              </m:d>
+                            </m:e>
+                          </m:d>
+                        </m:e>
+                        <m:sub>
+                          <m:r>
+                            <a:rPr lang="en-US" sz="3200" b="0" i="1">
+                              <a:solidFill>
+                                <a:prstClr val="black"/>
+                              </a:solidFill>
+                              <a:latin typeface="Cambria Math" panose="02040503050406030204" pitchFamily="18" charset="0"/>
+                              <a:ea typeface="ＭＳ Ｐゴシック" charset="-128"/>
+                              <a:cs typeface="ＭＳ Ｐゴシック" charset="-128"/>
+                            </a:rPr>
+                            <m:t>2</m:t>
+                          </m:r>
+                        </m:sub>
+                      </m:sSub>
+                      <m:r>
+                        <a:rPr lang="en-US" sz="3200" b="0" i="1">
+                          <a:solidFill>
+                            <a:prstClr val="black"/>
+                          </a:solidFill>
+                          <a:latin typeface="Cambria Math" panose="02040503050406030204" pitchFamily="18" charset="0"/>
+                          <a:ea typeface="ＭＳ Ｐゴシック" charset="-128"/>
+                          <a:cs typeface="ＭＳ Ｐゴシック" charset="-128"/>
+                        </a:rPr>
+                        <m:t>)</m:t>
+                      </m:r>
+                    </m:oMath>
+                  </a14:m>
+                  <a:r>
+                    <a:rPr lang="en-US" sz="3200" b="0" dirty="0">
+                      <a:solidFill>
+                        <a:prstClr val="black"/>
+                      </a:solidFill>
+                      <a:latin typeface="Calibri" charset="0"/>
+                      <a:ea typeface="ＭＳ Ｐゴシック" charset="-128"/>
+                      <a:cs typeface="ＭＳ Ｐゴシック" charset="-128"/>
+                    </a:rPr>
+                    <a:t>. [4]</a:t>
+                  </a:r>
+                </a:p>
+                <a:p>
+                  <a:pPr marL="457200" lvl="0" indent="-457200">
+                    <a:buFont typeface="Arial" charset="0"/>
+                    <a:buChar char="•"/>
+                    <a:defRPr/>
+                  </a:pPr>
+                  <a:r>
+                    <a:rPr lang="en-US" sz="3200" b="0" u="sng" dirty="0">
+                      <a:solidFill>
+                        <a:prstClr val="black"/>
+                      </a:solidFill>
+                      <a:latin typeface="Calibri" charset="0"/>
+                      <a:ea typeface="ＭＳ Ｐゴシック" charset="-128"/>
+                      <a:cs typeface="ＭＳ Ｐゴシック" charset="-128"/>
+                    </a:rPr>
+                    <a:t>Sparse Representation</a:t>
+                  </a:r>
+                  <a:r>
+                    <a:rPr lang="en-US" sz="3200" b="0" dirty="0">
+                      <a:solidFill>
+                        <a:prstClr val="black"/>
+                      </a:solidFill>
+                      <a:latin typeface="Calibri" charset="0"/>
+                      <a:ea typeface="ＭＳ Ｐゴシック" charset="-128"/>
+                      <a:cs typeface="ＭＳ Ｐゴシック" charset="-128"/>
+                    </a:rPr>
+                    <a:t>: Encode test image as sparse representation of training faces (For test image </a:t>
+                  </a:r>
+                  <a14:m>
+                    <m:oMath xmlns:m="http://schemas.openxmlformats.org/officeDocument/2006/math">
+                      <m:r>
+                        <a:rPr lang="en-US" sz="3200" b="0" i="1">
+                          <a:solidFill>
+                            <a:prstClr val="black"/>
+                          </a:solidFill>
+                          <a:latin typeface="Cambria Math" panose="02040503050406030204" pitchFamily="18" charset="0"/>
+                          <a:ea typeface="ＭＳ Ｐゴシック" charset="-128"/>
+                          <a:cs typeface="ＭＳ Ｐゴシック" charset="-128"/>
+                        </a:rPr>
+                        <m:t>𝑦</m:t>
+                      </m:r>
+                    </m:oMath>
+                  </a14:m>
+                  <a:r>
+                    <a:rPr lang="en-US" sz="3200" b="0" dirty="0">
+                      <a:solidFill>
+                        <a:prstClr val="black"/>
+                      </a:solidFill>
+                      <a:latin typeface="Calibri" charset="0"/>
+                      <a:ea typeface="ＭＳ Ｐゴシック" charset="-128"/>
+                      <a:cs typeface="ＭＳ Ｐゴシック" charset="-128"/>
+                    </a:rPr>
+                    <a:t> and  train images </a:t>
+                  </a:r>
+                  <a14:m>
+                    <m:oMath xmlns:m="http://schemas.openxmlformats.org/officeDocument/2006/math">
+                      <m:r>
+                        <m:rPr>
+                          <m:sty m:val="p"/>
+                        </m:rPr>
+                        <a:rPr lang="en-US" sz="3200" b="0">
+                          <a:solidFill>
+                            <a:prstClr val="black"/>
+                          </a:solidFill>
+                          <a:latin typeface="Cambria Math" panose="02040503050406030204" pitchFamily="18" charset="0"/>
+                          <a:ea typeface="ＭＳ Ｐゴシック" charset="-128"/>
+                          <a:cs typeface="ＭＳ Ｐゴシック" charset="-128"/>
+                        </a:rPr>
+                        <m:t>Φ</m:t>
+                      </m:r>
+                    </m:oMath>
+                  </a14:m>
+                  <a:r>
+                    <a:rPr lang="en-US" sz="3200" b="0" dirty="0">
+                      <a:solidFill>
+                        <a:prstClr val="black"/>
+                      </a:solidFill>
+                      <a:latin typeface="Calibri" charset="0"/>
+                      <a:ea typeface="ＭＳ Ｐゴシック" charset="-128"/>
+                      <a:cs typeface="ＭＳ Ｐゴシック" charset="-128"/>
+                    </a:rPr>
+                    <a:t>, solve </a:t>
+                  </a:r>
+                  <a14:m>
+                    <m:oMath xmlns:m="http://schemas.openxmlformats.org/officeDocument/2006/math">
+                      <m:sSub>
+                        <m:sSubPr>
+                          <m:ctrlPr>
+                            <a:rPr lang="en-US" sz="3200" b="0" i="1">
+                              <a:solidFill>
+                                <a:prstClr val="black"/>
+                              </a:solidFill>
+                              <a:latin typeface="Cambria Math" charset="0"/>
+                              <a:ea typeface="ＭＳ Ｐゴシック" charset="-128"/>
+                              <a:cs typeface="ＭＳ Ｐゴシック" charset="-128"/>
+                            </a:rPr>
+                          </m:ctrlPr>
+                        </m:sSubPr>
+                        <m:e>
+                          <m:func>
+                            <m:funcPr>
+                              <m:ctrlPr>
+                                <a:rPr lang="en-US" sz="3200" b="0" i="1">
+                                  <a:solidFill>
+                                    <a:prstClr val="black"/>
+                                  </a:solidFill>
+                                  <a:latin typeface="Cambria Math" charset="0"/>
+                                  <a:ea typeface="ＭＳ Ｐゴシック" charset="-128"/>
+                                  <a:cs typeface="ＭＳ Ｐゴシック" charset="-128"/>
+                                </a:rPr>
+                              </m:ctrlPr>
+                            </m:funcPr>
+                            <m:fName>
+                              <m:r>
+                                <m:rPr>
+                                  <m:sty m:val="p"/>
+                                </m:rPr>
+                                <a:rPr lang="en-US" sz="3200" b="0">
+                                  <a:solidFill>
+                                    <a:prstClr val="black"/>
+                                  </a:solidFill>
+                                  <a:latin typeface="Cambria Math" panose="02040503050406030204" pitchFamily="18" charset="0"/>
+                                  <a:ea typeface="ＭＳ Ｐゴシック" charset="-128"/>
+                                  <a:cs typeface="ＭＳ Ｐゴシック" charset="-128"/>
+                                </a:rPr>
+                                <m:t>min</m:t>
+                              </m:r>
+                            </m:fName>
+                            <m:e>
+                              <m:d>
+                                <m:dPr>
+                                  <m:begChr m:val="|"/>
+                                  <m:endChr m:val="|"/>
+                                  <m:ctrlPr>
+                                    <a:rPr lang="en-US" sz="3200" b="0" i="1">
+                                      <a:solidFill>
+                                        <a:prstClr val="black"/>
+                                      </a:solidFill>
+                                      <a:latin typeface="Cambria Math" charset="0"/>
+                                      <a:ea typeface="ＭＳ Ｐゴシック" charset="-128"/>
+                                      <a:cs typeface="ＭＳ Ｐゴシック" charset="-128"/>
+                                    </a:rPr>
+                                  </m:ctrlPr>
+                                </m:dPr>
+                                <m:e>
+                                  <m:d>
+                                    <m:dPr>
+                                      <m:begChr m:val="|"/>
+                                      <m:endChr m:val="|"/>
+                                      <m:ctrlPr>
+                                        <a:rPr lang="en-US" sz="3200" b="0" i="1">
+                                          <a:solidFill>
+                                            <a:prstClr val="black"/>
+                                          </a:solidFill>
+                                          <a:latin typeface="Cambria Math" charset="0"/>
+                                          <a:ea typeface="ＭＳ Ｐゴシック" charset="-128"/>
+                                          <a:cs typeface="ＭＳ Ｐゴシック" charset="-128"/>
+                                        </a:rPr>
+                                      </m:ctrlPr>
+                                    </m:dPr>
+                                    <m:e>
+                                      <m:r>
+                                        <a:rPr lang="en-US" sz="3200" b="0" i="1">
+                                          <a:solidFill>
+                                            <a:prstClr val="black"/>
+                                          </a:solidFill>
+                                          <a:latin typeface="Cambria Math" panose="02040503050406030204" pitchFamily="18" charset="0"/>
+                                          <a:ea typeface="ＭＳ Ｐゴシック" charset="-128"/>
+                                          <a:cs typeface="ＭＳ Ｐゴシック" charset="-128"/>
+                                        </a:rPr>
+                                        <m:t>𝑐</m:t>
+                                      </m:r>
+                                    </m:e>
+                                  </m:d>
+                                </m:e>
+                              </m:d>
+                            </m:e>
+                          </m:func>
+                        </m:e>
+                        <m:sub>
+                          <m:r>
+                            <a:rPr lang="en-US" sz="3200" b="0" i="1">
+                              <a:solidFill>
+                                <a:prstClr val="black"/>
+                              </a:solidFill>
+                              <a:latin typeface="Cambria Math" panose="02040503050406030204" pitchFamily="18" charset="0"/>
+                              <a:ea typeface="ＭＳ Ｐゴシック" charset="-128"/>
+                              <a:cs typeface="ＭＳ Ｐゴシック" charset="-128"/>
+                            </a:rPr>
+                            <m:t>1</m:t>
+                          </m:r>
+                        </m:sub>
+                      </m:sSub>
+                      <m:r>
+                        <a:rPr lang="en-US" sz="3200" b="0" i="1">
+                          <a:solidFill>
+                            <a:prstClr val="black"/>
+                          </a:solidFill>
+                          <a:latin typeface="Cambria Math" panose="02040503050406030204" pitchFamily="18" charset="0"/>
+                          <a:ea typeface="ＭＳ Ｐゴシック" charset="-128"/>
+                          <a:cs typeface="ＭＳ Ｐゴシック" charset="-128"/>
+                        </a:rPr>
+                        <m:t>𝑠𝑡</m:t>
+                      </m:r>
+                      <m:d>
+                        <m:dPr>
+                          <m:begChr m:val="|"/>
+                          <m:endChr m:val="|"/>
+                          <m:ctrlPr>
+                            <a:rPr lang="en-US" sz="3200" b="0" i="1">
+                              <a:solidFill>
+                                <a:prstClr val="black"/>
+                              </a:solidFill>
+                              <a:latin typeface="Cambria Math" charset="0"/>
+                              <a:ea typeface="ＭＳ Ｐゴシック" charset="-128"/>
+                              <a:cs typeface="ＭＳ Ｐゴシック" charset="-128"/>
+                            </a:rPr>
+                          </m:ctrlPr>
+                        </m:dPr>
+                        <m:e>
+                          <m:d>
+                            <m:dPr>
+                              <m:begChr m:val="|"/>
+                              <m:endChr m:val="|"/>
+                              <m:ctrlPr>
+                                <a:rPr lang="en-US" sz="3200" b="0" i="1">
+                                  <a:solidFill>
+                                    <a:prstClr val="black"/>
+                                  </a:solidFill>
+                                  <a:latin typeface="Cambria Math" charset="0"/>
+                                  <a:ea typeface="ＭＳ Ｐゴシック" charset="-128"/>
+                                  <a:cs typeface="ＭＳ Ｐゴシック" charset="-128"/>
+                                </a:rPr>
+                              </m:ctrlPr>
+                            </m:dPr>
+                            <m:e>
+                              <m:r>
+                                <a:rPr lang="en-US" sz="3200" b="0" i="1">
+                                  <a:solidFill>
+                                    <a:prstClr val="black"/>
+                                  </a:solidFill>
+                                  <a:latin typeface="Cambria Math" panose="02040503050406030204" pitchFamily="18" charset="0"/>
+                                  <a:ea typeface="ＭＳ Ｐゴシック" charset="-128"/>
+                                  <a:cs typeface="ＭＳ Ｐゴシック" charset="-128"/>
+                                </a:rPr>
+                                <m:t>𝑦</m:t>
+                              </m:r>
+                              <m:r>
+                                <a:rPr lang="en-US" sz="3200" b="0" i="1">
+                                  <a:solidFill>
+                                    <a:prstClr val="black"/>
+                                  </a:solidFill>
+                                  <a:latin typeface="Cambria Math" panose="02040503050406030204" pitchFamily="18" charset="0"/>
+                                  <a:ea typeface="ＭＳ Ｐゴシック" charset="-128"/>
+                                  <a:cs typeface="ＭＳ Ｐゴシック" charset="-128"/>
+                                </a:rPr>
+                                <m:t>−</m:t>
+                              </m:r>
+                              <m:r>
+                                <m:rPr>
+                                  <m:sty m:val="p"/>
+                                </m:rPr>
+                                <a:rPr lang="en-US" sz="3200" b="0">
+                                  <a:solidFill>
+                                    <a:prstClr val="black"/>
+                                  </a:solidFill>
+                                  <a:latin typeface="Cambria Math" panose="02040503050406030204" pitchFamily="18" charset="0"/>
+                                  <a:ea typeface="ＭＳ Ｐゴシック" charset="-128"/>
+                                  <a:cs typeface="ＭＳ Ｐゴシック" charset="-128"/>
+                                </a:rPr>
+                                <m:t>Φ</m:t>
+                              </m:r>
+                              <m:r>
+                                <a:rPr lang="en-US" sz="3200" b="0" i="1">
+                                  <a:solidFill>
+                                    <a:prstClr val="black"/>
+                                  </a:solidFill>
+                                  <a:latin typeface="Cambria Math" panose="02040503050406030204" pitchFamily="18" charset="0"/>
+                                  <a:ea typeface="ＭＳ Ｐゴシック" charset="-128"/>
+                                  <a:cs typeface="ＭＳ Ｐゴシック" charset="-128"/>
+                                </a:rPr>
+                                <m:t>𝑐</m:t>
+                              </m:r>
+                            </m:e>
+                          </m:d>
+                        </m:e>
+                      </m:d>
+                      <m:r>
+                        <a:rPr lang="en-US" sz="3200" b="0" i="1">
+                          <a:solidFill>
+                            <a:prstClr val="black"/>
+                          </a:solidFill>
+                          <a:latin typeface="Cambria Math" panose="02040503050406030204" pitchFamily="18" charset="0"/>
+                          <a:ea typeface="ＭＳ Ｐゴシック" charset="-128"/>
+                          <a:cs typeface="ＭＳ Ｐゴシック" charset="-128"/>
+                        </a:rPr>
+                        <m:t>≤</m:t>
+                      </m:r>
+                      <m:r>
+                        <a:rPr lang="en-US" sz="3200" b="0" i="1">
+                          <a:solidFill>
+                            <a:prstClr val="black"/>
+                          </a:solidFill>
+                          <a:latin typeface="Cambria Math" panose="02040503050406030204" pitchFamily="18" charset="0"/>
+                          <a:ea typeface="ＭＳ Ｐゴシック" charset="-128"/>
+                          <a:cs typeface="ＭＳ Ｐゴシック" charset="-128"/>
+                        </a:rPr>
+                        <m:t>𝜖</m:t>
+                      </m:r>
+                    </m:oMath>
+                  </a14:m>
+                  <a:r>
+                    <a:rPr lang="en-US" sz="3200" b="0" dirty="0">
+                      <a:solidFill>
+                        <a:prstClr val="black"/>
+                      </a:solidFill>
+                      <a:latin typeface="Calibri" charset="0"/>
+                      <a:ea typeface="ＭＳ Ｐゴシック" charset="-128"/>
+                      <a:cs typeface="ＭＳ Ｐゴシック" charset="-128"/>
+                    </a:rPr>
+                    <a:t>) and classify according to weights. [4]</a:t>
+                  </a:r>
+                  <a:endParaRPr lang="en-US" sz="3200" b="0" u="sng" dirty="0">
+                    <a:solidFill>
+                      <a:prstClr val="black"/>
+                    </a:solidFill>
+                    <a:latin typeface="Calibri" charset="0"/>
+                    <a:ea typeface="ＭＳ Ｐゴシック" charset="-128"/>
+                    <a:cs typeface="ＭＳ Ｐゴシック" charset="-128"/>
+                  </a:endParaRPr>
+                </a:p>
+                <a:p>
+                  <a:pPr marL="914400" lvl="1" indent="-457200">
+                    <a:buFont typeface="Arial" charset="0"/>
+                    <a:buChar char="•"/>
+                    <a:defRPr/>
+                  </a:pPr>
+                  <a:r>
+                    <a:rPr lang="en-US" sz="3200" b="0" dirty="0">
+                      <a:solidFill>
+                        <a:prstClr val="black"/>
+                      </a:solidFill>
+                      <a:latin typeface="Calibri" charset="0"/>
+                      <a:ea typeface="ＭＳ Ｐゴシック" charset="-128"/>
+                      <a:cs typeface="ＭＳ Ｐゴシック" charset="-128"/>
+                    </a:rPr>
+                    <a:t>With </a:t>
+                  </a:r>
+                  <a:r>
+                    <a:rPr lang="en-US" sz="3200" b="0" u="sng" dirty="0">
+                      <a:solidFill>
+                        <a:prstClr val="black"/>
+                      </a:solidFill>
+                      <a:latin typeface="Calibri" charset="0"/>
+                      <a:ea typeface="ＭＳ Ｐゴシック" charset="-128"/>
+                      <a:cs typeface="ＭＳ Ｐゴシック" charset="-128"/>
+                    </a:rPr>
+                    <a:t>Dimension Reduction</a:t>
+                  </a:r>
+                  <a:r>
+                    <a:rPr lang="en-US" sz="3200" b="0" dirty="0">
+                      <a:solidFill>
+                        <a:prstClr val="black"/>
+                      </a:solidFill>
+                      <a:latin typeface="Calibri" charset="0"/>
+                      <a:ea typeface="ＭＳ Ｐゴシック" charset="-128"/>
+                      <a:cs typeface="ＭＳ Ｐゴシック" charset="-128"/>
+                    </a:rPr>
+                    <a:t>: Perform sparse representation after projecting images using PCA.</a:t>
+                  </a:r>
+                  <a:endParaRPr lang="en-US" sz="3200" b="0" u="sng" dirty="0">
+                    <a:solidFill>
+                      <a:prstClr val="black"/>
+                    </a:solidFill>
+                    <a:latin typeface="Calibri" charset="0"/>
+                    <a:ea typeface="ＭＳ Ｐゴシック" charset="-128"/>
+                    <a:cs typeface="ＭＳ Ｐゴシック" charset="-128"/>
+                  </a:endParaRPr>
+                </a:p>
+                <a:p>
+                  <a:pPr marL="914400" lvl="1" indent="-457200">
+                    <a:buFont typeface="Arial" charset="0"/>
+                    <a:buChar char="•"/>
+                    <a:defRPr/>
+                  </a:pPr>
+                  <a:r>
+                    <a:rPr lang="en-US" sz="3200" b="0" dirty="0">
+                      <a:solidFill>
+                        <a:prstClr val="black"/>
+                      </a:solidFill>
+                      <a:latin typeface="Calibri" charset="0"/>
+                      <a:ea typeface="ＭＳ Ｐゴシック" charset="-128"/>
+                      <a:cs typeface="ＭＳ Ｐゴシック" charset="-128"/>
+                    </a:rPr>
+                    <a:t>With </a:t>
+                  </a:r>
+                  <a:r>
+                    <a:rPr lang="en-US" sz="3200" b="0" u="sng" dirty="0">
+                      <a:solidFill>
+                        <a:prstClr val="black"/>
+                      </a:solidFill>
+                      <a:latin typeface="Calibri" charset="0"/>
+                      <a:ea typeface="ＭＳ Ｐゴシック" charset="-128"/>
+                      <a:cs typeface="ＭＳ Ｐゴシック" charset="-128"/>
+                    </a:rPr>
+                    <a:t>Combined L1 Loss</a:t>
+                  </a:r>
+                  <a:r>
+                    <a:rPr lang="en-US" sz="3200" b="0" dirty="0">
+                      <a:solidFill>
+                        <a:prstClr val="black"/>
+                      </a:solidFill>
+                      <a:latin typeface="Calibri" charset="0"/>
+                      <a:ea typeface="ＭＳ Ｐゴシック" charset="-128"/>
+                      <a:cs typeface="ＭＳ Ｐゴシック" charset="-128"/>
+                    </a:rPr>
+                    <a:t>: Encode test faces with both train faces and standard basis vectors (</a:t>
+                  </a:r>
+                  <a14:m>
+                    <m:oMath xmlns:m="http://schemas.openxmlformats.org/officeDocument/2006/math">
+                      <m:sSub>
+                        <m:sSubPr>
+                          <m:ctrlPr>
+                            <a:rPr lang="en-US" sz="3200" b="0" i="1">
+                              <a:solidFill>
+                                <a:prstClr val="black"/>
+                              </a:solidFill>
+                              <a:latin typeface="Cambria Math" charset="0"/>
+                              <a:ea typeface="ＭＳ Ｐゴシック" charset="-128"/>
+                              <a:cs typeface="ＭＳ Ｐゴシック" charset="-128"/>
+                            </a:rPr>
+                          </m:ctrlPr>
+                        </m:sSubPr>
+                        <m:e>
+                          <m:func>
+                            <m:funcPr>
+                              <m:ctrlPr>
+                                <a:rPr lang="en-US" sz="3200" b="0" i="1">
+                                  <a:solidFill>
+                                    <a:prstClr val="black"/>
+                                  </a:solidFill>
+                                  <a:latin typeface="Cambria Math" charset="0"/>
+                                  <a:ea typeface="ＭＳ Ｐゴシック" charset="-128"/>
+                                  <a:cs typeface="ＭＳ Ｐゴシック" charset="-128"/>
+                                </a:rPr>
+                              </m:ctrlPr>
+                            </m:funcPr>
+                            <m:fName>
+                              <m:r>
+                                <m:rPr>
+                                  <m:sty m:val="p"/>
+                                </m:rPr>
+                                <a:rPr lang="en-US" sz="3200" b="0">
+                                  <a:solidFill>
+                                    <a:prstClr val="black"/>
+                                  </a:solidFill>
+                                  <a:latin typeface="Cambria Math" panose="02040503050406030204" pitchFamily="18" charset="0"/>
+                                  <a:ea typeface="ＭＳ Ｐゴシック" charset="-128"/>
+                                  <a:cs typeface="ＭＳ Ｐゴシック" charset="-128"/>
+                                </a:rPr>
+                                <m:t>min</m:t>
+                              </m:r>
+                            </m:fName>
+                            <m:e>
+                              <m:d>
+                                <m:dPr>
+                                  <m:begChr m:val="|"/>
+                                  <m:endChr m:val="|"/>
+                                  <m:ctrlPr>
+                                    <a:rPr lang="en-US" sz="3200" b="0" i="1">
+                                      <a:solidFill>
+                                        <a:prstClr val="black"/>
+                                      </a:solidFill>
+                                      <a:latin typeface="Cambria Math" charset="0"/>
+                                      <a:ea typeface="ＭＳ Ｐゴシック" charset="-128"/>
+                                      <a:cs typeface="ＭＳ Ｐゴシック" charset="-128"/>
+                                    </a:rPr>
+                                  </m:ctrlPr>
+                                </m:dPr>
+                                <m:e>
+                                  <m:d>
+                                    <m:dPr>
+                                      <m:begChr m:val="|"/>
+                                      <m:endChr m:val="|"/>
+                                      <m:ctrlPr>
+                                        <a:rPr lang="en-US" sz="3200" b="0" i="1">
+                                          <a:solidFill>
+                                            <a:prstClr val="black"/>
+                                          </a:solidFill>
+                                          <a:latin typeface="Cambria Math" charset="0"/>
+                                          <a:ea typeface="ＭＳ Ｐゴシック" charset="-128"/>
+                                          <a:cs typeface="ＭＳ Ｐゴシック" charset="-128"/>
+                                        </a:rPr>
+                                      </m:ctrlPr>
+                                    </m:dPr>
+                                    <m:e>
+                                      <m:r>
+                                        <a:rPr lang="en-US" sz="3200" b="0" i="1">
+                                          <a:solidFill>
+                                            <a:prstClr val="black"/>
+                                          </a:solidFill>
+                                          <a:latin typeface="Cambria Math" panose="02040503050406030204" pitchFamily="18" charset="0"/>
+                                          <a:ea typeface="ＭＳ Ｐゴシック" charset="-128"/>
+                                          <a:cs typeface="ＭＳ Ｐゴシック" charset="-128"/>
+                                        </a:rPr>
+                                        <m:t>𝑐</m:t>
+                                      </m:r>
+                                    </m:e>
+                                  </m:d>
+                                </m:e>
+                              </m:d>
+                            </m:e>
+                          </m:func>
+                        </m:e>
+                        <m:sub>
+                          <m:r>
+                            <a:rPr lang="en-US" sz="3200" b="0" i="1">
+                              <a:solidFill>
+                                <a:prstClr val="black"/>
+                              </a:solidFill>
+                              <a:latin typeface="Cambria Math" panose="02040503050406030204" pitchFamily="18" charset="0"/>
+                              <a:ea typeface="ＭＳ Ｐゴシック" charset="-128"/>
+                              <a:cs typeface="ＭＳ Ｐゴシック" charset="-128"/>
+                            </a:rPr>
+                            <m:t>1</m:t>
+                          </m:r>
+                        </m:sub>
+                      </m:sSub>
+                      <m:r>
+                        <a:rPr lang="en-US" sz="3200" b="0" i="1">
+                          <a:solidFill>
+                            <a:prstClr val="black"/>
+                          </a:solidFill>
+                          <a:latin typeface="Cambria Math" panose="02040503050406030204" pitchFamily="18" charset="0"/>
+                          <a:ea typeface="ＭＳ Ｐゴシック" charset="-128"/>
+                          <a:cs typeface="ＭＳ Ｐゴシック" charset="-128"/>
+                        </a:rPr>
+                        <m:t>+</m:t>
+                      </m:r>
+                      <m:sSub>
+                        <m:sSubPr>
+                          <m:ctrlPr>
+                            <a:rPr lang="en-US" sz="3200" b="0" i="1">
+                              <a:solidFill>
+                                <a:prstClr val="black"/>
+                              </a:solidFill>
+                              <a:latin typeface="Cambria Math" charset="0"/>
+                              <a:ea typeface="ＭＳ Ｐゴシック" charset="-128"/>
+                              <a:cs typeface="ＭＳ Ｐゴシック" charset="-128"/>
+                            </a:rPr>
+                          </m:ctrlPr>
+                        </m:sSubPr>
+                        <m:e>
+                          <m:d>
+                            <m:dPr>
+                              <m:begChr m:val="|"/>
+                              <m:endChr m:val="|"/>
+                              <m:ctrlPr>
+                                <a:rPr lang="en-US" sz="3200" b="0" i="1">
+                                  <a:solidFill>
+                                    <a:prstClr val="black"/>
+                                  </a:solidFill>
+                                  <a:latin typeface="Cambria Math" charset="0"/>
+                                  <a:ea typeface="ＭＳ Ｐゴシック" charset="-128"/>
+                                  <a:cs typeface="ＭＳ Ｐゴシック" charset="-128"/>
+                                </a:rPr>
+                              </m:ctrlPr>
+                            </m:dPr>
+                            <m:e>
+                              <m:d>
+                                <m:dPr>
+                                  <m:begChr m:val="|"/>
+                                  <m:endChr m:val="|"/>
+                                  <m:ctrlPr>
+                                    <a:rPr lang="en-US" sz="3200" b="0" i="1">
+                                      <a:solidFill>
+                                        <a:prstClr val="black"/>
+                                      </a:solidFill>
+                                      <a:latin typeface="Cambria Math" charset="0"/>
+                                      <a:ea typeface="ＭＳ Ｐゴシック" charset="-128"/>
+                                      <a:cs typeface="ＭＳ Ｐゴシック" charset="-128"/>
+                                    </a:rPr>
+                                  </m:ctrlPr>
+                                </m:dPr>
+                                <m:e>
+                                  <m:r>
+                                    <a:rPr lang="en-US" sz="3200" b="0" i="1">
+                                      <a:solidFill>
+                                        <a:prstClr val="black"/>
+                                      </a:solidFill>
+                                      <a:latin typeface="Cambria Math" panose="02040503050406030204" pitchFamily="18" charset="0"/>
+                                      <a:ea typeface="ＭＳ Ｐゴシック" charset="-128"/>
+                                      <a:cs typeface="ＭＳ Ｐゴシック" charset="-128"/>
+                                    </a:rPr>
+                                    <m:t>𝑒</m:t>
+                                  </m:r>
+                                </m:e>
+                              </m:d>
+                            </m:e>
+                          </m:d>
+                        </m:e>
+                        <m:sub>
+                          <m:r>
+                            <a:rPr lang="en-US" sz="3200" b="0" i="1">
+                              <a:solidFill>
+                                <a:prstClr val="black"/>
+                              </a:solidFill>
+                              <a:latin typeface="Cambria Math" panose="02040503050406030204" pitchFamily="18" charset="0"/>
+                              <a:ea typeface="ＭＳ Ｐゴシック" charset="-128"/>
+                              <a:cs typeface="ＭＳ Ｐゴシック" charset="-128"/>
+                            </a:rPr>
+                            <m:t>1</m:t>
+                          </m:r>
+                        </m:sub>
+                      </m:sSub>
+                      <m:r>
+                        <a:rPr lang="en-US" sz="3200" b="0" i="1">
+                          <a:solidFill>
+                            <a:prstClr val="black"/>
+                          </a:solidFill>
+                          <a:latin typeface="Cambria Math" panose="02040503050406030204" pitchFamily="18" charset="0"/>
+                          <a:ea typeface="ＭＳ Ｐゴシック" charset="-128"/>
+                          <a:cs typeface="ＭＳ Ｐゴシック" charset="-128"/>
+                        </a:rPr>
+                        <m:t>𝑠</m:t>
+                      </m:r>
+                      <m:r>
+                        <a:rPr lang="en-US" sz="3200" b="0" i="1">
+                          <a:solidFill>
+                            <a:prstClr val="black"/>
+                          </a:solidFill>
+                          <a:latin typeface="Cambria Math" panose="02040503050406030204" pitchFamily="18" charset="0"/>
+                          <a:ea typeface="ＭＳ Ｐゴシック" charset="-128"/>
+                          <a:cs typeface="ＭＳ Ｐゴシック" charset="-128"/>
+                        </a:rPr>
+                        <m:t>𝑡</m:t>
+                      </m:r>
+                      <m:r>
+                        <a:rPr lang="en-US" sz="3200" b="0" i="1">
+                          <a:solidFill>
+                            <a:prstClr val="black"/>
+                          </a:solidFill>
+                          <a:latin typeface="Cambria Math" panose="02040503050406030204" pitchFamily="18" charset="0"/>
+                          <a:ea typeface="ＭＳ Ｐゴシック" charset="-128"/>
+                          <a:cs typeface="ＭＳ Ｐゴシック" charset="-128"/>
+                        </a:rPr>
+                        <m:t> </m:t>
+                      </m:r>
+                      <m:r>
+                        <a:rPr lang="en-US" sz="3200" b="0" i="1">
+                          <a:solidFill>
+                            <a:prstClr val="black"/>
+                          </a:solidFill>
+                          <a:latin typeface="Cambria Math" panose="02040503050406030204" pitchFamily="18" charset="0"/>
+                          <a:ea typeface="ＭＳ Ｐゴシック" charset="-128"/>
+                          <a:cs typeface="ＭＳ Ｐゴシック" charset="-128"/>
+                        </a:rPr>
+                        <m:t>𝑦</m:t>
+                      </m:r>
+                      <m:r>
+                        <a:rPr lang="en-US" sz="3200" b="0" i="1">
+                          <a:solidFill>
+                            <a:prstClr val="black"/>
+                          </a:solidFill>
+                          <a:latin typeface="Cambria Math" panose="02040503050406030204" pitchFamily="18" charset="0"/>
+                          <a:ea typeface="ＭＳ Ｐゴシック" charset="-128"/>
+                          <a:cs typeface="ＭＳ Ｐゴシック" charset="-128"/>
+                        </a:rPr>
+                        <m:t>=</m:t>
+                      </m:r>
+                      <m:r>
+                        <m:rPr>
+                          <m:sty m:val="p"/>
+                        </m:rPr>
+                        <a:rPr lang="en-US" sz="3200" b="0">
+                          <a:solidFill>
+                            <a:prstClr val="black"/>
+                          </a:solidFill>
+                          <a:latin typeface="Cambria Math" panose="02040503050406030204" pitchFamily="18" charset="0"/>
+                          <a:ea typeface="ＭＳ Ｐゴシック" charset="-128"/>
+                          <a:cs typeface="ＭＳ Ｐゴシック" charset="-128"/>
+                        </a:rPr>
+                        <m:t>Φ</m:t>
+                      </m:r>
+                      <m:r>
+                        <a:rPr lang="en-US" sz="3200" b="0" i="1">
+                          <a:solidFill>
+                            <a:prstClr val="black"/>
+                          </a:solidFill>
+                          <a:latin typeface="Cambria Math" panose="02040503050406030204" pitchFamily="18" charset="0"/>
+                          <a:ea typeface="ＭＳ Ｐゴシック" charset="-128"/>
+                          <a:cs typeface="ＭＳ Ｐゴシック" charset="-128"/>
+                        </a:rPr>
+                        <m:t>𝑐</m:t>
+                      </m:r>
+                      <m:r>
+                        <a:rPr lang="en-US" sz="3200" b="0" i="1">
+                          <a:solidFill>
+                            <a:prstClr val="black"/>
+                          </a:solidFill>
+                          <a:latin typeface="Cambria Math" panose="02040503050406030204" pitchFamily="18" charset="0"/>
+                          <a:ea typeface="ＭＳ Ｐゴシック" charset="-128"/>
+                          <a:cs typeface="ＭＳ Ｐゴシック" charset="-128"/>
+                        </a:rPr>
+                        <m:t>+</m:t>
+                      </m:r>
+                      <m:r>
+                        <a:rPr lang="en-US" sz="3200" b="0" i="1">
+                          <a:solidFill>
+                            <a:prstClr val="black"/>
+                          </a:solidFill>
+                          <a:latin typeface="Cambria Math" panose="02040503050406030204" pitchFamily="18" charset="0"/>
+                          <a:ea typeface="ＭＳ Ｐゴシック" charset="-128"/>
+                          <a:cs typeface="ＭＳ Ｐゴシック" charset="-128"/>
+                        </a:rPr>
+                        <m:t>𝑒</m:t>
+                      </m:r>
+                    </m:oMath>
+                  </a14:m>
+                  <a:r>
+                    <a:rPr lang="en-US" sz="3200" b="0" dirty="0">
+                      <a:solidFill>
+                        <a:prstClr val="black"/>
+                      </a:solidFill>
+                      <a:latin typeface="Calibri" charset="0"/>
+                      <a:ea typeface="ＭＳ Ｐゴシック" charset="-128"/>
+                      <a:cs typeface="ＭＳ Ｐゴシック" charset="-128"/>
+                    </a:rPr>
+                    <a:t>) to account for small differences between images.</a:t>
+                  </a:r>
+                  <a:endParaRPr lang="en-US" sz="3200" b="0" u="sng" dirty="0">
+                    <a:solidFill>
+                      <a:prstClr val="black"/>
+                    </a:solidFill>
+                    <a:latin typeface="Calibri" charset="0"/>
+                    <a:ea typeface="ＭＳ Ｐゴシック" charset="-128"/>
+                    <a:cs typeface="ＭＳ Ｐゴシック" charset="-128"/>
+                  </a:endParaRPr>
+                </a:p>
+                <a:p>
+                  <a:pPr marL="457200" lvl="0" indent="-457200">
+                    <a:buFont typeface="Arial" charset="0"/>
+                    <a:buChar char="•"/>
+                    <a:defRPr/>
+                  </a:pPr>
+                  <a:r>
+                    <a:rPr lang="en-US" sz="3200" b="0" u="sng" dirty="0">
+                      <a:solidFill>
+                        <a:prstClr val="black"/>
+                      </a:solidFill>
+                      <a:latin typeface="Calibri" charset="0"/>
+                      <a:ea typeface="ＭＳ Ｐゴシック" charset="-128"/>
+                      <a:cs typeface="ＭＳ Ｐゴシック" charset="-128"/>
+                    </a:rPr>
+                    <a:t>VGG-FACE</a:t>
+                  </a:r>
+                  <a:r>
+                    <a:rPr lang="en-US" sz="3200" b="0" dirty="0">
+                      <a:solidFill>
+                        <a:prstClr val="black"/>
+                      </a:solidFill>
+                      <a:latin typeface="Calibri" charset="0"/>
+                      <a:ea typeface="ＭＳ Ｐゴシック" charset="-128"/>
+                      <a:cs typeface="ＭＳ Ｐゴシック" charset="-128"/>
+                    </a:rPr>
+                    <a:t>: Use features from pre-trained VGG network and predict using K-nearest neighbors based on cosine distances. [2]</a:t>
+                  </a:r>
+                  <a:endParaRPr lang="en-US" sz="3200" b="0" u="sng" dirty="0">
+                    <a:solidFill>
+                      <a:prstClr val="black"/>
+                    </a:solidFill>
+                    <a:latin typeface="Calibri" charset="0"/>
+                    <a:ea typeface="ＭＳ Ｐゴシック" charset="-128"/>
+                    <a:cs typeface="ＭＳ Ｐゴシック" charset="-128"/>
+                  </a:endParaRPr>
+                </a:p>
+                <a:p>
+                  <a:pPr lvl="0">
+                    <a:defRPr/>
+                  </a:pPr>
+                  <a:endParaRPr lang="en-US" sz="1600" b="0" dirty="0">
+                    <a:solidFill>
+                      <a:prstClr val="black"/>
+                    </a:solidFill>
+                    <a:latin typeface="Calibri" charset="0"/>
+                    <a:ea typeface="ＭＳ Ｐゴシック" charset="-128"/>
+                    <a:cs typeface="ＭＳ Ｐゴシック" charset="-128"/>
+                  </a:endParaRPr>
+                </a:p>
+                <a:p>
+                  <a:pPr lvl="0">
+                    <a:defRPr/>
+                  </a:pPr>
+                  <a:r>
+                    <a:rPr lang="en-US" sz="3200" dirty="0">
+                      <a:solidFill>
+                        <a:prstClr val="black"/>
+                      </a:solidFill>
+                      <a:latin typeface="Calibri" charset="0"/>
+                      <a:ea typeface="ＭＳ Ｐゴシック" charset="-128"/>
+                      <a:cs typeface="ＭＳ Ｐゴシック" charset="-128"/>
+                    </a:rPr>
+                    <a:t>Dataset</a:t>
+                  </a:r>
+                </a:p>
+                <a:p>
+                  <a:pPr marL="457200" lvl="0" indent="-457200">
+                    <a:buFont typeface="Arial" panose="020B0604020202020204" pitchFamily="34" charset="0"/>
+                    <a:buChar char="•"/>
+                    <a:defRPr/>
+                  </a:pPr>
+                  <a:r>
+                    <a:rPr lang="en-US" sz="3200" b="0" dirty="0">
+                      <a:solidFill>
+                        <a:prstClr val="black"/>
+                      </a:solidFill>
+                      <a:latin typeface="Calibri" charset="0"/>
+                      <a:ea typeface="ＭＳ Ｐゴシック" charset="-128"/>
+                      <a:cs typeface="ＭＳ Ｐゴシック" charset="-128"/>
+                    </a:rPr>
+                    <a:t>Labeled Faces in the Wild (LFW): subjects with at least 20 faces. [5]</a:t>
+                  </a:r>
+                </a:p>
+                <a:p>
+                  <a:pPr marL="457200" lvl="0" indent="-457200">
+                    <a:buFont typeface="Arial" panose="020B0604020202020204" pitchFamily="34" charset="0"/>
+                    <a:buChar char="•"/>
+                    <a:defRPr/>
+                  </a:pPr>
+                  <a:r>
+                    <a:rPr lang="en-US" sz="3200" b="0" dirty="0">
+                      <a:solidFill>
+                        <a:prstClr val="black"/>
+                      </a:solidFill>
+                      <a:latin typeface="Calibri" charset="0"/>
+                      <a:ea typeface="ＭＳ Ｐゴシック" charset="-128"/>
+                      <a:cs typeface="ＭＳ Ｐゴシック" charset="-128"/>
+                    </a:rPr>
+                    <a:t>Use equal number of training faces for each subject</a:t>
+                  </a:r>
+                  <a:r>
+                    <a:rPr lang="en-US" sz="3200" b="0" dirty="0" smtClean="0">
+                      <a:solidFill>
+                        <a:prstClr val="black"/>
+                      </a:solidFill>
+                      <a:latin typeface="Calibri" charset="0"/>
+                      <a:ea typeface="ＭＳ Ｐゴシック" charset="-128"/>
+                      <a:cs typeface="ＭＳ Ｐゴシック" charset="-128"/>
+                    </a:rPr>
+                    <a:t>.</a:t>
+                  </a:r>
+                  <a:endParaRPr lang="en-US" sz="3200" b="0" dirty="0">
+                    <a:solidFill>
+                      <a:prstClr val="black"/>
+                    </a:solidFill>
+                    <a:latin typeface="Calibri" charset="0"/>
+                    <a:ea typeface="ＭＳ Ｐゴシック" charset="-128"/>
+                    <a:cs typeface="ＭＳ Ｐゴシック" charset="-128"/>
+                  </a:endParaRPr>
+                </a:p>
+              </p:txBody>
+            </p:sp>
+          </mc:Choice>
+          <mc:Fallback>
+            <p:sp>
+              <p:nvSpPr>
+                <p:cNvPr id="13" name="Rectangle 12"/>
+                <p:cNvSpPr>
+                  <a:spLocks noRot="1" noChangeAspect="1" noMove="1" noResize="1" noEditPoints="1" noAdjustHandles="1" noChangeArrowheads="1" noChangeShapeType="1" noTextEdit="1"/>
+                </p:cNvSpPr>
+                <p:nvPr/>
+              </p:nvSpPr>
+              <p:spPr>
+                <a:xfrm>
+                  <a:off x="990599" y="4420935"/>
+                  <a:ext cx="9608109" cy="3461352"/>
+                </a:xfrm>
+                <a:prstGeom prst="rect">
+                  <a:avLst/>
+                </a:prstGeom>
+                <a:blipFill rotWithShape="0">
+                  <a:blip r:embed="rId11"/>
+                  <a:stretch>
+                    <a:fillRect l="-1311" t="-591" r="-1858"/>
+                  </a:stretch>
+                </a:blipFill>
+                <a:ln>
+                  <a:solidFill>
+                    <a:srgbClr val="26269A"/>
+                  </a:solidFill>
+                </a:ln>
+              </p:spPr>
+              <p:txBody>
+                <a:bodyPr/>
+                <a:lstStyle/>
+                <a:p>
+                  <a:r>
+                    <a:rPr lang="en-US">
+                      <a:noFill/>
+                    </a:rPr>
+                    <a:t> </a:t>
+                  </a:r>
+                </a:p>
+              </p:txBody>
+            </p:sp>
+          </mc:Fallback>
+        </mc:AlternateContent>
         <p:sp>
           <p:nvSpPr>
             <p:cNvPr id="14" name="Rectangle 13"/>
@@ -1963,10 +3217,10 @@
         </p:nvGrpSpPr>
         <p:grpSpPr bwMode="auto">
           <a:xfrm>
-            <a:off x="24739075" y="3925547"/>
-            <a:ext cx="11201095" cy="11125955"/>
-            <a:chOff x="968226" y="3962400"/>
-            <a:chExt cx="9666699" cy="2780373"/>
+            <a:off x="24804273" y="3925547"/>
+            <a:ext cx="11111440" cy="11125955"/>
+            <a:chOff x="1024493" y="3962400"/>
+            <a:chExt cx="9589325" cy="2780373"/>
           </a:xfrm>
         </p:grpSpPr>
         <p:sp>
@@ -1977,8 +3231,8 @@
           </p:nvSpPr>
           <p:spPr>
             <a:xfrm>
-              <a:off x="990600" y="4238441"/>
-              <a:ext cx="9601200" cy="2504332"/>
+              <a:off x="1024493" y="4276569"/>
+              <a:ext cx="9589324" cy="2466204"/>
             </a:xfrm>
             <a:prstGeom prst="rect">
               <a:avLst/>
@@ -2030,8 +3284,8 @@
           </p:nvSpPr>
           <p:spPr>
             <a:xfrm>
-              <a:off x="968226" y="3962400"/>
-              <a:ext cx="9666699" cy="314169"/>
+              <a:off x="1024495" y="3962400"/>
+              <a:ext cx="9589323" cy="314169"/>
             </a:xfrm>
             <a:prstGeom prst="rect">
               <a:avLst/>
@@ -2104,10 +3358,10 @@
         </p:nvGrpSpPr>
         <p:grpSpPr bwMode="auto">
           <a:xfrm>
-            <a:off x="24771603" y="15365050"/>
-            <a:ext cx="11168567" cy="5072670"/>
-            <a:chOff x="990600" y="3667378"/>
-            <a:chExt cx="9611530" cy="2169746"/>
+            <a:off x="24804273" y="15365050"/>
+            <a:ext cx="11111440" cy="5072670"/>
+            <a:chOff x="1018716" y="3667378"/>
+            <a:chExt cx="9562368" cy="2169746"/>
           </a:xfrm>
         </p:grpSpPr>
         <p:sp>
@@ -2118,8 +3372,8 @@
           </p:nvSpPr>
           <p:spPr>
             <a:xfrm>
-              <a:off x="990601" y="4024335"/>
-              <a:ext cx="9568526" cy="1812789"/>
+              <a:off x="1028290" y="4054535"/>
+              <a:ext cx="9530837" cy="1782589"/>
             </a:xfrm>
             <a:prstGeom prst="rect">
               <a:avLst/>
@@ -2237,8 +3491,8 @@
           </p:nvSpPr>
           <p:spPr>
             <a:xfrm>
-              <a:off x="990600" y="3667378"/>
-              <a:ext cx="9611530" cy="387157"/>
+              <a:off x="1018716" y="3667378"/>
+              <a:ext cx="9562368" cy="387157"/>
             </a:xfrm>
             <a:prstGeom prst="rect">
               <a:avLst/>
@@ -2741,8 +3995,8 @@
         </p:nvSpPr>
         <p:spPr bwMode="auto">
           <a:xfrm>
-            <a:off x="685801" y="10580517"/>
-            <a:ext cx="11176997" cy="3222566"/>
+            <a:off x="685801" y="10610085"/>
+            <a:ext cx="11176997" cy="3192998"/>
           </a:xfrm>
           <a:prstGeom prst="rect">
             <a:avLst/>
@@ -2771,143 +4025,90 @@
           </a:fontRef>
         </p:style>
         <p:txBody>
-          <a:bodyPr anchor="ctr"/>
+          <a:bodyPr anchor="t"/>
           <a:lstStyle/>
           <a:p>
-            <a:pPr>
-              <a:defRPr/>
-            </a:pPr>
-            <a:endParaRPr lang="en-US" sz="2800" dirty="0">
-              <a:solidFill>
-                <a:schemeClr val="tx1"/>
-              </a:solidFill>
-              <a:latin typeface="Calibri" charset="0"/>
-            </a:endParaRPr>
-          </a:p>
-          <a:p>
-            <a:pPr marL="742950" indent="-742950">
+            <a:pPr marL="742950" lvl="0" indent="-742950">
               <a:buFont typeface="Wingdings" charset="2"/>
               <a:buChar char="§"/>
               <a:defRPr/>
             </a:pPr>
-            <a:endParaRPr lang="en-US" sz="2800" dirty="0">
-              <a:solidFill>
-                <a:schemeClr val="tx1"/>
-              </a:solidFill>
-              <a:latin typeface="Calibri" charset="0"/>
-            </a:endParaRPr>
+            <a:r>
+              <a:rPr lang="en-US" sz="3200" b="0" dirty="0" smtClean="0">
+                <a:solidFill>
+                  <a:prstClr val="black"/>
+                </a:solidFill>
+                <a:latin typeface="Calibri" charset="0"/>
+                <a:ea typeface="ＭＳ Ｐゴシック" charset="-128"/>
+                <a:cs typeface="ＭＳ Ｐゴシック" charset="-128"/>
+              </a:rPr>
+              <a:t>Traditional </a:t>
+            </a:r>
+            <a:r>
+              <a:rPr lang="en-US" sz="3200" b="0" dirty="0">
+                <a:solidFill>
+                  <a:prstClr val="black"/>
+                </a:solidFill>
+                <a:latin typeface="Calibri" charset="0"/>
+                <a:ea typeface="ＭＳ Ｐゴシック" charset="-128"/>
+                <a:cs typeface="ＭＳ Ｐゴシック" charset="-128"/>
+              </a:rPr>
+              <a:t>statistical methods and deep learning used in face recognition problems.</a:t>
+            </a:r>
           </a:p>
           <a:p>
-            <a:pPr marL="742950" indent="-742950">
+            <a:pPr marL="742950" lvl="0" indent="-742950">
               <a:buFont typeface="Wingdings" charset="2"/>
               <a:buChar char="§"/>
               <a:defRPr/>
             </a:pPr>
-            <a:endParaRPr lang="en-US" sz="2800" dirty="0">
-              <a:solidFill>
-                <a:schemeClr val="tx1"/>
-              </a:solidFill>
-              <a:latin typeface="Calibri" charset="0"/>
-            </a:endParaRPr>
+            <a:r>
+              <a:rPr lang="en-US" sz="3200" b="0" dirty="0">
+                <a:solidFill>
+                  <a:prstClr val="black"/>
+                </a:solidFill>
+                <a:latin typeface="Calibri" charset="0"/>
+                <a:ea typeface="ＭＳ Ｐゴシック" charset="-128"/>
+                <a:cs typeface="ＭＳ Ｐゴシック" charset="-128"/>
+              </a:rPr>
+              <a:t>Image manipulations from linear algebras, mimicking lens distortion, neural networks.</a:t>
+            </a:r>
           </a:p>
           <a:p>
-            <a:pPr marL="742950" indent="-742950">
+            <a:pPr marL="742950" lvl="0" indent="-742950">
               <a:buFont typeface="Wingdings" charset="2"/>
               <a:buChar char="§"/>
               <a:defRPr/>
             </a:pPr>
-            <a:endParaRPr lang="en-US" sz="2800" dirty="0">
+            <a:r>
+              <a:rPr lang="en-US" sz="3200" b="0" dirty="0">
+                <a:solidFill>
+                  <a:prstClr val="black"/>
+                </a:solidFill>
+                <a:latin typeface="Calibri" charset="0"/>
+                <a:ea typeface="ＭＳ Ｐゴシック" charset="-128"/>
+                <a:cs typeface="ＭＳ Ｐゴシック" charset="-128"/>
+              </a:rPr>
+              <a:t>Psychology indicates that image manipulation may equalize face recognition ability in human beings. [6</a:t>
+            </a:r>
+            <a:r>
+              <a:rPr lang="en-US" sz="3200" b="0" dirty="0" smtClean="0">
+                <a:solidFill>
+                  <a:prstClr val="black"/>
+                </a:solidFill>
+                <a:latin typeface="Calibri" charset="0"/>
+                <a:ea typeface="ＭＳ Ｐゴシック" charset="-128"/>
+                <a:cs typeface="ＭＳ Ｐゴシック" charset="-128"/>
+              </a:rPr>
+              <a:t>]</a:t>
+            </a:r>
+            <a:endParaRPr lang="en-US" sz="3200" b="0" dirty="0">
               <a:solidFill>
-                <a:schemeClr val="tx1"/>
+                <a:prstClr val="black"/>
               </a:solidFill>
               <a:latin typeface="Calibri" charset="0"/>
-            </a:endParaRPr>
-          </a:p>
-          <a:p>
-            <a:pPr marL="742950" indent="-742950">
-              <a:buFont typeface="Wingdings" charset="2"/>
-              <a:buChar char="§"/>
-              <a:defRPr/>
-            </a:pPr>
-            <a:endParaRPr lang="en-US" sz="2800" dirty="0">
-              <a:solidFill>
-                <a:schemeClr val="tx1"/>
-              </a:solidFill>
-              <a:latin typeface="Calibri" charset="0"/>
-            </a:endParaRPr>
-          </a:p>
-          <a:p>
-            <a:pPr marL="742950" indent="-742950">
-              <a:buFont typeface="Wingdings" charset="2"/>
-              <a:buChar char="§"/>
-              <a:defRPr/>
-            </a:pPr>
-            <a:endParaRPr lang="en-US" sz="2800" dirty="0">
-              <a:solidFill>
-                <a:schemeClr val="tx1"/>
-              </a:solidFill>
-              <a:latin typeface="Calibri" charset="0"/>
-            </a:endParaRPr>
-          </a:p>
-          <a:p>
-            <a:pPr marL="742950" indent="-742950">
-              <a:buFont typeface="Wingdings" charset="2"/>
-              <a:buChar char="§"/>
-              <a:defRPr/>
-            </a:pPr>
-            <a:endParaRPr lang="en-US" sz="2800" dirty="0">
-              <a:solidFill>
-                <a:schemeClr val="tx1"/>
-              </a:solidFill>
-              <a:latin typeface="Calibri" charset="0"/>
-            </a:endParaRPr>
-          </a:p>
-          <a:p>
-            <a:pPr marL="742950" indent="-742950">
-              <a:buFont typeface="Wingdings" charset="2"/>
-              <a:buChar char="§"/>
-              <a:defRPr/>
-            </a:pPr>
-            <a:endParaRPr lang="en-US" sz="2800" dirty="0">
-              <a:solidFill>
-                <a:schemeClr val="tx1"/>
-              </a:solidFill>
-              <a:latin typeface="Calibri" charset="0"/>
-            </a:endParaRPr>
-          </a:p>
-          <a:p>
-            <a:pPr marL="742950" indent="-742950">
-              <a:buFont typeface="Wingdings" charset="2"/>
-              <a:buChar char="§"/>
-              <a:defRPr/>
-            </a:pPr>
-            <a:endParaRPr lang="en-US" sz="2800" dirty="0">
-              <a:solidFill>
-                <a:schemeClr val="tx1"/>
-              </a:solidFill>
-              <a:latin typeface="Calibri" charset="0"/>
-            </a:endParaRPr>
-          </a:p>
-          <a:p>
-            <a:pPr>
-              <a:defRPr/>
-            </a:pPr>
-            <a:endParaRPr lang="en-US" sz="2800" dirty="0">
-              <a:solidFill>
-                <a:schemeClr val="tx1"/>
-              </a:solidFill>
-              <a:latin typeface="Calibri" charset="0"/>
-            </a:endParaRPr>
-          </a:p>
-          <a:p>
-            <a:pPr>
-              <a:defRPr/>
-            </a:pPr>
-            <a:endParaRPr lang="en-US" sz="2800" dirty="0">
-              <a:solidFill>
-                <a:schemeClr val="tx1"/>
-              </a:solidFill>
-              <a:latin typeface="Calibri" charset="0"/>
+              <a:ea typeface="ＭＳ Ｐゴシック" charset="-128"/>
+              <a:cs typeface="ＭＳ Ｐゴシック" charset="-128"/>
             </a:endParaRPr>
           </a:p>
         </p:txBody>
@@ -2926,10 +4127,10 @@
         </p:nvGrpSpPr>
         <p:grpSpPr bwMode="auto">
           <a:xfrm>
-            <a:off x="24759149" y="20751270"/>
-            <a:ext cx="11169019" cy="6298814"/>
-            <a:chOff x="1103704" y="4999494"/>
-            <a:chExt cx="9611919" cy="2593073"/>
+            <a:off x="24771601" y="20751270"/>
+            <a:ext cx="11156567" cy="6298814"/>
+            <a:chOff x="1114420" y="4999494"/>
+            <a:chExt cx="9601203" cy="2593073"/>
           </a:xfrm>
         </p:grpSpPr>
         <p:sp>
@@ -2940,8 +4141,8 @@
           </p:nvSpPr>
           <p:spPr>
             <a:xfrm>
-              <a:off x="1103704" y="5511268"/>
-              <a:ext cx="9601201" cy="2081299"/>
+              <a:off x="1114420" y="5511462"/>
+              <a:ext cx="9590485" cy="2081105"/>
             </a:xfrm>
             <a:prstGeom prst="rect">
               <a:avLst/>
@@ -3413,7 +4614,7 @@
           <p:nvPr/>
         </p:nvPicPr>
         <p:blipFill>
-          <a:blip r:embed="rId10"/>
+          <a:blip r:embed="rId12"/>
           <a:stretch>
             <a:fillRect/>
           </a:stretch>
@@ -3468,68 +4669,6 @@
                 <a:latin typeface="Calibri" charset="0"/>
               </a:rPr>
               <a:t>Project Adviser: Kyle Genova</a:t>
-            </a:r>
-          </a:p>
-        </p:txBody>
-      </p:sp>
-      <p:sp>
-        <p:nvSpPr>
-          <p:cNvPr id="5" name="TextBox 4"/>
-          <p:cNvSpPr txBox="1"/>
-          <p:nvPr/>
-        </p:nvSpPr>
-        <p:spPr>
-          <a:xfrm>
-            <a:off x="756255" y="10756095"/>
-            <a:ext cx="11062749" cy="3046988"/>
-          </a:xfrm>
-          <a:prstGeom prst="rect">
-            <a:avLst/>
-          </a:prstGeom>
-          <a:noFill/>
-        </p:spPr>
-        <p:txBody>
-          <a:bodyPr wrap="square" rtlCol="0">
-            <a:spAutoFit/>
-          </a:bodyPr>
-          <a:lstStyle/>
-          <a:p>
-            <a:pPr marL="742950" indent="-742950">
-              <a:buFont typeface="Wingdings" charset="2"/>
-              <a:buChar char="§"/>
-              <a:defRPr/>
-            </a:pPr>
-            <a:r>
-              <a:rPr lang="en-US" sz="3200" b="0" dirty="0">
-                <a:latin typeface="Calibri" charset="0"/>
-              </a:rPr>
-              <a:t>Traditional statistical methods and deep learning used in face recognition problems.</a:t>
-            </a:r>
-          </a:p>
-          <a:p>
-            <a:pPr marL="742950" indent="-742950">
-              <a:buFont typeface="Wingdings" charset="2"/>
-              <a:buChar char="§"/>
-              <a:defRPr/>
-            </a:pPr>
-            <a:r>
-              <a:rPr lang="en-US" sz="3200" b="0" dirty="0">
-                <a:latin typeface="Calibri" charset="0"/>
-              </a:rPr>
-              <a:t>Image manipulations from linear algebras, mimicking lens distortion, neural networks.</a:t>
-            </a:r>
-          </a:p>
-          <a:p>
-            <a:pPr marL="742950" indent="-742950">
-              <a:buFont typeface="Wingdings" charset="2"/>
-              <a:buChar char="§"/>
-              <a:defRPr/>
-            </a:pPr>
-            <a:r>
-              <a:rPr lang="en-US" sz="3200" b="0" dirty="0">
-                <a:latin typeface="Calibri" charset="0"/>
-              </a:rPr>
-              <a:t>Psychology indicates that image manipulation may equalize face recognition ability in human beings. [6]</a:t>
             </a:r>
           </a:p>
         </p:txBody>
@@ -3743,22 +4882,21 @@
           </p:cNvPicPr>
           <p:nvPr/>
         </p:nvPicPr>
-        <p:blipFill>
-          <a:blip r:embed="rId11">
+        <p:blipFill rotWithShape="1">
+          <a:blip r:embed="rId13">
             <a:extLst>
               <a:ext uri="{28A0092B-C50C-407E-A947-70E740481C1C}">
                 <a14:useLocalDpi xmlns:a14="http://schemas.microsoft.com/office/drawing/2010/main" val="0"/>
               </a:ext>
             </a:extLst>
           </a:blip>
-          <a:stretch>
-            <a:fillRect/>
-          </a:stretch>
+          <a:srcRect b="9523"/>
+          <a:stretch/>
         </p:blipFill>
         <p:spPr>
           <a:xfrm>
-            <a:off x="18222928" y="13068302"/>
-            <a:ext cx="5486400" cy="3657600"/>
+            <a:off x="19198914" y="13159138"/>
+            <a:ext cx="4146527" cy="2501104"/>
           </a:xfrm>
           <a:prstGeom prst="rect">
             <a:avLst/>
@@ -3773,8 +4911,8 @@
         </p:nvSpPr>
         <p:spPr>
           <a:xfrm>
-            <a:off x="19030805" y="11265966"/>
-            <a:ext cx="3870645" cy="584775"/>
+            <a:off x="18589056" y="11372083"/>
+            <a:ext cx="5770544" cy="1877437"/>
           </a:xfrm>
           <a:prstGeom prst="rect">
             <a:avLst/>
@@ -3787,14 +4925,35 @@
           </a:bodyPr>
           <a:lstStyle/>
           <a:p>
-            <a:pPr algn="ctr"/>
             <a:r>
-              <a:rPr lang="en-US" sz="3200" b="0" dirty="0">
+              <a:rPr lang="en-US" sz="3200" dirty="0" smtClean="0">
                 <a:latin typeface="Calibri" charset="0"/>
               </a:rPr>
               <a:t>Blur</a:t>
             </a:r>
-            <a:endParaRPr lang="en-US" sz="3200" dirty="0"/>
+          </a:p>
+          <a:p>
+            <a:r>
+              <a:rPr lang="en-US" sz="2800" b="0" dirty="0">
+                <a:latin typeface="Calibri" charset="0"/>
+              </a:rPr>
+              <a:t>Replace each pixel by the average of its neighbors within a specified </a:t>
+            </a:r>
+            <a:r>
+              <a:rPr lang="en-US" sz="2800" b="0" dirty="0" err="1">
+                <a:latin typeface="Calibri" charset="0"/>
+              </a:rPr>
+              <a:t>windowsize</a:t>
+            </a:r>
+            <a:r>
+              <a:rPr lang="en-US" sz="2800" b="0" dirty="0" smtClean="0">
+                <a:latin typeface="Calibri" charset="0"/>
+              </a:rPr>
+              <a:t>.</a:t>
+            </a:r>
+            <a:endParaRPr lang="en-US" sz="2800" b="0" dirty="0">
+              <a:latin typeface="Calibri" charset="0"/>
+            </a:endParaRPr>
           </a:p>
         </p:txBody>
       </p:sp>
@@ -3806,22 +4965,21 @@
           </p:cNvPicPr>
           <p:nvPr/>
         </p:nvPicPr>
-        <p:blipFill>
-          <a:blip r:embed="rId12">
+        <p:blipFill rotWithShape="1">
+          <a:blip r:embed="rId14">
             <a:extLst>
               <a:ext uri="{28A0092B-C50C-407E-A947-70E740481C1C}">
                 <a14:useLocalDpi xmlns:a14="http://schemas.microsoft.com/office/drawing/2010/main" val="0"/>
               </a:ext>
             </a:extLst>
           </a:blip>
-          <a:stretch>
-            <a:fillRect/>
-          </a:stretch>
+          <a:srcRect l="9340" r="6433" b="6497"/>
+          <a:stretch/>
         </p:blipFill>
         <p:spPr>
           <a:xfrm>
-            <a:off x="12659556" y="7013096"/>
-            <a:ext cx="5486400" cy="3657600"/>
+            <a:off x="13120298" y="6755672"/>
+            <a:ext cx="4408752" cy="3262880"/>
           </a:xfrm>
           <a:prstGeom prst="rect">
             <a:avLst/>
@@ -3836,8 +4994,8 @@
         </p:nvSpPr>
         <p:spPr>
           <a:xfrm>
-            <a:off x="13517711" y="5166205"/>
-            <a:ext cx="3870645" cy="584775"/>
+            <a:off x="12526970" y="5009640"/>
+            <a:ext cx="5714770" cy="1446550"/>
           </a:xfrm>
           <a:prstGeom prst="rect">
             <a:avLst/>
@@ -3850,47 +5008,56 @@
           </a:bodyPr>
           <a:lstStyle/>
           <a:p>
-            <a:pPr algn="ctr"/>
             <a:r>
-              <a:rPr lang="en-US" sz="3200" b="0" dirty="0">
+              <a:rPr lang="en-US" sz="3200" dirty="0" smtClean="0">
                 <a:latin typeface="Calibri" charset="0"/>
               </a:rPr>
               <a:t>Occlusion</a:t>
             </a:r>
-            <a:endParaRPr lang="en-US" sz="3200" dirty="0"/>
+          </a:p>
+          <a:p>
+            <a:r>
+              <a:rPr lang="en-US" sz="2800" b="0" dirty="0">
+                <a:latin typeface="Calibri" charset="0"/>
+              </a:rPr>
+              <a:t>Randomly </a:t>
+            </a:r>
+            <a:r>
+              <a:rPr lang="en-US" sz="2800" b="0" dirty="0" err="1" smtClean="0">
+                <a:latin typeface="Calibri" charset="0"/>
+              </a:rPr>
+              <a:t>occulde</a:t>
+            </a:r>
+            <a:r>
+              <a:rPr lang="en-US" sz="2800" b="0" dirty="0" smtClean="0">
+                <a:latin typeface="Calibri" charset="0"/>
+              </a:rPr>
+              <a:t> a </a:t>
+            </a:r>
+            <a:r>
+              <a:rPr lang="en-US" sz="2800" b="0" dirty="0">
+                <a:latin typeface="Calibri" charset="0"/>
+              </a:rPr>
+              <a:t>selected region of a specified </a:t>
+            </a:r>
+            <a:r>
+              <a:rPr lang="en-US" sz="2800" b="0" dirty="0" err="1">
+                <a:latin typeface="Calibri" charset="0"/>
+              </a:rPr>
+              <a:t>windowsize</a:t>
+            </a:r>
+            <a:r>
+              <a:rPr lang="en-US" sz="2800" b="0" dirty="0" smtClean="0">
+                <a:latin typeface="Calibri" charset="0"/>
+              </a:rPr>
+              <a:t>.</a:t>
+            </a:r>
+            <a:endParaRPr lang="en-US" sz="2800" b="0" dirty="0">
+              <a:latin typeface="Calibri" charset="0"/>
+            </a:endParaRPr>
           </a:p>
         </p:txBody>
       </p:sp>
-      <p:pic>
-        <p:nvPicPr>
-          <p:cNvPr id="12" name="Picture 11"/>
-          <p:cNvPicPr>
-            <a:picLocks noChangeAspect="1"/>
-          </p:cNvPicPr>
-          <p:nvPr/>
-        </p:nvPicPr>
-        <p:blipFill>
-          <a:blip r:embed="rId13">
-            <a:extLst>
-              <a:ext uri="{28A0092B-C50C-407E-A947-70E740481C1C}">
-                <a14:useLocalDpi xmlns:a14="http://schemas.microsoft.com/office/drawing/2010/main" val="0"/>
-              </a:ext>
-            </a:extLst>
-          </a:blip>
-          <a:stretch>
-            <a:fillRect/>
-          </a:stretch>
-        </p:blipFill>
-        <p:spPr>
-          <a:xfrm>
-            <a:off x="18234392" y="7583793"/>
-            <a:ext cx="5486400" cy="3657600"/>
-          </a:xfrm>
-          <a:prstGeom prst="rect">
-            <a:avLst/>
-          </a:prstGeom>
-        </p:spPr>
-      </p:pic>
       <p:sp>
         <p:nvSpPr>
           <p:cNvPr id="46" name="TextBox 45"/>
@@ -3899,8 +5066,8 @@
         </p:nvSpPr>
         <p:spPr>
           <a:xfrm>
-            <a:off x="19042269" y="5172097"/>
-            <a:ext cx="3870645" cy="584775"/>
+            <a:off x="18562017" y="5006249"/>
+            <a:ext cx="5770545" cy="1877437"/>
           </a:xfrm>
           <a:prstGeom prst="rect">
             <a:avLst/>
@@ -3913,14 +5080,59 @@
           </a:bodyPr>
           <a:lstStyle/>
           <a:p>
-            <a:pPr algn="ctr"/>
             <a:r>
-              <a:rPr lang="en-US" sz="3200" b="0" dirty="0">
+              <a:rPr lang="en-US" sz="3200" dirty="0">
                 <a:latin typeface="Calibri" charset="0"/>
               </a:rPr>
-              <a:t>Radial Distortion</a:t>
+              <a:t>Radial </a:t>
             </a:r>
-            <a:endParaRPr lang="en-US" sz="3200" dirty="0"/>
+            <a:r>
+              <a:rPr lang="en-US" sz="3200" dirty="0" smtClean="0">
+                <a:latin typeface="Calibri" charset="0"/>
+              </a:rPr>
+              <a:t>Distortion</a:t>
+            </a:r>
+          </a:p>
+          <a:p>
+            <a:r>
+              <a:rPr lang="en-US" sz="2800" b="0" dirty="0">
+                <a:latin typeface="Calibri" charset="0"/>
+              </a:rPr>
+              <a:t>Impose pincushion and barrel </a:t>
+            </a:r>
+            <a:r>
+              <a:rPr lang="en-US" sz="2800" b="0" dirty="0" smtClean="0">
+                <a:latin typeface="Calibri" charset="0"/>
+              </a:rPr>
+              <a:t>distortion to simulate spherical </a:t>
+            </a:r>
+            <a:r>
+              <a:rPr lang="en-US" sz="2800" b="0" dirty="0">
+                <a:latin typeface="Calibri" charset="0"/>
+              </a:rPr>
+              <a:t>camera </a:t>
+            </a:r>
+            <a:r>
+              <a:rPr lang="en-US" sz="2800" b="0" dirty="0" smtClean="0">
+                <a:latin typeface="Calibri" charset="0"/>
+              </a:rPr>
+              <a:t>lenses. [</a:t>
+            </a:r>
+            <a:r>
+              <a:rPr lang="en-US" sz="2800" b="0" dirty="0">
+                <a:latin typeface="Calibri" charset="0"/>
+              </a:rPr>
+              <a:t>1</a:t>
+            </a:r>
+            <a:r>
+              <a:rPr lang="en-US" sz="2800" b="0" dirty="0" smtClean="0">
+                <a:latin typeface="Calibri" charset="0"/>
+              </a:rPr>
+              <a:t>]</a:t>
+            </a:r>
+            <a:endParaRPr lang="en-US" sz="2800" b="0" dirty="0">
+              <a:latin typeface="Calibri" charset="0"/>
+            </a:endParaRPr>
           </a:p>
         </p:txBody>
       </p:sp>
@@ -3932,8 +5144,8 @@
         </p:nvSpPr>
         <p:spPr>
           <a:xfrm>
-            <a:off x="12760600" y="11001725"/>
-            <a:ext cx="5165540" cy="584775"/>
+            <a:off x="12549615" y="11399592"/>
+            <a:ext cx="5746583" cy="1877437"/>
           </a:xfrm>
           <a:prstGeom prst="rect">
             <a:avLst/>
@@ -3946,543 +5158,77 @@
           </a:bodyPr>
           <a:lstStyle/>
           <a:p>
-            <a:pPr algn="ctr"/>
             <a:r>
-              <a:rPr lang="en-US" sz="3200" b="0" dirty="0">
+              <a:rPr lang="en-US" sz="3200" dirty="0">
                 <a:latin typeface="Calibri" charset="0"/>
               </a:rPr>
               <a:t>Deep</a:t>
             </a:r>
             <a:r>
-              <a:rPr lang="en-US" b="0" dirty="0">
+              <a:rPr lang="en-US" dirty="0">
                 <a:latin typeface="Calibri" charset="0"/>
               </a:rPr>
               <a:t> </a:t>
             </a:r>
             <a:r>
-              <a:rPr lang="en-US" sz="3200" b="0" dirty="0">
+              <a:rPr lang="en-US" sz="3200" dirty="0">
                 <a:latin typeface="Calibri" charset="0"/>
               </a:rPr>
               <a:t>Feature</a:t>
             </a:r>
             <a:r>
-              <a:rPr lang="en-US" b="0" dirty="0">
+              <a:rPr lang="en-US" dirty="0">
                 <a:latin typeface="Calibri" charset="0"/>
               </a:rPr>
               <a:t> </a:t>
             </a:r>
             <a:r>
-              <a:rPr lang="en-US" sz="3200" b="0" dirty="0">
+              <a:rPr lang="en-US" sz="3200" dirty="0" smtClean="0">
                 <a:latin typeface="Calibri" charset="0"/>
               </a:rPr>
               <a:t>Interpretation</a:t>
             </a:r>
-            <a:endParaRPr lang="en-US" sz="3200" dirty="0"/>
           </a:p>
-        </p:txBody>
-      </p:sp>
-      <p:sp>
-        <p:nvSpPr>
-          <p:cNvPr id="48" name="TextBox 47">
-            <a:extLst>
-              <a:ext uri="{FF2B5EF4-FFF2-40B4-BE49-F238E27FC236}">
-                <a16:creationId xmlns="" xmlns:a16="http://schemas.microsoft.com/office/drawing/2014/main" id="{D9C6F1D3-02AF-4D2D-AD5C-A4546F877A04}"/>
-              </a:ext>
-            </a:extLst>
-          </p:cNvPr>
-          <p:cNvSpPr txBox="1"/>
-          <p:nvPr/>
-        </p:nvSpPr>
-        <p:spPr>
-          <a:xfrm>
-            <a:off x="13504095" y="5912991"/>
-            <a:ext cx="4451209" cy="707886"/>
-          </a:xfrm>
-          <a:prstGeom prst="rect">
-            <a:avLst/>
-          </a:prstGeom>
-          <a:noFill/>
-        </p:spPr>
-        <p:txBody>
-          <a:bodyPr wrap="square" rtlCol="0">
-            <a:spAutoFit/>
-          </a:bodyPr>
-          <a:lstStyle/>
           <a:p>
-            <a:pPr>
-              <a:defRPr/>
-            </a:pPr>
             <a:r>
-              <a:rPr lang="en-US" sz="2000" b="0" dirty="0">
+              <a:rPr lang="en-US" sz="2800" b="0" dirty="0">
                 <a:latin typeface="Calibri" charset="0"/>
               </a:rPr>
-              <a:t>Randomly reset pixels in a selected region of a specified </a:t>
+              <a:t>Use DFI </a:t>
             </a:r>
             <a:r>
-              <a:rPr lang="en-US" sz="2000" b="0" dirty="0" err="1">
+              <a:rPr lang="en-US" sz="2800" b="0" dirty="0" smtClean="0">
                 <a:latin typeface="Calibri" charset="0"/>
               </a:rPr>
-              <a:t>windowsize</a:t>
+              <a:t>algorithm to </a:t>
             </a:r>
             <a:r>
-              <a:rPr lang="en-US" sz="2000" b="0" dirty="0">
+              <a:rPr lang="en-US" sz="2800" b="0" dirty="0">
                 <a:latin typeface="Calibri" charset="0"/>
               </a:rPr>
-              <a:t>.</a:t>
+              <a:t>make faces look older or </a:t>
             </a:r>
-          </a:p>
-        </p:txBody>
-      </p:sp>
-      <mc:AlternateContent xmlns:mc="http://schemas.openxmlformats.org/markup-compatibility/2006" xmlns:a14="http://schemas.microsoft.com/office/drawing/2010/main">
-        <mc:Choice Requires="a14">
-          <p:sp>
-            <p:nvSpPr>
-              <p:cNvPr id="50" name="TextBox 49">
-                <a:extLst>
-                  <a:ext uri="{FF2B5EF4-FFF2-40B4-BE49-F238E27FC236}">
-                    <a16:creationId xmlns="" xmlns:a16="http://schemas.microsoft.com/office/drawing/2014/main" id="{D3125782-10BA-4DA6-9538-1233D6DF295C}"/>
-                  </a:ext>
-                </a:extLst>
-              </p:cNvPr>
-              <p:cNvSpPr txBox="1"/>
-              <p:nvPr/>
-            </p:nvSpPr>
-            <p:spPr>
-              <a:xfrm>
-                <a:off x="18731140" y="5752848"/>
-                <a:ext cx="5028339" cy="1771254"/>
-              </a:xfrm>
-              <a:prstGeom prst="rect">
-                <a:avLst/>
-              </a:prstGeom>
-              <a:noFill/>
-            </p:spPr>
-            <p:txBody>
-              <a:bodyPr wrap="square" rtlCol="0">
-                <a:spAutoFit/>
-              </a:bodyPr>
-              <a:lstStyle/>
-              <a:p>
-                <a:pPr>
-                  <a:defRPr/>
-                </a:pPr>
-                <a:r>
-                  <a:rPr lang="en-US" sz="2000" b="0" dirty="0">
-                    <a:latin typeface="Calibri" charset="0"/>
-                  </a:rPr>
-                  <a:t>Impose pincushion and barrel distortion (caused by spherical camera lenses): replace pixel </a:t>
-                </a:r>
-                <a14:m>
-                  <m:oMath xmlns:m="http://schemas.openxmlformats.org/officeDocument/2006/math">
-                    <m:r>
-                      <a:rPr lang="en-US" sz="2000" b="0" i="1" smtClean="0">
-                        <a:latin typeface="Cambria Math" panose="02040503050406030204" pitchFamily="18" charset="0"/>
-                      </a:rPr>
-                      <m:t>(</m:t>
-                    </m:r>
-                    <m:r>
-                      <a:rPr lang="en-US" sz="2000" b="0" i="1" smtClean="0">
-                        <a:latin typeface="Cambria Math" panose="02040503050406030204" pitchFamily="18" charset="0"/>
-                      </a:rPr>
-                      <m:t>𝑖</m:t>
-                    </m:r>
-                    <m:r>
-                      <a:rPr lang="en-US" sz="2000" b="0" i="1" smtClean="0">
-                        <a:latin typeface="Cambria Math" panose="02040503050406030204" pitchFamily="18" charset="0"/>
-                      </a:rPr>
-                      <m:t>,</m:t>
-                    </m:r>
-                    <m:r>
-                      <a:rPr lang="en-US" sz="2000" b="0" i="1" smtClean="0">
-                        <a:latin typeface="Cambria Math" panose="02040503050406030204" pitchFamily="18" charset="0"/>
-                      </a:rPr>
-                      <m:t>𝑗</m:t>
-                    </m:r>
-                    <m:r>
-                      <a:rPr lang="en-US" sz="2000" b="0" i="1" smtClean="0">
-                        <a:latin typeface="Cambria Math" panose="02040503050406030204" pitchFamily="18" charset="0"/>
-                      </a:rPr>
-                      <m:t>)</m:t>
-                    </m:r>
-                  </m:oMath>
-                </a14:m>
-                <a:r>
-                  <a:rPr lang="en-US" sz="2000" b="0" dirty="0">
-                    <a:latin typeface="Calibri" charset="0"/>
-                  </a:rPr>
-                  <a:t> with </a:t>
-                </a:r>
-                <a14:m>
-                  <m:oMath xmlns:m="http://schemas.openxmlformats.org/officeDocument/2006/math">
-                    <m:r>
-                      <a:rPr lang="en-US" sz="2000" b="0" i="1" smtClean="0">
-                        <a:latin typeface="Cambria Math" panose="02040503050406030204" pitchFamily="18" charset="0"/>
-                      </a:rPr>
-                      <m:t>(</m:t>
-                    </m:r>
-                    <m:f>
-                      <m:fPr>
-                        <m:ctrlPr>
-                          <a:rPr lang="en-US" sz="2000" b="0" i="1" smtClean="0">
-                            <a:latin typeface="Cambria Math" charset="0"/>
-                          </a:rPr>
-                        </m:ctrlPr>
-                      </m:fPr>
-                      <m:num>
-                        <m:r>
-                          <a:rPr lang="en-US" sz="2000" b="0" i="1" smtClean="0">
-                            <a:latin typeface="Cambria Math" panose="02040503050406030204" pitchFamily="18" charset="0"/>
-                          </a:rPr>
-                          <m:t>𝑖</m:t>
-                        </m:r>
-                      </m:num>
-                      <m:den>
-                        <m:r>
-                          <a:rPr lang="en-US" sz="2000" b="0" i="1" smtClean="0">
-                            <a:latin typeface="Cambria Math" panose="02040503050406030204" pitchFamily="18" charset="0"/>
-                          </a:rPr>
-                          <m:t>1+</m:t>
-                        </m:r>
-                        <m:r>
-                          <a:rPr lang="en-US" sz="2000" b="0" i="1" smtClean="0">
-                            <a:latin typeface="Cambria Math" panose="02040503050406030204" pitchFamily="18" charset="0"/>
-                          </a:rPr>
-                          <m:t>𝑘</m:t>
-                        </m:r>
-                        <m:sSup>
-                          <m:sSupPr>
-                            <m:ctrlPr>
-                              <a:rPr lang="en-US" sz="2000" b="0" i="1" smtClean="0">
-                                <a:latin typeface="Cambria Math" charset="0"/>
-                              </a:rPr>
-                            </m:ctrlPr>
-                          </m:sSupPr>
-                          <m:e>
-                            <m:r>
-                              <a:rPr lang="en-US" sz="2000" b="0" i="1" smtClean="0">
-                                <a:latin typeface="Cambria Math" panose="02040503050406030204" pitchFamily="18" charset="0"/>
-                              </a:rPr>
-                              <m:t>𝑟</m:t>
-                            </m:r>
-                          </m:e>
-                          <m:sup>
-                            <m:r>
-                              <a:rPr lang="en-US" sz="2000" b="0" i="1" smtClean="0">
-                                <a:latin typeface="Cambria Math" panose="02040503050406030204" pitchFamily="18" charset="0"/>
-                              </a:rPr>
-                              <m:t>2</m:t>
-                            </m:r>
-                          </m:sup>
-                        </m:sSup>
-                      </m:den>
-                    </m:f>
-                    <m:r>
-                      <a:rPr lang="en-US" sz="2000" b="0" i="1" smtClean="0">
-                        <a:latin typeface="Cambria Math" panose="02040503050406030204" pitchFamily="18" charset="0"/>
-                      </a:rPr>
-                      <m:t>,</m:t>
-                    </m:r>
-                    <m:f>
-                      <m:fPr>
-                        <m:ctrlPr>
-                          <a:rPr lang="en-US" sz="2000" b="0" i="1" smtClean="0">
-                            <a:latin typeface="Cambria Math" charset="0"/>
-                          </a:rPr>
-                        </m:ctrlPr>
-                      </m:fPr>
-                      <m:num>
-                        <m:r>
-                          <a:rPr lang="en-US" sz="2000" b="0" i="1" smtClean="0">
-                            <a:latin typeface="Cambria Math" panose="02040503050406030204" pitchFamily="18" charset="0"/>
-                          </a:rPr>
-                          <m:t>𝑗</m:t>
-                        </m:r>
-                      </m:num>
-                      <m:den>
-                        <m:r>
-                          <a:rPr lang="en-US" sz="2000" b="0" i="1" smtClean="0">
-                            <a:latin typeface="Cambria Math" panose="02040503050406030204" pitchFamily="18" charset="0"/>
-                          </a:rPr>
-                          <m:t>1+</m:t>
-                        </m:r>
-                        <m:r>
-                          <a:rPr lang="en-US" sz="2000" b="0" i="1" smtClean="0">
-                            <a:latin typeface="Cambria Math" panose="02040503050406030204" pitchFamily="18" charset="0"/>
-                          </a:rPr>
-                          <m:t>𝑘</m:t>
-                        </m:r>
-                        <m:sSup>
-                          <m:sSupPr>
-                            <m:ctrlPr>
-                              <a:rPr lang="en-US" sz="2000" b="0" i="1" smtClean="0">
-                                <a:latin typeface="Cambria Math" charset="0"/>
-                              </a:rPr>
-                            </m:ctrlPr>
-                          </m:sSupPr>
-                          <m:e>
-                            <m:r>
-                              <a:rPr lang="en-US" sz="2000" b="0" i="1" smtClean="0">
-                                <a:latin typeface="Cambria Math" panose="02040503050406030204" pitchFamily="18" charset="0"/>
-                              </a:rPr>
-                              <m:t>𝑟</m:t>
-                            </m:r>
-                          </m:e>
-                          <m:sup>
-                            <m:r>
-                              <a:rPr lang="en-US" sz="2000" b="0" i="1" smtClean="0">
-                                <a:latin typeface="Cambria Math" panose="02040503050406030204" pitchFamily="18" charset="0"/>
-                              </a:rPr>
-                              <m:t>2</m:t>
-                            </m:r>
-                          </m:sup>
-                        </m:sSup>
-                      </m:den>
-                    </m:f>
-                    <m:r>
-                      <a:rPr lang="en-US" sz="2000" b="0" i="1" smtClean="0">
-                        <a:latin typeface="Cambria Math" panose="02040503050406030204" pitchFamily="18" charset="0"/>
-                      </a:rPr>
-                      <m:t>)</m:t>
-                    </m:r>
-                  </m:oMath>
-                </a14:m>
-                <a:r>
-                  <a:rPr lang="en-US" sz="2000" b="0" dirty="0">
-                    <a:latin typeface="Calibri" charset="0"/>
-                  </a:rPr>
-                  <a:t> where </a:t>
-                </a:r>
-                <a14:m>
-                  <m:oMath xmlns:m="http://schemas.openxmlformats.org/officeDocument/2006/math">
-                    <m:r>
-                      <a:rPr lang="en-US" sz="2000" b="0" i="1" smtClean="0">
-                        <a:latin typeface="Cambria Math" panose="02040503050406030204" pitchFamily="18" charset="0"/>
-                      </a:rPr>
-                      <m:t>𝑟</m:t>
-                    </m:r>
-                  </m:oMath>
-                </a14:m>
-                <a:r>
-                  <a:rPr lang="en-US" sz="2000" b="0" dirty="0">
-                    <a:latin typeface="Calibri" charset="0"/>
-                  </a:rPr>
-                  <a:t> is distance from center of image and </a:t>
-                </a:r>
-                <a14:m>
-                  <m:oMath xmlns:m="http://schemas.openxmlformats.org/officeDocument/2006/math">
-                    <m:r>
-                      <a:rPr lang="en-US" sz="2000" b="0" i="1" smtClean="0">
-                        <a:latin typeface="Cambria Math" panose="02040503050406030204" pitchFamily="18" charset="0"/>
-                      </a:rPr>
-                      <m:t>𝑘</m:t>
-                    </m:r>
-                  </m:oMath>
-                </a14:m>
-                <a:r>
-                  <a:rPr lang="en-US" sz="2000" b="0" dirty="0">
-                    <a:latin typeface="Calibri" charset="0"/>
-                  </a:rPr>
-                  <a:t> controls distortion amount and type. [1]</a:t>
-                </a:r>
-              </a:p>
-            </p:txBody>
-          </p:sp>
-        </mc:Choice>
-        <mc:Fallback xmlns="">
-          <p:sp>
-            <p:nvSpPr>
-              <p:cNvPr id="50" name="TextBox 49">
-                <a:extLst>
-                  <a:ext uri="{FF2B5EF4-FFF2-40B4-BE49-F238E27FC236}">
-                    <a16:creationId xmlns:a16="http://schemas.microsoft.com/office/drawing/2014/main" id="{D3125782-10BA-4DA6-9538-1233D6DF295C}"/>
-                  </a:ext>
-                </a:extLst>
-              </p:cNvPr>
-              <p:cNvSpPr txBox="1">
-                <a:spLocks noRot="1" noChangeAspect="1" noMove="1" noResize="1" noEditPoints="1" noAdjustHandles="1" noChangeArrowheads="1" noChangeShapeType="1" noTextEdit="1"/>
-              </p:cNvSpPr>
-              <p:nvPr/>
-            </p:nvSpPr>
-            <p:spPr>
-              <a:xfrm>
-                <a:off x="18731140" y="5752848"/>
-                <a:ext cx="5028339" cy="1771254"/>
-              </a:xfrm>
-              <a:prstGeom prst="rect">
-                <a:avLst/>
-              </a:prstGeom>
-              <a:blipFill>
-                <a:blip r:embed="rId14"/>
-                <a:stretch>
-                  <a:fillRect l="-1333" t="-2069" b="-5517"/>
-                </a:stretch>
-              </a:blipFill>
-            </p:spPr>
-            <p:txBody>
-              <a:bodyPr/>
-              <a:lstStyle/>
-              <a:p>
-                <a:r>
-                  <a:rPr lang="en-US">
-                    <a:noFill/>
-                  </a:rPr>
-                  <a:t> </a:t>
-                </a:r>
-              </a:p>
-            </p:txBody>
-          </p:sp>
-        </mc:Fallback>
-      </mc:AlternateContent>
-      <p:sp>
-        <p:nvSpPr>
-          <p:cNvPr id="51" name="TextBox 50">
-            <a:extLst>
-              <a:ext uri="{FF2B5EF4-FFF2-40B4-BE49-F238E27FC236}">
-                <a16:creationId xmlns="" xmlns:a16="http://schemas.microsoft.com/office/drawing/2014/main" id="{B5A937F8-C361-4646-A97C-459B3A61504E}"/>
-              </a:ext>
-            </a:extLst>
-          </p:cNvPr>
-          <p:cNvSpPr txBox="1"/>
-          <p:nvPr/>
-        </p:nvSpPr>
-        <p:spPr>
-          <a:xfrm>
-            <a:off x="12938865" y="11692002"/>
-            <a:ext cx="5028339" cy="707886"/>
-          </a:xfrm>
-          <a:prstGeom prst="rect">
-            <a:avLst/>
-          </a:prstGeom>
-          <a:noFill/>
-        </p:spPr>
-        <p:txBody>
-          <a:bodyPr wrap="square" rtlCol="0">
-            <a:spAutoFit/>
-          </a:bodyPr>
-          <a:lstStyle/>
-          <a:p>
-            <a:pPr>
-              <a:defRPr/>
-            </a:pPr>
             <a:r>
-              <a:rPr lang="en-US" sz="2000" b="0" dirty="0">
+              <a:rPr lang="en-US" sz="2800" b="0" dirty="0" smtClean="0">
                 <a:latin typeface="Calibri" charset="0"/>
               </a:rPr>
-              <a:t>Use DFI network to make faces look older or add a moustache to the face. [3]</a:t>
+              <a:t>to add </a:t>
             </a:r>
-          </a:p>
-        </p:txBody>
-      </p:sp>
-      <p:sp>
-        <p:nvSpPr>
-          <p:cNvPr id="52" name="TextBox 51">
-            <a:extLst>
-              <a:ext uri="{FF2B5EF4-FFF2-40B4-BE49-F238E27FC236}">
-                <a16:creationId xmlns="" xmlns:a16="http://schemas.microsoft.com/office/drawing/2014/main" id="{5B573FA1-48FA-4188-A006-2D497FA6855A}"/>
-              </a:ext>
-            </a:extLst>
-          </p:cNvPr>
-          <p:cNvSpPr txBox="1"/>
-          <p:nvPr/>
-        </p:nvSpPr>
-        <p:spPr>
-          <a:xfrm>
-            <a:off x="18874472" y="12020633"/>
-            <a:ext cx="4741676" cy="707886"/>
-          </a:xfrm>
-          <a:prstGeom prst="rect">
-            <a:avLst/>
-          </a:prstGeom>
-          <a:noFill/>
-        </p:spPr>
-        <p:txBody>
-          <a:bodyPr wrap="square" rtlCol="0">
-            <a:spAutoFit/>
-          </a:bodyPr>
-          <a:lstStyle/>
-          <a:p>
-            <a:pPr>
-              <a:defRPr/>
-            </a:pPr>
             <a:r>
-              <a:rPr lang="en-US" sz="2000" b="0" dirty="0">
+              <a:rPr lang="en-US" sz="2800" b="0" dirty="0">
                 <a:latin typeface="Calibri" charset="0"/>
               </a:rPr>
-              <a:t>Replace each pixel by the average of its neighbors within a specified </a:t>
+              <a:t>a moustache to the face. [3</a:t>
             </a:r>
             <a:r>
-              <a:rPr lang="en-US" sz="2000" b="0" dirty="0" err="1">
+              <a:rPr lang="en-US" sz="2800" b="0" dirty="0" smtClean="0">
                 <a:latin typeface="Calibri" charset="0"/>
               </a:rPr>
-              <a:t>windowsize</a:t>
+              <a:t>]</a:t>
             </a:r>
-            <a:r>
-              <a:rPr lang="en-US" sz="2000" b="0" dirty="0">
-                <a:latin typeface="Calibri" charset="0"/>
-              </a:rPr>
-              <a:t>.</a:t>
-            </a:r>
-          </a:p>
-        </p:txBody>
-      </p:sp>
-      <p:sp>
-        <p:nvSpPr>
-          <p:cNvPr id="18" name="TextBox 17">
-            <a:extLst>
-              <a:ext uri="{FF2B5EF4-FFF2-40B4-BE49-F238E27FC236}">
-                <a16:creationId xmlns="" xmlns:a16="http://schemas.microsoft.com/office/drawing/2014/main" id="{4662D3E9-9ECD-4FA3-81B8-390F9A9855D5}"/>
-              </a:ext>
-            </a:extLst>
-          </p:cNvPr>
-          <p:cNvSpPr txBox="1"/>
-          <p:nvPr/>
-        </p:nvSpPr>
-        <p:spPr>
-          <a:xfrm>
-            <a:off x="12936553" y="12853869"/>
-            <a:ext cx="4741676" cy="3416320"/>
-          </a:xfrm>
-          <a:prstGeom prst="rect">
-            <a:avLst/>
-          </a:prstGeom>
-          <a:noFill/>
-          <a:ln>
-            <a:solidFill>
-              <a:schemeClr val="accent6"/>
-            </a:solidFill>
-          </a:ln>
-        </p:spPr>
-        <p:txBody>
-          <a:bodyPr wrap="square" rtlCol="0">
-            <a:spAutoFit/>
-          </a:bodyPr>
-          <a:lstStyle/>
-          <a:p>
-            <a:endParaRPr lang="en-US" dirty="0"/>
-          </a:p>
-          <a:p>
-            <a:endParaRPr lang="en-US" dirty="0"/>
-          </a:p>
-          <a:p>
-            <a:endParaRPr lang="en-US" dirty="0"/>
-          </a:p>
-          <a:p>
-            <a:endParaRPr lang="en-US" dirty="0"/>
-          </a:p>
-          <a:p>
-            <a:endParaRPr lang="en-US" dirty="0"/>
-          </a:p>
-          <a:p>
-            <a:endParaRPr lang="en-US" dirty="0"/>
-          </a:p>
-          <a:p>
-            <a:endParaRPr lang="en-US" dirty="0"/>
-          </a:p>
-          <a:p>
-            <a:endParaRPr lang="en-US" dirty="0"/>
-          </a:p>
-          <a:p>
-            <a:endParaRPr lang="en-US" dirty="0"/>
+            <a:endParaRPr lang="en-US" sz="2800" b="0" dirty="0">
+              <a:latin typeface="Calibri" charset="0"/>
+            </a:endParaRPr>
           </a:p>
         </p:txBody>
       </p:sp>
@@ -4594,855 +5340,6 @@
           </a:prstGeom>
         </p:spPr>
       </p:pic>
-      <mc:AlternateContent xmlns:mc="http://schemas.openxmlformats.org/markup-compatibility/2006" xmlns:a14="http://schemas.microsoft.com/office/drawing/2010/main">
-        <mc:Choice Requires="a14">
-          <p:sp>
-            <p:nvSpPr>
-              <p:cNvPr id="65" name="TextBox 64">
-                <a:extLst>
-                  <a:ext uri="{FF2B5EF4-FFF2-40B4-BE49-F238E27FC236}">
-                    <a16:creationId xmlns="" xmlns:a16="http://schemas.microsoft.com/office/drawing/2014/main" id="{2C57997F-D395-4221-B117-91AC8D3BD8F5}"/>
-                  </a:ext>
-                </a:extLst>
-              </p:cNvPr>
-              <p:cNvSpPr txBox="1"/>
-              <p:nvPr/>
-            </p:nvSpPr>
-            <p:spPr>
-              <a:xfrm>
-                <a:off x="783309" y="16076005"/>
-                <a:ext cx="11125504" cy="11618309"/>
-              </a:xfrm>
-              <a:prstGeom prst="rect">
-                <a:avLst/>
-              </a:prstGeom>
-              <a:noFill/>
-            </p:spPr>
-            <p:txBody>
-              <a:bodyPr wrap="square" rtlCol="0">
-                <a:spAutoFit/>
-              </a:bodyPr>
-              <a:lstStyle/>
-              <a:p>
-                <a:pPr>
-                  <a:defRPr/>
-                </a:pPr>
-                <a:r>
-                  <a:rPr lang="en-US" sz="3200" dirty="0">
-                    <a:latin typeface="Calibri" charset="0"/>
-                  </a:rPr>
-                  <a:t>Face recognition algorithms</a:t>
-                </a:r>
-              </a:p>
-              <a:p>
-                <a:pPr marL="457200" indent="-457200">
-                  <a:buFont typeface="Arial" charset="0"/>
-                  <a:buChar char="•"/>
-                  <a:defRPr/>
-                </a:pPr>
-                <a:r>
-                  <a:rPr lang="en-US" sz="3200" b="0" u="sng" dirty="0">
-                    <a:latin typeface="Calibri" charset="0"/>
-                  </a:rPr>
-                  <a:t>PCA</a:t>
-                </a:r>
-                <a:r>
-                  <a:rPr lang="en-US" sz="3200" b="0" dirty="0">
-                    <a:latin typeface="Calibri" charset="0"/>
-                  </a:rPr>
-                  <a:t>: Compute “eigenface” face projections of test image (</a:t>
-                </a:r>
-                <a14:m>
-                  <m:oMath xmlns:m="http://schemas.openxmlformats.org/officeDocument/2006/math">
-                    <m:r>
-                      <m:rPr>
-                        <m:sty m:val="p"/>
-                      </m:rPr>
-                      <a:rPr lang="en-US" sz="3200" b="0" i="0" smtClean="0">
-                        <a:latin typeface="Cambria Math" panose="02040503050406030204" pitchFamily="18" charset="0"/>
-                      </a:rPr>
-                      <m:t>Ω</m:t>
-                    </m:r>
-                  </m:oMath>
-                </a14:m>
-                <a:r>
-                  <a:rPr lang="en-US" sz="3200" b="0" dirty="0">
-                    <a:latin typeface="Calibri" charset="0"/>
-                  </a:rPr>
-                  <a:t>) and training images (</a:t>
-                </a:r>
-                <a14:m>
-                  <m:oMath xmlns:m="http://schemas.openxmlformats.org/officeDocument/2006/math">
-                    <m:sSub>
-                      <m:sSubPr>
-                        <m:ctrlPr>
-                          <a:rPr lang="en-US" sz="3200" b="0" i="1" smtClean="0">
-                            <a:latin typeface="Cambria Math" charset="0"/>
-                          </a:rPr>
-                        </m:ctrlPr>
-                      </m:sSubPr>
-                      <m:e>
-                        <m:r>
-                          <m:rPr>
-                            <m:sty m:val="p"/>
-                          </m:rPr>
-                          <a:rPr lang="en-US" sz="3200" b="0" i="0" smtClean="0">
-                            <a:latin typeface="Cambria Math" panose="02040503050406030204" pitchFamily="18" charset="0"/>
-                          </a:rPr>
-                          <m:t>Ω</m:t>
-                        </m:r>
-                      </m:e>
-                      <m:sub>
-                        <m:r>
-                          <a:rPr lang="en-US" sz="3200" b="0" i="1" smtClean="0">
-                            <a:latin typeface="Cambria Math" panose="02040503050406030204" pitchFamily="18" charset="0"/>
-                          </a:rPr>
-                          <m:t>𝑖</m:t>
-                        </m:r>
-                      </m:sub>
-                    </m:sSub>
-                  </m:oMath>
-                </a14:m>
-                <a:r>
-                  <a:rPr lang="en-US" sz="3200" b="0" dirty="0">
-                    <a:latin typeface="Calibri" charset="0"/>
-                  </a:rPr>
-                  <a:t>) and solve </a:t>
-                </a:r>
-                <a14:m>
-                  <m:oMath xmlns:m="http://schemas.openxmlformats.org/officeDocument/2006/math">
-                    <m:r>
-                      <a:rPr lang="en-US" sz="3200" b="0" i="1" smtClean="0">
-                        <a:latin typeface="Cambria Math" panose="02040503050406030204" pitchFamily="18" charset="0"/>
-                      </a:rPr>
-                      <m:t>𝑙𝑎𝑏𝑒𝑙</m:t>
-                    </m:r>
-                    <m:r>
-                      <a:rPr lang="en-US" sz="3200" b="0" i="1" smtClean="0">
-                        <a:latin typeface="Cambria Math" panose="02040503050406030204" pitchFamily="18" charset="0"/>
-                      </a:rPr>
-                      <m:t>(</m:t>
-                    </m:r>
-                    <m:r>
-                      <a:rPr lang="en-US" sz="3200" b="0" i="1" smtClean="0">
-                        <a:latin typeface="Cambria Math" panose="02040503050406030204" pitchFamily="18" charset="0"/>
-                      </a:rPr>
-                      <m:t>𝑎𝑟𝑔𝑚𝑖</m:t>
-                    </m:r>
-                    <m:sSub>
-                      <m:sSubPr>
-                        <m:ctrlPr>
-                          <a:rPr lang="en-US" sz="3200" b="0" i="1" smtClean="0">
-                            <a:latin typeface="Cambria Math" charset="0"/>
-                          </a:rPr>
-                        </m:ctrlPr>
-                      </m:sSubPr>
-                      <m:e>
-                        <m:r>
-                          <a:rPr lang="en-US" sz="3200" b="0" i="1" smtClean="0">
-                            <a:latin typeface="Cambria Math" panose="02040503050406030204" pitchFamily="18" charset="0"/>
-                          </a:rPr>
-                          <m:t>𝑛</m:t>
-                        </m:r>
-                      </m:e>
-                      <m:sub>
-                        <m:r>
-                          <a:rPr lang="en-US" sz="3200" b="0" i="1" smtClean="0">
-                            <a:latin typeface="Cambria Math" panose="02040503050406030204" pitchFamily="18" charset="0"/>
-                          </a:rPr>
-                          <m:t>𝑖</m:t>
-                        </m:r>
-                      </m:sub>
-                    </m:sSub>
-                    <m:sSub>
-                      <m:sSubPr>
-                        <m:ctrlPr>
-                          <a:rPr lang="en-US" sz="3200" b="0" i="1" smtClean="0">
-                            <a:latin typeface="Cambria Math" charset="0"/>
-                          </a:rPr>
-                        </m:ctrlPr>
-                      </m:sSubPr>
-                      <m:e>
-                        <m:d>
-                          <m:dPr>
-                            <m:begChr m:val="|"/>
-                            <m:endChr m:val="|"/>
-                            <m:ctrlPr>
-                              <a:rPr lang="en-US" sz="3200" b="0" i="1" smtClean="0">
-                                <a:latin typeface="Cambria Math" charset="0"/>
-                              </a:rPr>
-                            </m:ctrlPr>
-                          </m:dPr>
-                          <m:e>
-                            <m:d>
-                              <m:dPr>
-                                <m:begChr m:val="|"/>
-                                <m:endChr m:val="|"/>
-                                <m:ctrlPr>
-                                  <a:rPr lang="en-US" sz="3200" b="0" i="1" smtClean="0">
-                                    <a:latin typeface="Cambria Math" charset="0"/>
-                                  </a:rPr>
-                                </m:ctrlPr>
-                              </m:dPr>
-                              <m:e>
-                                <m:r>
-                                  <m:rPr>
-                                    <m:sty m:val="p"/>
-                                  </m:rPr>
-                                  <a:rPr lang="en-US" sz="3200" b="0" i="0" smtClean="0">
-                                    <a:latin typeface="Cambria Math" panose="02040503050406030204" pitchFamily="18" charset="0"/>
-                                  </a:rPr>
-                                  <m:t>Ω</m:t>
-                                </m:r>
-                                <m:r>
-                                  <a:rPr lang="en-US" sz="3200" b="0" i="1" smtClean="0">
-                                    <a:latin typeface="Cambria Math" panose="02040503050406030204" pitchFamily="18" charset="0"/>
-                                  </a:rPr>
-                                  <m:t>−</m:t>
-                                </m:r>
-                                <m:r>
-                                  <m:rPr>
-                                    <m:sty m:val="p"/>
-                                  </m:rPr>
-                                  <a:rPr lang="en-US" sz="3200" b="0" i="0" smtClean="0">
-                                    <a:latin typeface="Cambria Math" panose="02040503050406030204" pitchFamily="18" charset="0"/>
-                                  </a:rPr>
-                                  <m:t>Ω</m:t>
-                                </m:r>
-                                <m:r>
-                                  <a:rPr lang="en-US" sz="3200" b="0" i="1" smtClean="0">
-                                    <a:latin typeface="Cambria Math" panose="02040503050406030204" pitchFamily="18" charset="0"/>
-                                  </a:rPr>
-                                  <m:t>𝑖</m:t>
-                                </m:r>
-                              </m:e>
-                            </m:d>
-                          </m:e>
-                        </m:d>
-                      </m:e>
-                      <m:sub>
-                        <m:r>
-                          <a:rPr lang="en-US" sz="3200" b="0" i="1" smtClean="0">
-                            <a:latin typeface="Cambria Math" panose="02040503050406030204" pitchFamily="18" charset="0"/>
-                          </a:rPr>
-                          <m:t>2</m:t>
-                        </m:r>
-                      </m:sub>
-                    </m:sSub>
-                    <m:r>
-                      <a:rPr lang="en-US" sz="3200" b="0" i="1" smtClean="0">
-                        <a:latin typeface="Cambria Math" panose="02040503050406030204" pitchFamily="18" charset="0"/>
-                      </a:rPr>
-                      <m:t>)</m:t>
-                    </m:r>
-                  </m:oMath>
-                </a14:m>
-                <a:r>
-                  <a:rPr lang="en-US" sz="3200" b="0" dirty="0">
-                    <a:latin typeface="Calibri" charset="0"/>
-                  </a:rPr>
-                  <a:t>. [4]</a:t>
-                </a:r>
-              </a:p>
-              <a:p>
-                <a:pPr marL="457200" indent="-457200">
-                  <a:buFont typeface="Arial" charset="0"/>
-                  <a:buChar char="•"/>
-                  <a:defRPr/>
-                </a:pPr>
-                <a:r>
-                  <a:rPr lang="en-US" sz="3200" b="0" u="sng" dirty="0">
-                    <a:latin typeface="Calibri" charset="0"/>
-                  </a:rPr>
-                  <a:t>Sparse Representation</a:t>
-                </a:r>
-                <a:r>
-                  <a:rPr lang="en-US" sz="3200" b="0" dirty="0">
-                    <a:latin typeface="Calibri" charset="0"/>
-                  </a:rPr>
-                  <a:t>: Encode test image as sparse representation of training faces (For test image </a:t>
-                </a:r>
-                <a14:m>
-                  <m:oMath xmlns:m="http://schemas.openxmlformats.org/officeDocument/2006/math">
-                    <m:r>
-                      <a:rPr lang="en-US" sz="3200" b="0" i="1" smtClean="0">
-                        <a:latin typeface="Cambria Math" panose="02040503050406030204" pitchFamily="18" charset="0"/>
-                      </a:rPr>
-                      <m:t>𝑦</m:t>
-                    </m:r>
-                  </m:oMath>
-                </a14:m>
-                <a:r>
-                  <a:rPr lang="en-US" sz="3200" b="0" dirty="0">
-                    <a:latin typeface="Calibri" charset="0"/>
-                  </a:rPr>
-                  <a:t> and  train images </a:t>
-                </a:r>
-                <a14:m>
-                  <m:oMath xmlns:m="http://schemas.openxmlformats.org/officeDocument/2006/math">
-                    <m:r>
-                      <m:rPr>
-                        <m:sty m:val="p"/>
-                      </m:rPr>
-                      <a:rPr lang="en-US" sz="3200" b="0" i="0" smtClean="0">
-                        <a:latin typeface="Cambria Math" panose="02040503050406030204" pitchFamily="18" charset="0"/>
-                      </a:rPr>
-                      <m:t>Φ</m:t>
-                    </m:r>
-                  </m:oMath>
-                </a14:m>
-                <a:r>
-                  <a:rPr lang="en-US" sz="3200" b="0" dirty="0">
-                    <a:latin typeface="Calibri" charset="0"/>
-                  </a:rPr>
-                  <a:t>, solve </a:t>
-                </a:r>
-                <a14:m>
-                  <m:oMath xmlns:m="http://schemas.openxmlformats.org/officeDocument/2006/math">
-                    <m:sSub>
-                      <m:sSubPr>
-                        <m:ctrlPr>
-                          <a:rPr lang="en-US" sz="3200" b="0" i="1" smtClean="0">
-                            <a:latin typeface="Cambria Math" charset="0"/>
-                          </a:rPr>
-                        </m:ctrlPr>
-                      </m:sSubPr>
-                      <m:e>
-                        <m:func>
-                          <m:funcPr>
-                            <m:ctrlPr>
-                              <a:rPr lang="en-US" sz="3200" b="0" i="1" smtClean="0">
-                                <a:latin typeface="Cambria Math" charset="0"/>
-                              </a:rPr>
-                            </m:ctrlPr>
-                          </m:funcPr>
-                          <m:fName>
-                            <m:r>
-                              <m:rPr>
-                                <m:sty m:val="p"/>
-                              </m:rPr>
-                              <a:rPr lang="en-US" sz="3200" b="0" i="0" smtClean="0">
-                                <a:latin typeface="Cambria Math" panose="02040503050406030204" pitchFamily="18" charset="0"/>
-                              </a:rPr>
-                              <m:t>min</m:t>
-                            </m:r>
-                          </m:fName>
-                          <m:e>
-                            <m:d>
-                              <m:dPr>
-                                <m:begChr m:val="|"/>
-                                <m:endChr m:val="|"/>
-                                <m:ctrlPr>
-                                  <a:rPr lang="en-US" sz="3200" b="0" i="1" smtClean="0">
-                                    <a:latin typeface="Cambria Math" charset="0"/>
-                                  </a:rPr>
-                                </m:ctrlPr>
-                              </m:dPr>
-                              <m:e>
-                                <m:d>
-                                  <m:dPr>
-                                    <m:begChr m:val="|"/>
-                                    <m:endChr m:val="|"/>
-                                    <m:ctrlPr>
-                                      <a:rPr lang="en-US" sz="3200" b="0" i="1" smtClean="0">
-                                        <a:latin typeface="Cambria Math" charset="0"/>
-                                      </a:rPr>
-                                    </m:ctrlPr>
-                                  </m:dPr>
-                                  <m:e>
-                                    <m:r>
-                                      <a:rPr lang="en-US" sz="3200" b="0" i="1" smtClean="0">
-                                        <a:latin typeface="Cambria Math" panose="02040503050406030204" pitchFamily="18" charset="0"/>
-                                      </a:rPr>
-                                      <m:t>𝑐</m:t>
-                                    </m:r>
-                                  </m:e>
-                                </m:d>
-                              </m:e>
-                            </m:d>
-                          </m:e>
-                        </m:func>
-                      </m:e>
-                      <m:sub>
-                        <m:r>
-                          <a:rPr lang="en-US" sz="3200" b="0" i="1" smtClean="0">
-                            <a:latin typeface="Cambria Math" panose="02040503050406030204" pitchFamily="18" charset="0"/>
-                          </a:rPr>
-                          <m:t>1</m:t>
-                        </m:r>
-                      </m:sub>
-                    </m:sSub>
-                    <m:r>
-                      <a:rPr lang="en-US" sz="3200" b="0" i="1" smtClean="0">
-                        <a:latin typeface="Cambria Math" panose="02040503050406030204" pitchFamily="18" charset="0"/>
-                      </a:rPr>
-                      <m:t>𝑠𝑡</m:t>
-                    </m:r>
-                    <m:d>
-                      <m:dPr>
-                        <m:begChr m:val="|"/>
-                        <m:endChr m:val="|"/>
-                        <m:ctrlPr>
-                          <a:rPr lang="en-US" sz="3200" b="0" i="1" smtClean="0">
-                            <a:latin typeface="Cambria Math" charset="0"/>
-                          </a:rPr>
-                        </m:ctrlPr>
-                      </m:dPr>
-                      <m:e>
-                        <m:d>
-                          <m:dPr>
-                            <m:begChr m:val="|"/>
-                            <m:endChr m:val="|"/>
-                            <m:ctrlPr>
-                              <a:rPr lang="en-US" sz="3200" b="0" i="1" smtClean="0">
-                                <a:latin typeface="Cambria Math" charset="0"/>
-                              </a:rPr>
-                            </m:ctrlPr>
-                          </m:dPr>
-                          <m:e>
-                            <m:r>
-                              <a:rPr lang="en-US" sz="3200" b="0" i="1" smtClean="0">
-                                <a:latin typeface="Cambria Math" panose="02040503050406030204" pitchFamily="18" charset="0"/>
-                              </a:rPr>
-                              <m:t>𝑦</m:t>
-                            </m:r>
-                            <m:r>
-                              <a:rPr lang="en-US" sz="3200" b="0" i="1" smtClean="0">
-                                <a:latin typeface="Cambria Math" panose="02040503050406030204" pitchFamily="18" charset="0"/>
-                              </a:rPr>
-                              <m:t>−</m:t>
-                            </m:r>
-                            <m:r>
-                              <m:rPr>
-                                <m:sty m:val="p"/>
-                              </m:rPr>
-                              <a:rPr lang="en-US" sz="3200" b="0" i="0" smtClean="0">
-                                <a:latin typeface="Cambria Math" panose="02040503050406030204" pitchFamily="18" charset="0"/>
-                              </a:rPr>
-                              <m:t>Φ</m:t>
-                            </m:r>
-                            <m:r>
-                              <a:rPr lang="en-US" sz="3200" b="0" i="1" smtClean="0">
-                                <a:latin typeface="Cambria Math" panose="02040503050406030204" pitchFamily="18" charset="0"/>
-                              </a:rPr>
-                              <m:t>𝑐</m:t>
-                            </m:r>
-                          </m:e>
-                        </m:d>
-                      </m:e>
-                    </m:d>
-                    <m:r>
-                      <a:rPr lang="en-US" sz="3200" b="0" i="1" smtClean="0">
-                        <a:latin typeface="Cambria Math" panose="02040503050406030204" pitchFamily="18" charset="0"/>
-                      </a:rPr>
-                      <m:t>≤</m:t>
-                    </m:r>
-                    <m:r>
-                      <a:rPr lang="en-US" sz="3200" b="0" i="1" smtClean="0">
-                        <a:latin typeface="Cambria Math" panose="02040503050406030204" pitchFamily="18" charset="0"/>
-                      </a:rPr>
-                      <m:t>𝜖</m:t>
-                    </m:r>
-                  </m:oMath>
-                </a14:m>
-                <a:r>
-                  <a:rPr lang="en-US" sz="3200" b="0" dirty="0">
-                    <a:latin typeface="Calibri" charset="0"/>
-                  </a:rPr>
-                  <a:t>) and classify according to weights. [4]</a:t>
-                </a:r>
-                <a:endParaRPr lang="en-US" sz="3200" b="0" u="sng" dirty="0">
-                  <a:latin typeface="Calibri" charset="0"/>
-                </a:endParaRPr>
-              </a:p>
-              <a:p>
-                <a:pPr marL="914400" lvl="1" indent="-457200">
-                  <a:buFont typeface="Arial" charset="0"/>
-                  <a:buChar char="•"/>
-                  <a:defRPr/>
-                </a:pPr>
-                <a:r>
-                  <a:rPr lang="en-US" sz="3200" b="0" dirty="0">
-                    <a:latin typeface="Calibri" charset="0"/>
-                  </a:rPr>
-                  <a:t>With </a:t>
-                </a:r>
-                <a:r>
-                  <a:rPr lang="en-US" sz="3200" b="0" u="sng" dirty="0">
-                    <a:latin typeface="Calibri" charset="0"/>
-                  </a:rPr>
-                  <a:t>Dimension Reduction</a:t>
-                </a:r>
-                <a:r>
-                  <a:rPr lang="en-US" sz="3200" b="0" dirty="0">
-                    <a:latin typeface="Calibri" charset="0"/>
-                  </a:rPr>
-                  <a:t>: Perform sparse representation after projecting images using PCA.</a:t>
-                </a:r>
-                <a:endParaRPr lang="en-US" sz="3200" b="0" u="sng" dirty="0">
-                  <a:latin typeface="Calibri" charset="0"/>
-                </a:endParaRPr>
-              </a:p>
-              <a:p>
-                <a:pPr marL="914400" lvl="1" indent="-457200">
-                  <a:buFont typeface="Arial" charset="0"/>
-                  <a:buChar char="•"/>
-                  <a:defRPr/>
-                </a:pPr>
-                <a:r>
-                  <a:rPr lang="en-US" sz="3200" b="0" dirty="0">
-                    <a:latin typeface="Calibri" charset="0"/>
-                  </a:rPr>
-                  <a:t>With </a:t>
-                </a:r>
-                <a:r>
-                  <a:rPr lang="en-US" sz="3200" b="0" u="sng" dirty="0">
-                    <a:latin typeface="Calibri" charset="0"/>
-                  </a:rPr>
-                  <a:t>Combined L1 Loss</a:t>
-                </a:r>
-                <a:r>
-                  <a:rPr lang="en-US" sz="3200" b="0" dirty="0">
-                    <a:latin typeface="Calibri" charset="0"/>
-                  </a:rPr>
-                  <a:t>: Encode test faces with both train faces and standard basis vectors (</a:t>
-                </a:r>
-                <a14:m>
-                  <m:oMath xmlns:m="http://schemas.openxmlformats.org/officeDocument/2006/math">
-                    <m:sSub>
-                      <m:sSubPr>
-                        <m:ctrlPr>
-                          <a:rPr lang="en-US" sz="3200" b="0" i="1">
-                            <a:latin typeface="Cambria Math" charset="0"/>
-                          </a:rPr>
-                        </m:ctrlPr>
-                      </m:sSubPr>
-                      <m:e>
-                        <m:func>
-                          <m:funcPr>
-                            <m:ctrlPr>
-                              <a:rPr lang="en-US" sz="3200" b="0" i="1">
-                                <a:latin typeface="Cambria Math" charset="0"/>
-                              </a:rPr>
-                            </m:ctrlPr>
-                          </m:funcPr>
-                          <m:fName>
-                            <m:r>
-                              <m:rPr>
-                                <m:sty m:val="p"/>
-                              </m:rPr>
-                              <a:rPr lang="en-US" sz="3200" b="0">
-                                <a:latin typeface="Cambria Math" panose="02040503050406030204" pitchFamily="18" charset="0"/>
-                              </a:rPr>
-                              <m:t>min</m:t>
-                            </m:r>
-                          </m:fName>
-                          <m:e>
-                            <m:d>
-                              <m:dPr>
-                                <m:begChr m:val="|"/>
-                                <m:endChr m:val="|"/>
-                                <m:ctrlPr>
-                                  <a:rPr lang="en-US" sz="3200" b="0" i="1">
-                                    <a:latin typeface="Cambria Math" charset="0"/>
-                                  </a:rPr>
-                                </m:ctrlPr>
-                              </m:dPr>
-                              <m:e>
-                                <m:d>
-                                  <m:dPr>
-                                    <m:begChr m:val="|"/>
-                                    <m:endChr m:val="|"/>
-                                    <m:ctrlPr>
-                                      <a:rPr lang="en-US" sz="3200" b="0" i="1">
-                                        <a:latin typeface="Cambria Math" charset="0"/>
-                                      </a:rPr>
-                                    </m:ctrlPr>
-                                  </m:dPr>
-                                  <m:e>
-                                    <m:r>
-                                      <a:rPr lang="en-US" sz="3200" b="0" i="1">
-                                        <a:latin typeface="Cambria Math" panose="02040503050406030204" pitchFamily="18" charset="0"/>
-                                      </a:rPr>
-                                      <m:t>𝑐</m:t>
-                                    </m:r>
-                                  </m:e>
-                                </m:d>
-                              </m:e>
-                            </m:d>
-                          </m:e>
-                        </m:func>
-                      </m:e>
-                      <m:sub>
-                        <m:r>
-                          <a:rPr lang="en-US" sz="3200" b="0" i="1">
-                            <a:latin typeface="Cambria Math" panose="02040503050406030204" pitchFamily="18" charset="0"/>
-                          </a:rPr>
-                          <m:t>1</m:t>
-                        </m:r>
-                      </m:sub>
-                    </m:sSub>
-                    <m:r>
-                      <a:rPr lang="en-US" sz="3200" b="0" i="1" smtClean="0">
-                        <a:latin typeface="Cambria Math" panose="02040503050406030204" pitchFamily="18" charset="0"/>
-                      </a:rPr>
-                      <m:t>+</m:t>
-                    </m:r>
-                    <m:sSub>
-                      <m:sSubPr>
-                        <m:ctrlPr>
-                          <a:rPr lang="en-US" sz="3200" b="0" i="1" smtClean="0">
-                            <a:latin typeface="Cambria Math" charset="0"/>
-                          </a:rPr>
-                        </m:ctrlPr>
-                      </m:sSubPr>
-                      <m:e>
-                        <m:d>
-                          <m:dPr>
-                            <m:begChr m:val="|"/>
-                            <m:endChr m:val="|"/>
-                            <m:ctrlPr>
-                              <a:rPr lang="en-US" sz="3200" b="0" i="1" smtClean="0">
-                                <a:latin typeface="Cambria Math" charset="0"/>
-                              </a:rPr>
-                            </m:ctrlPr>
-                          </m:dPr>
-                          <m:e>
-                            <m:d>
-                              <m:dPr>
-                                <m:begChr m:val="|"/>
-                                <m:endChr m:val="|"/>
-                                <m:ctrlPr>
-                                  <a:rPr lang="en-US" sz="3200" b="0" i="1" smtClean="0">
-                                    <a:latin typeface="Cambria Math" charset="0"/>
-                                  </a:rPr>
-                                </m:ctrlPr>
-                              </m:dPr>
-                              <m:e>
-                                <m:r>
-                                  <a:rPr lang="en-US" sz="3200" b="0" i="1" smtClean="0">
-                                    <a:latin typeface="Cambria Math" panose="02040503050406030204" pitchFamily="18" charset="0"/>
-                                  </a:rPr>
-                                  <m:t>𝑒</m:t>
-                                </m:r>
-                              </m:e>
-                            </m:d>
-                          </m:e>
-                        </m:d>
-                      </m:e>
-                      <m:sub>
-                        <m:r>
-                          <a:rPr lang="en-US" sz="3200" b="0" i="1" smtClean="0">
-                            <a:latin typeface="Cambria Math" panose="02040503050406030204" pitchFamily="18" charset="0"/>
-                          </a:rPr>
-                          <m:t>1</m:t>
-                        </m:r>
-                      </m:sub>
-                    </m:sSub>
-                    <m:r>
-                      <a:rPr lang="en-US" sz="3200" b="0" i="1">
-                        <a:latin typeface="Cambria Math" panose="02040503050406030204" pitchFamily="18" charset="0"/>
-                      </a:rPr>
-                      <m:t>𝑠</m:t>
-                    </m:r>
-                    <m:r>
-                      <a:rPr lang="en-US" sz="3200" b="0" i="1" smtClean="0">
-                        <a:latin typeface="Cambria Math" panose="02040503050406030204" pitchFamily="18" charset="0"/>
-                      </a:rPr>
-                      <m:t>𝑡</m:t>
-                    </m:r>
-                    <m:r>
-                      <a:rPr lang="en-US" sz="3200" b="0" i="1" smtClean="0">
-                        <a:latin typeface="Cambria Math" panose="02040503050406030204" pitchFamily="18" charset="0"/>
-                      </a:rPr>
-                      <m:t> </m:t>
-                    </m:r>
-                    <m:r>
-                      <a:rPr lang="en-US" sz="3200" b="0" i="1" smtClean="0">
-                        <a:latin typeface="Cambria Math" panose="02040503050406030204" pitchFamily="18" charset="0"/>
-                      </a:rPr>
-                      <m:t>𝑦</m:t>
-                    </m:r>
-                    <m:r>
-                      <a:rPr lang="en-US" sz="3200" b="0" i="1" smtClean="0">
-                        <a:latin typeface="Cambria Math" panose="02040503050406030204" pitchFamily="18" charset="0"/>
-                      </a:rPr>
-                      <m:t>=</m:t>
-                    </m:r>
-                    <m:r>
-                      <m:rPr>
-                        <m:sty m:val="p"/>
-                      </m:rPr>
-                      <a:rPr lang="en-US" sz="3200" b="0" i="0" smtClean="0">
-                        <a:latin typeface="Cambria Math" panose="02040503050406030204" pitchFamily="18" charset="0"/>
-                      </a:rPr>
-                      <m:t>Φ</m:t>
-                    </m:r>
-                    <m:r>
-                      <a:rPr lang="en-US" sz="3200" b="0" i="1" smtClean="0">
-                        <a:latin typeface="Cambria Math" panose="02040503050406030204" pitchFamily="18" charset="0"/>
-                      </a:rPr>
-                      <m:t>𝑐</m:t>
-                    </m:r>
-                    <m:r>
-                      <a:rPr lang="en-US" sz="3200" b="0" i="1" smtClean="0">
-                        <a:latin typeface="Cambria Math" panose="02040503050406030204" pitchFamily="18" charset="0"/>
-                      </a:rPr>
-                      <m:t>+</m:t>
-                    </m:r>
-                    <m:r>
-                      <a:rPr lang="en-US" sz="3200" b="0" i="1" smtClean="0">
-                        <a:latin typeface="Cambria Math" panose="02040503050406030204" pitchFamily="18" charset="0"/>
-                      </a:rPr>
-                      <m:t>𝑒</m:t>
-                    </m:r>
-                  </m:oMath>
-                </a14:m>
-                <a:r>
-                  <a:rPr lang="en-US" sz="3200" b="0" dirty="0">
-                    <a:latin typeface="Calibri" charset="0"/>
-                  </a:rPr>
-                  <a:t>) to account for small differences between images.</a:t>
-                </a:r>
-                <a:endParaRPr lang="en-US" sz="3200" b="0" u="sng" dirty="0">
-                  <a:latin typeface="Calibri" charset="0"/>
-                </a:endParaRPr>
-              </a:p>
-              <a:p>
-                <a:pPr marL="457200" indent="-457200">
-                  <a:buFont typeface="Arial" charset="0"/>
-                  <a:buChar char="•"/>
-                  <a:defRPr/>
-                </a:pPr>
-                <a:r>
-                  <a:rPr lang="en-US" sz="3200" b="0" u="sng" dirty="0">
-                    <a:latin typeface="Calibri" charset="0"/>
-                  </a:rPr>
-                  <a:t>VGG-FACE</a:t>
-                </a:r>
-                <a:r>
-                  <a:rPr lang="en-US" sz="3200" b="0" dirty="0">
-                    <a:latin typeface="Calibri" charset="0"/>
-                  </a:rPr>
-                  <a:t>: Use features from pre-trained VGG network and predict using K-nearest neighbors based on cosine distances. [2]</a:t>
-                </a:r>
-                <a:endParaRPr lang="en-US" sz="3200" b="0" u="sng" dirty="0">
-                  <a:latin typeface="Calibri" charset="0"/>
-                </a:endParaRPr>
-              </a:p>
-              <a:p>
-                <a:pPr>
-                  <a:defRPr/>
-                </a:pPr>
-                <a:endParaRPr lang="en-US" sz="1600" b="0" dirty="0">
-                  <a:latin typeface="Calibri" charset="0"/>
-                </a:endParaRPr>
-              </a:p>
-              <a:p>
-                <a:pPr>
-                  <a:defRPr/>
-                </a:pPr>
-                <a:r>
-                  <a:rPr lang="en-US" sz="3200" dirty="0">
-                    <a:latin typeface="Calibri" charset="0"/>
-                  </a:rPr>
-                  <a:t>Dataset</a:t>
-                </a:r>
-              </a:p>
-              <a:p>
-                <a:pPr marL="457200" indent="-457200">
-                  <a:buFont typeface="Arial" panose="020B0604020202020204" pitchFamily="34" charset="0"/>
-                  <a:buChar char="•"/>
-                  <a:defRPr/>
-                </a:pPr>
-                <a:r>
-                  <a:rPr lang="en-US" sz="3200" b="0" dirty="0">
-                    <a:latin typeface="Calibri" charset="0"/>
-                  </a:rPr>
-                  <a:t>Labeled Faces in the Wild (LFW): subjects with at least 20 faces. [5]</a:t>
-                </a:r>
-              </a:p>
-              <a:p>
-                <a:pPr marL="457200" indent="-457200">
-                  <a:buFont typeface="Arial" panose="020B0604020202020204" pitchFamily="34" charset="0"/>
-                  <a:buChar char="•"/>
-                  <a:defRPr/>
-                </a:pPr>
-                <a:r>
-                  <a:rPr lang="en-US" sz="3200" b="0" dirty="0">
-                    <a:latin typeface="Calibri" charset="0"/>
-                  </a:rPr>
-                  <a:t>Use equal number of training faces for each subject.</a:t>
-                </a:r>
-              </a:p>
-              <a:p>
-                <a:pPr marL="1200150" lvl="1" indent="-742950">
-                  <a:buFont typeface="Wingdings" charset="2"/>
-                  <a:buChar char="§"/>
-                  <a:defRPr/>
-                </a:pPr>
-                <a:endParaRPr lang="en-US" sz="3200" b="0" dirty="0">
-                  <a:latin typeface="Calibri" charset="0"/>
-                </a:endParaRPr>
-              </a:p>
-              <a:p>
-                <a:pPr marL="1200150" lvl="1" indent="-742950">
-                  <a:buFont typeface="Wingdings" charset="2"/>
-                  <a:buChar char="§"/>
-                  <a:defRPr/>
-                </a:pPr>
-                <a:endParaRPr lang="en-US" sz="3200" b="0" dirty="0">
-                  <a:latin typeface="Calibri" charset="0"/>
-                </a:endParaRPr>
-              </a:p>
-            </p:txBody>
-          </p:sp>
-        </mc:Choice>
-        <mc:Fallback xmlns="">
-          <p:sp>
-            <p:nvSpPr>
-              <p:cNvPr id="65" name="TextBox 64">
-                <a:extLst>
-                  <a:ext uri="{FF2B5EF4-FFF2-40B4-BE49-F238E27FC236}">
-                    <a16:creationId xmlns:a16="http://schemas.microsoft.com/office/drawing/2014/main" id="{2C57997F-D395-4221-B117-91AC8D3BD8F5}"/>
-                  </a:ext>
-                </a:extLst>
-              </p:cNvPr>
-              <p:cNvSpPr txBox="1">
-                <a:spLocks noRot="1" noChangeAspect="1" noMove="1" noResize="1" noEditPoints="1" noAdjustHandles="1" noChangeArrowheads="1" noChangeShapeType="1" noTextEdit="1"/>
-              </p:cNvSpPr>
-              <p:nvPr/>
-            </p:nvSpPr>
-            <p:spPr>
-              <a:xfrm>
-                <a:off x="783309" y="16076005"/>
-                <a:ext cx="11125504" cy="11618309"/>
-              </a:xfrm>
-              <a:prstGeom prst="rect">
-                <a:avLst/>
-              </a:prstGeom>
-              <a:blipFill>
-                <a:blip r:embed="rId19"/>
-                <a:stretch>
-                  <a:fillRect l="-1369" t="-682" r="-2026"/>
-                </a:stretch>
-              </a:blipFill>
-            </p:spPr>
-            <p:txBody>
-              <a:bodyPr/>
-              <a:lstStyle/>
-              <a:p>
-                <a:r>
-                  <a:rPr lang="en-US">
-                    <a:noFill/>
-                  </a:rPr>
-                  <a:t> </a:t>
-                </a:r>
-              </a:p>
-            </p:txBody>
-          </p:sp>
-        </mc:Fallback>
-      </mc:AlternateContent>
       <p:pic>
         <p:nvPicPr>
           <p:cNvPr id="31" name="Picture 30" descr="A screenshot of a cell phone&#10;&#10;Description generated with very high confidence">
@@ -5458,7 +5355,7 @@
           <p:nvPr/>
         </p:nvPicPr>
         <p:blipFill>
-          <a:blip r:embed="rId20">
+          <a:blip r:embed="rId18">
             <a:extLst>
               <a:ext uri="{28A0092B-C50C-407E-A947-70E740481C1C}">
                 <a14:useLocalDpi xmlns:a14="http://schemas.microsoft.com/office/drawing/2010/main" val="0"/>
@@ -5494,7 +5391,7 @@
           <p:nvPr/>
         </p:nvPicPr>
         <p:blipFill>
-          <a:blip r:embed="rId21">
+          <a:blip r:embed="rId19">
             <a:extLst>
               <a:ext uri="{28A0092B-C50C-407E-A947-70E740481C1C}">
                 <a14:useLocalDpi xmlns:a14="http://schemas.microsoft.com/office/drawing/2010/main" val="0"/>
@@ -5523,10 +5420,10 @@
         </p:nvGrpSpPr>
         <p:grpSpPr>
           <a:xfrm>
-            <a:off x="13154109" y="13837337"/>
-            <a:ext cx="4306563" cy="1578793"/>
-            <a:chOff x="13164996" y="14269082"/>
-            <a:chExt cx="4306563" cy="1578793"/>
+            <a:off x="12663707" y="13550696"/>
+            <a:ext cx="5480566" cy="2052230"/>
+            <a:chOff x="13215848" y="14269082"/>
+            <a:chExt cx="4216234" cy="1578793"/>
           </a:xfrm>
         </p:grpSpPr>
         <p:pic>
@@ -5538,7 +5435,7 @@
             <p:nvPr/>
           </p:nvPicPr>
           <p:blipFill>
-            <a:blip r:embed="rId22">
+            <a:blip r:embed="rId20">
               <a:extLst>
                 <a:ext uri="{28A0092B-C50C-407E-A947-70E740481C1C}">
                   <a14:useLocalDpi xmlns:a14="http://schemas.microsoft.com/office/drawing/2010/main" val="0"/>
@@ -5551,7 +5448,7 @@
           </p:blipFill>
           <p:spPr>
             <a:xfrm>
-              <a:off x="16190698" y="14269082"/>
+              <a:off x="16151221" y="14269082"/>
               <a:ext cx="1271016" cy="1271016"/>
             </a:xfrm>
             <a:prstGeom prst="rect">
@@ -5568,7 +5465,7 @@
             <p:nvPr/>
           </p:nvPicPr>
           <p:blipFill>
-            <a:blip r:embed="rId23">
+            <a:blip r:embed="rId21">
               <a:extLst>
                 <a:ext uri="{28A0092B-C50C-407E-A947-70E740481C1C}">
                   <a14:useLocalDpi xmlns:a14="http://schemas.microsoft.com/office/drawing/2010/main" val="0"/>
@@ -5598,7 +5495,7 @@
             <p:nvPr/>
           </p:nvPicPr>
           <p:blipFill>
-            <a:blip r:embed="rId24">
+            <a:blip r:embed="rId22">
               <a:extLst>
                 <a:ext uri="{28A0092B-C50C-407E-A947-70E740481C1C}">
                   <a14:useLocalDpi xmlns:a14="http://schemas.microsoft.com/office/drawing/2010/main" val="0"/>
@@ -5611,7 +5508,7 @@
           </p:blipFill>
           <p:spPr>
             <a:xfrm>
-              <a:off x="13175349" y="14270098"/>
+              <a:off x="13226201" y="14270098"/>
               <a:ext cx="1270000" cy="1270000"/>
             </a:xfrm>
             <a:prstGeom prst="rect">
@@ -5633,7 +5530,7 @@
           </p:nvSpPr>
           <p:spPr>
             <a:xfrm>
-              <a:off x="13164996" y="15540098"/>
+              <a:off x="13215848" y="15540098"/>
               <a:ext cx="1290706" cy="307777"/>
             </a:xfrm>
             <a:prstGeom prst="rect">
@@ -5719,7 +5616,7 @@
           </p:nvSpPr>
           <p:spPr>
             <a:xfrm>
-              <a:off x="16180853" y="15532962"/>
+              <a:off x="16141376" y="15532962"/>
               <a:ext cx="1290706" cy="307777"/>
             </a:xfrm>
             <a:prstGeom prst="rect">
@@ -5749,6 +5646,402 @@
           </p:txBody>
         </p:sp>
       </p:grpSp>
+      <mc:AlternateContent xmlns:mc="http://schemas.openxmlformats.org/markup-compatibility/2006">
+        <mc:Choice xmlns:a14="http://schemas.microsoft.com/office/drawing/2010/main" Requires="a14">
+          <p:sp>
+            <p:nvSpPr>
+              <p:cNvPr id="30" name="Rectangle 29"/>
+              <p:cNvSpPr/>
+              <p:nvPr/>
+            </p:nvSpPr>
+            <p:spPr>
+              <a:xfrm>
+                <a:off x="18573335" y="10043705"/>
+                <a:ext cx="5595256" cy="1155701"/>
+              </a:xfrm>
+              <a:prstGeom prst="rect">
+                <a:avLst/>
+              </a:prstGeom>
+            </p:spPr>
+            <p:txBody>
+              <a:bodyPr wrap="square">
+                <a:spAutoFit/>
+              </a:bodyPr>
+              <a:lstStyle/>
+              <a:p>
+                <a:r>
+                  <a:rPr lang="en-US" sz="2000" b="0" dirty="0" smtClean="0">
+                    <a:latin typeface="Calibri" charset="0"/>
+                  </a:rPr>
+                  <a:t>Replace </a:t>
+                </a:r>
+                <a:r>
+                  <a:rPr lang="en-US" sz="2000" b="0" dirty="0">
+                    <a:latin typeface="Calibri" charset="0"/>
+                  </a:rPr>
+                  <a:t>pixel </a:t>
+                </a:r>
+                <a14:m>
+                  <m:oMath xmlns:m="http://schemas.openxmlformats.org/officeDocument/2006/math">
+                    <m:r>
+                      <a:rPr lang="en-US" sz="2000" b="0" i="1">
+                        <a:latin typeface="Cambria Math" panose="02040503050406030204" pitchFamily="18" charset="0"/>
+                      </a:rPr>
+                      <m:t>(</m:t>
+                    </m:r>
+                    <m:r>
+                      <a:rPr lang="en-US" sz="2000" b="0" i="1">
+                        <a:latin typeface="Cambria Math" panose="02040503050406030204" pitchFamily="18" charset="0"/>
+                      </a:rPr>
+                      <m:t>𝑖</m:t>
+                    </m:r>
+                    <m:r>
+                      <a:rPr lang="en-US" sz="2000" b="0" i="1">
+                        <a:latin typeface="Cambria Math" panose="02040503050406030204" pitchFamily="18" charset="0"/>
+                      </a:rPr>
+                      <m:t>,</m:t>
+                    </m:r>
+                    <m:r>
+                      <a:rPr lang="en-US" sz="2000" b="0" i="1">
+                        <a:latin typeface="Cambria Math" panose="02040503050406030204" pitchFamily="18" charset="0"/>
+                      </a:rPr>
+                      <m:t>𝑗</m:t>
+                    </m:r>
+                    <m:r>
+                      <a:rPr lang="en-US" sz="2000" b="0" i="1">
+                        <a:latin typeface="Cambria Math" panose="02040503050406030204" pitchFamily="18" charset="0"/>
+                      </a:rPr>
+                      <m:t>)</m:t>
+                    </m:r>
+                  </m:oMath>
+                </a14:m>
+                <a:r>
+                  <a:rPr lang="en-US" sz="2000" b="0" dirty="0">
+                    <a:latin typeface="Calibri" charset="0"/>
+                  </a:rPr>
+                  <a:t> with </a:t>
+                </a:r>
+                <a14:m>
+                  <m:oMath xmlns:m="http://schemas.openxmlformats.org/officeDocument/2006/math">
+                    <m:r>
+                      <a:rPr lang="en-US" sz="2000" b="0" i="1">
+                        <a:latin typeface="Cambria Math" panose="02040503050406030204" pitchFamily="18" charset="0"/>
+                      </a:rPr>
+                      <m:t>(</m:t>
+                    </m:r>
+                    <m:f>
+                      <m:fPr>
+                        <m:ctrlPr>
+                          <a:rPr lang="en-US" sz="2000" b="0" i="1">
+                            <a:latin typeface="Cambria Math" charset="0"/>
+                          </a:rPr>
+                        </m:ctrlPr>
+                      </m:fPr>
+                      <m:num>
+                        <m:r>
+                          <a:rPr lang="en-US" sz="2000" b="0" i="1">
+                            <a:latin typeface="Cambria Math" panose="02040503050406030204" pitchFamily="18" charset="0"/>
+                          </a:rPr>
+                          <m:t>𝑖</m:t>
+                        </m:r>
+                      </m:num>
+                      <m:den>
+                        <m:r>
+                          <a:rPr lang="en-US" sz="2000" b="0" i="1">
+                            <a:latin typeface="Cambria Math" panose="02040503050406030204" pitchFamily="18" charset="0"/>
+                          </a:rPr>
+                          <m:t>1+</m:t>
+                        </m:r>
+                        <m:r>
+                          <a:rPr lang="en-US" sz="2000" b="0" i="1">
+                            <a:latin typeface="Cambria Math" panose="02040503050406030204" pitchFamily="18" charset="0"/>
+                          </a:rPr>
+                          <m:t>𝑘</m:t>
+                        </m:r>
+                        <m:sSup>
+                          <m:sSupPr>
+                            <m:ctrlPr>
+                              <a:rPr lang="en-US" sz="2000" b="0" i="1">
+                                <a:latin typeface="Cambria Math" charset="0"/>
+                              </a:rPr>
+                            </m:ctrlPr>
+                          </m:sSupPr>
+                          <m:e>
+                            <m:r>
+                              <a:rPr lang="en-US" sz="2000" b="0" i="1">
+                                <a:latin typeface="Cambria Math" panose="02040503050406030204" pitchFamily="18" charset="0"/>
+                              </a:rPr>
+                              <m:t>𝑟</m:t>
+                            </m:r>
+                          </m:e>
+                          <m:sup>
+                            <m:r>
+                              <a:rPr lang="en-US" sz="2000" b="0" i="1">
+                                <a:latin typeface="Cambria Math" panose="02040503050406030204" pitchFamily="18" charset="0"/>
+                              </a:rPr>
+                              <m:t>2</m:t>
+                            </m:r>
+                          </m:sup>
+                        </m:sSup>
+                      </m:den>
+                    </m:f>
+                    <m:r>
+                      <a:rPr lang="en-US" sz="2000" b="0" i="1">
+                        <a:latin typeface="Cambria Math" panose="02040503050406030204" pitchFamily="18" charset="0"/>
+                      </a:rPr>
+                      <m:t>,</m:t>
+                    </m:r>
+                    <m:f>
+                      <m:fPr>
+                        <m:ctrlPr>
+                          <a:rPr lang="en-US" sz="2000" b="0" i="1">
+                            <a:latin typeface="Cambria Math" charset="0"/>
+                          </a:rPr>
+                        </m:ctrlPr>
+                      </m:fPr>
+                      <m:num>
+                        <m:r>
+                          <a:rPr lang="en-US" sz="2000" b="0" i="1">
+                            <a:latin typeface="Cambria Math" panose="02040503050406030204" pitchFamily="18" charset="0"/>
+                          </a:rPr>
+                          <m:t>𝑗</m:t>
+                        </m:r>
+                      </m:num>
+                      <m:den>
+                        <m:r>
+                          <a:rPr lang="en-US" sz="2000" b="0" i="1">
+                            <a:latin typeface="Cambria Math" panose="02040503050406030204" pitchFamily="18" charset="0"/>
+                          </a:rPr>
+                          <m:t>1+</m:t>
+                        </m:r>
+                        <m:r>
+                          <a:rPr lang="en-US" sz="2000" b="0" i="1">
+                            <a:latin typeface="Cambria Math" panose="02040503050406030204" pitchFamily="18" charset="0"/>
+                          </a:rPr>
+                          <m:t>𝑘</m:t>
+                        </m:r>
+                        <m:sSup>
+                          <m:sSupPr>
+                            <m:ctrlPr>
+                              <a:rPr lang="en-US" sz="2000" b="0" i="1">
+                                <a:latin typeface="Cambria Math" charset="0"/>
+                              </a:rPr>
+                            </m:ctrlPr>
+                          </m:sSupPr>
+                          <m:e>
+                            <m:r>
+                              <a:rPr lang="en-US" sz="2000" b="0" i="1">
+                                <a:latin typeface="Cambria Math" panose="02040503050406030204" pitchFamily="18" charset="0"/>
+                              </a:rPr>
+                              <m:t>𝑟</m:t>
+                            </m:r>
+                          </m:e>
+                          <m:sup>
+                            <m:r>
+                              <a:rPr lang="en-US" sz="2000" b="0" i="1">
+                                <a:latin typeface="Cambria Math" panose="02040503050406030204" pitchFamily="18" charset="0"/>
+                              </a:rPr>
+                              <m:t>2</m:t>
+                            </m:r>
+                          </m:sup>
+                        </m:sSup>
+                      </m:den>
+                    </m:f>
+                    <m:r>
+                      <a:rPr lang="en-US" sz="2000" b="0" i="1">
+                        <a:latin typeface="Cambria Math" panose="02040503050406030204" pitchFamily="18" charset="0"/>
+                      </a:rPr>
+                      <m:t>)</m:t>
+                    </m:r>
+                  </m:oMath>
+                </a14:m>
+                <a:r>
+                  <a:rPr lang="en-US" sz="2000" b="0" dirty="0">
+                    <a:latin typeface="Calibri" charset="0"/>
+                  </a:rPr>
+                  <a:t> where </a:t>
+                </a:r>
+                <a14:m>
+                  <m:oMath xmlns:m="http://schemas.openxmlformats.org/officeDocument/2006/math">
+                    <m:r>
+                      <a:rPr lang="en-US" sz="2000" b="0" i="1">
+                        <a:latin typeface="Cambria Math" panose="02040503050406030204" pitchFamily="18" charset="0"/>
+                      </a:rPr>
+                      <m:t>𝑟</m:t>
+                    </m:r>
+                  </m:oMath>
+                </a14:m>
+                <a:r>
+                  <a:rPr lang="en-US" sz="2000" b="0" dirty="0">
+                    <a:latin typeface="Calibri" charset="0"/>
+                  </a:rPr>
+                  <a:t> is distance from center of image and </a:t>
+                </a:r>
+                <a14:m>
+                  <m:oMath xmlns:m="http://schemas.openxmlformats.org/officeDocument/2006/math">
+                    <m:r>
+                      <a:rPr lang="en-US" sz="2000" b="0" i="1">
+                        <a:latin typeface="Cambria Math" panose="02040503050406030204" pitchFamily="18" charset="0"/>
+                      </a:rPr>
+                      <m:t>𝑘</m:t>
+                    </m:r>
+                  </m:oMath>
+                </a14:m>
+                <a:r>
+                  <a:rPr lang="en-US" sz="2000" b="0" dirty="0">
+                    <a:latin typeface="Calibri" charset="0"/>
+                  </a:rPr>
+                  <a:t> controls distortion amount and type. </a:t>
+                </a:r>
+                <a:endParaRPr lang="en-US" sz="2000" dirty="0"/>
+              </a:p>
+            </p:txBody>
+          </p:sp>
+        </mc:Choice>
+        <mc:Fallback>
+          <p:sp>
+            <p:nvSpPr>
+              <p:cNvPr id="30" name="Rectangle 29"/>
+              <p:cNvSpPr>
+                <a:spLocks noRot="1" noChangeAspect="1" noMove="1" noResize="1" noEditPoints="1" noAdjustHandles="1" noChangeArrowheads="1" noChangeShapeType="1" noTextEdit="1"/>
+              </p:cNvSpPr>
+              <p:nvPr/>
+            </p:nvSpPr>
+            <p:spPr>
+              <a:xfrm>
+                <a:off x="18573335" y="10043705"/>
+                <a:ext cx="5595256" cy="1155701"/>
+              </a:xfrm>
+              <a:prstGeom prst="rect">
+                <a:avLst/>
+              </a:prstGeom>
+              <a:blipFill rotWithShape="0">
+                <a:blip r:embed="rId23"/>
+                <a:stretch>
+                  <a:fillRect l="-1198" b="-8995"/>
+                </a:stretch>
+              </a:blipFill>
+            </p:spPr>
+            <p:txBody>
+              <a:bodyPr/>
+              <a:lstStyle/>
+              <a:p>
+                <a:r>
+                  <a:rPr lang="en-US">
+                    <a:noFill/>
+                  </a:rPr>
+                  <a:t> </a:t>
+                </a:r>
+              </a:p>
+            </p:txBody>
+          </p:sp>
+        </mc:Fallback>
+      </mc:AlternateContent>
+      <p:sp>
+        <p:nvSpPr>
+          <p:cNvPr id="69" name="Rectangle 68"/>
+          <p:cNvSpPr/>
+          <p:nvPr/>
+        </p:nvSpPr>
+        <p:spPr>
+          <a:xfrm>
+            <a:off x="12579637" y="15660242"/>
+            <a:ext cx="5595256" cy="1015663"/>
+          </a:xfrm>
+          <a:prstGeom prst="rect">
+            <a:avLst/>
+          </a:prstGeom>
+        </p:spPr>
+        <p:txBody>
+          <a:bodyPr wrap="square">
+            <a:spAutoFit/>
+          </a:bodyPr>
+          <a:lstStyle/>
+          <a:p>
+            <a:r>
+              <a:rPr lang="en-US" sz="2000" b="0" dirty="0" smtClean="0">
+                <a:latin typeface="Calibri" charset="0"/>
+              </a:rPr>
+              <a:t>Compute attribute vector in VGG feature space using similar faces, then interpolate the target face image along this vector.</a:t>
+            </a:r>
+            <a:endParaRPr lang="en-US" sz="2000" dirty="0"/>
+          </a:p>
+        </p:txBody>
+      </p:sp>
+      <p:sp>
+        <p:nvSpPr>
+          <p:cNvPr id="70" name="Rectangle 69"/>
+          <p:cNvSpPr/>
+          <p:nvPr/>
+        </p:nvSpPr>
+        <p:spPr>
+          <a:xfrm>
+            <a:off x="12572475" y="10103605"/>
+            <a:ext cx="5595256" cy="707886"/>
+          </a:xfrm>
+          <a:prstGeom prst="rect">
+            <a:avLst/>
+          </a:prstGeom>
+        </p:spPr>
+        <p:txBody>
+          <a:bodyPr wrap="square">
+            <a:spAutoFit/>
+          </a:bodyPr>
+          <a:lstStyle/>
+          <a:p>
+            <a:r>
+              <a:rPr lang="en-US" sz="2000" b="0" dirty="0" smtClean="0">
+                <a:latin typeface="Calibri" charset="0"/>
+              </a:rPr>
+              <a:t>Fill rectangular region with random pixels in range [0, 255].</a:t>
+            </a:r>
+            <a:endParaRPr lang="en-US" sz="2000" dirty="0"/>
+          </a:p>
+        </p:txBody>
+      </p:sp>
+      <p:sp>
+        <p:nvSpPr>
+          <p:cNvPr id="71" name="Rectangle 70"/>
+          <p:cNvSpPr/>
+          <p:nvPr/>
+        </p:nvSpPr>
+        <p:spPr>
+          <a:xfrm>
+            <a:off x="18538096" y="15684757"/>
+            <a:ext cx="5595256" cy="707886"/>
+          </a:xfrm>
+          <a:prstGeom prst="rect">
+            <a:avLst/>
+          </a:prstGeom>
+        </p:spPr>
+        <p:txBody>
+          <a:bodyPr wrap="square">
+            <a:spAutoFit/>
+          </a:bodyPr>
+          <a:lstStyle/>
+          <a:p>
+            <a:r>
+              <a:rPr lang="en-US" sz="2000" b="0" dirty="0" smtClean="0">
+                <a:latin typeface="Calibri" charset="0"/>
+              </a:rPr>
+              <a:t>Apply rectangular </a:t>
+            </a:r>
+            <a:r>
+              <a:rPr lang="en-US" sz="2000" b="0" dirty="0">
+                <a:latin typeface="Calibri" charset="0"/>
+              </a:rPr>
+              <a:t>uniform </a:t>
+            </a:r>
+            <a:r>
+              <a:rPr lang="en-US" sz="2000" b="0" dirty="0" smtClean="0">
+                <a:latin typeface="Calibri" charset="0"/>
+              </a:rPr>
+              <a:t>convolution filter to each pixel in the image.</a:t>
+            </a:r>
+            <a:endParaRPr lang="en-US" sz="2000" dirty="0"/>
+          </a:p>
+        </p:txBody>
+      </p:sp>
     </p:spTree>
   </p:cSld>
   <p:clrMapOvr>

</xml_diff>